<commit_message>
update powerpoint, remove animations
</commit_message>
<xml_diff>
--- a/56359/Présentation/AntoineGhigny_ExploitatonDeFaillesDeSecurite.pptx
+++ b/56359/Présentation/AntoineGhigny_ExploitatonDeFaillesDeSecurite.pptx
@@ -8510,153 +8510,6 @@
                       </p:childTnLst>
                     </p:cTn>
                   </p:par>
-                  <p:par>
-                    <p:cTn id="7" fill="hold">
-                      <p:stCondLst>
-                        <p:cond delay="indefinite"/>
-                      </p:stCondLst>
-                      <p:childTnLst>
-                        <p:par>
-                          <p:cTn id="8" fill="hold">
-                            <p:stCondLst>
-                              <p:cond delay="0"/>
-                            </p:stCondLst>
-                            <p:childTnLst>
-                              <p:par>
-                                <p:cTn id="9" presetID="1" presetClass="entr" presetSubtype="0" fill="hold" nodeType="clickEffect">
-                                  <p:stCondLst>
-                                    <p:cond delay="0"/>
-                                  </p:stCondLst>
-                                  <p:childTnLst>
-                                    <p:set>
-                                      <p:cBhvr>
-                                        <p:cTn id="10" dur="1" fill="hold">
-                                          <p:stCondLst>
-                                            <p:cond delay="0"/>
-                                          </p:stCondLst>
-                                        </p:cTn>
-                                        <p:tgtEl>
-                                          <p:spTgt spid="11">
-                                            <p:txEl>
-                                              <p:pRg st="0" end="0"/>
-                                            </p:txEl>
-                                          </p:spTgt>
-                                        </p:tgtEl>
-                                        <p:attrNameLst>
-                                          <p:attrName>style.visibility</p:attrName>
-                                        </p:attrNameLst>
-                                      </p:cBhvr>
-                                      <p:to>
-                                        <p:strVal val="visible"/>
-                                      </p:to>
-                                    </p:set>
-                                  </p:childTnLst>
-                                </p:cTn>
-                              </p:par>
-                            </p:childTnLst>
-                          </p:cTn>
-                        </p:par>
-                      </p:childTnLst>
-                    </p:cTn>
-                  </p:par>
-                  <p:par>
-                    <p:cTn id="11" fill="hold">
-                      <p:stCondLst>
-                        <p:cond delay="indefinite"/>
-                      </p:stCondLst>
-                      <p:childTnLst>
-                        <p:par>
-                          <p:cTn id="12" fill="hold">
-                            <p:stCondLst>
-                              <p:cond delay="0"/>
-                            </p:stCondLst>
-                            <p:childTnLst>
-                              <p:par>
-                                <p:cTn id="13" presetID="1" presetClass="entr" presetSubtype="0" fill="hold" nodeType="clickEffect">
-                                  <p:stCondLst>
-                                    <p:cond delay="0"/>
-                                  </p:stCondLst>
-                                  <p:childTnLst>
-                                    <p:set>
-                                      <p:cBhvr>
-                                        <p:cTn id="14" dur="1" fill="hold">
-                                          <p:stCondLst>
-                                            <p:cond delay="0"/>
-                                          </p:stCondLst>
-                                        </p:cTn>
-                                        <p:tgtEl>
-                                          <p:spTgt spid="11">
-                                            <p:txEl>
-                                              <p:pRg st="1" end="1"/>
-                                            </p:txEl>
-                                          </p:spTgt>
-                                        </p:tgtEl>
-                                        <p:attrNameLst>
-                                          <p:attrName>style.visibility</p:attrName>
-                                        </p:attrNameLst>
-                                      </p:cBhvr>
-                                      <p:to>
-                                        <p:strVal val="visible"/>
-                                      </p:to>
-                                    </p:set>
-                                  </p:childTnLst>
-                                </p:cTn>
-                              </p:par>
-                            </p:childTnLst>
-                          </p:cTn>
-                        </p:par>
-                      </p:childTnLst>
-                    </p:cTn>
-                  </p:par>
-                  <p:par>
-                    <p:cTn id="15" fill="hold">
-                      <p:stCondLst>
-                        <p:cond delay="indefinite"/>
-                      </p:stCondLst>
-                      <p:childTnLst>
-                        <p:par>
-                          <p:cTn id="16" fill="hold">
-                            <p:stCondLst>
-                              <p:cond delay="0"/>
-                            </p:stCondLst>
-                            <p:childTnLst>
-                              <p:par>
-                                <p:cTn id="17" presetID="1" presetClass="entr" presetSubtype="0" fill="hold" nodeType="clickEffect">
-                                  <p:stCondLst>
-                                    <p:cond delay="0"/>
-                                  </p:stCondLst>
-                                  <p:childTnLst>
-                                    <p:set>
-                                      <p:cBhvr>
-                                        <p:cTn id="18" dur="1" fill="hold">
-                                          <p:stCondLst>
-                                            <p:cond delay="0"/>
-                                          </p:stCondLst>
-                                        </p:cTn>
-                                        <p:tgtEl>
-                                          <p:spTgt spid="11">
-                                            <p:txEl>
-                                              <p:pRg st="5" end="5"/>
-                                            </p:txEl>
-                                          </p:spTgt>
-                                        </p:tgtEl>
-                                        <p:attrNameLst>
-                                          <p:attrName>style.visibility</p:attrName>
-                                        </p:attrNameLst>
-                                      </p:cBhvr>
-                                      <p:to>
-                                        <p:strVal val="visible"/>
-                                      </p:to>
-                                    </p:set>
-                                  </p:childTnLst>
-                                </p:cTn>
-                              </p:par>
-                            </p:childTnLst>
-                          </p:cTn>
-                        </p:par>
-                      </p:childTnLst>
-                    </p:cTn>
-                  </p:par>
                 </p:childTnLst>
               </p:cTn>
               <p:prevCondLst>
@@ -9166,251 +9019,6 @@
                                           <p:spTgt spid="6">
                                             <p:txEl>
                                               <p:pRg st="0" end="0"/>
-                                            </p:txEl>
-                                          </p:spTgt>
-                                        </p:tgtEl>
-                                        <p:attrNameLst>
-                                          <p:attrName>style.visibility</p:attrName>
-                                        </p:attrNameLst>
-                                      </p:cBhvr>
-                                      <p:to>
-                                        <p:strVal val="visible"/>
-                                      </p:to>
-                                    </p:set>
-                                  </p:childTnLst>
-                                </p:cTn>
-                              </p:par>
-                            </p:childTnLst>
-                          </p:cTn>
-                        </p:par>
-                      </p:childTnLst>
-                    </p:cTn>
-                  </p:par>
-                  <p:par>
-                    <p:cTn id="7" fill="hold">
-                      <p:stCondLst>
-                        <p:cond delay="indefinite"/>
-                      </p:stCondLst>
-                      <p:childTnLst>
-                        <p:par>
-                          <p:cTn id="8" fill="hold">
-                            <p:stCondLst>
-                              <p:cond delay="0"/>
-                            </p:stCondLst>
-                            <p:childTnLst>
-                              <p:par>
-                                <p:cTn id="9" presetID="1" presetClass="entr" presetSubtype="0" fill="hold" nodeType="clickEffect">
-                                  <p:stCondLst>
-                                    <p:cond delay="0"/>
-                                  </p:stCondLst>
-                                  <p:childTnLst>
-                                    <p:set>
-                                      <p:cBhvr>
-                                        <p:cTn id="10" dur="1" fill="hold">
-                                          <p:stCondLst>
-                                            <p:cond delay="0"/>
-                                          </p:stCondLst>
-                                        </p:cTn>
-                                        <p:tgtEl>
-                                          <p:spTgt spid="11">
-                                            <p:txEl>
-                                              <p:pRg st="0" end="0"/>
-                                            </p:txEl>
-                                          </p:spTgt>
-                                        </p:tgtEl>
-                                        <p:attrNameLst>
-                                          <p:attrName>style.visibility</p:attrName>
-                                        </p:attrNameLst>
-                                      </p:cBhvr>
-                                      <p:to>
-                                        <p:strVal val="visible"/>
-                                      </p:to>
-                                    </p:set>
-                                  </p:childTnLst>
-                                </p:cTn>
-                              </p:par>
-                            </p:childTnLst>
-                          </p:cTn>
-                        </p:par>
-                      </p:childTnLst>
-                    </p:cTn>
-                  </p:par>
-                  <p:par>
-                    <p:cTn id="11" fill="hold">
-                      <p:stCondLst>
-                        <p:cond delay="indefinite"/>
-                      </p:stCondLst>
-                      <p:childTnLst>
-                        <p:par>
-                          <p:cTn id="12" fill="hold">
-                            <p:stCondLst>
-                              <p:cond delay="0"/>
-                            </p:stCondLst>
-                            <p:childTnLst>
-                              <p:par>
-                                <p:cTn id="13" presetID="1" presetClass="entr" presetSubtype="0" fill="hold" nodeType="clickEffect">
-                                  <p:stCondLst>
-                                    <p:cond delay="0"/>
-                                  </p:stCondLst>
-                                  <p:childTnLst>
-                                    <p:set>
-                                      <p:cBhvr>
-                                        <p:cTn id="14" dur="1" fill="hold">
-                                          <p:stCondLst>
-                                            <p:cond delay="0"/>
-                                          </p:stCondLst>
-                                        </p:cTn>
-                                        <p:tgtEl>
-                                          <p:spTgt spid="11">
-                                            <p:txEl>
-                                              <p:pRg st="1" end="1"/>
-                                            </p:txEl>
-                                          </p:spTgt>
-                                        </p:tgtEl>
-                                        <p:attrNameLst>
-                                          <p:attrName>style.visibility</p:attrName>
-                                        </p:attrNameLst>
-                                      </p:cBhvr>
-                                      <p:to>
-                                        <p:strVal val="visible"/>
-                                      </p:to>
-                                    </p:set>
-                                  </p:childTnLst>
-                                </p:cTn>
-                              </p:par>
-                            </p:childTnLst>
-                          </p:cTn>
-                        </p:par>
-                      </p:childTnLst>
-                    </p:cTn>
-                  </p:par>
-                  <p:par>
-                    <p:cTn id="15" fill="hold">
-                      <p:stCondLst>
-                        <p:cond delay="indefinite"/>
-                      </p:stCondLst>
-                      <p:childTnLst>
-                        <p:par>
-                          <p:cTn id="16" fill="hold">
-                            <p:stCondLst>
-                              <p:cond delay="0"/>
-                            </p:stCondLst>
-                            <p:childTnLst>
-                              <p:par>
-                                <p:cTn id="17" presetID="1" presetClass="entr" presetSubtype="0" fill="hold" nodeType="clickEffect">
-                                  <p:stCondLst>
-                                    <p:cond delay="0"/>
-                                  </p:stCondLst>
-                                  <p:childTnLst>
-                                    <p:set>
-                                      <p:cBhvr>
-                                        <p:cTn id="18" dur="1" fill="hold">
-                                          <p:stCondLst>
-                                            <p:cond delay="0"/>
-                                          </p:stCondLst>
-                                        </p:cTn>
-                                        <p:tgtEl>
-                                          <p:spTgt spid="11">
-                                            <p:txEl>
-                                              <p:pRg st="2" end="2"/>
-                                            </p:txEl>
-                                          </p:spTgt>
-                                        </p:tgtEl>
-                                        <p:attrNameLst>
-                                          <p:attrName>style.visibility</p:attrName>
-                                        </p:attrNameLst>
-                                      </p:cBhvr>
-                                      <p:to>
-                                        <p:strVal val="visible"/>
-                                      </p:to>
-                                    </p:set>
-                                  </p:childTnLst>
-                                </p:cTn>
-                              </p:par>
-                            </p:childTnLst>
-                          </p:cTn>
-                        </p:par>
-                      </p:childTnLst>
-                    </p:cTn>
-                  </p:par>
-                  <p:par>
-                    <p:cTn id="19" fill="hold">
-                      <p:stCondLst>
-                        <p:cond delay="indefinite"/>
-                      </p:stCondLst>
-                      <p:childTnLst>
-                        <p:par>
-                          <p:cTn id="20" fill="hold">
-                            <p:stCondLst>
-                              <p:cond delay="0"/>
-                            </p:stCondLst>
-                            <p:childTnLst>
-                              <p:par>
-                                <p:cTn id="21" presetID="1" presetClass="entr" presetSubtype="0" fill="hold" nodeType="clickEffect">
-                                  <p:stCondLst>
-                                    <p:cond delay="0"/>
-                                  </p:stCondLst>
-                                  <p:childTnLst>
-                                    <p:set>
-                                      <p:cBhvr>
-                                        <p:cTn id="22" dur="1" fill="hold">
-                                          <p:stCondLst>
-                                            <p:cond delay="0"/>
-                                          </p:stCondLst>
-                                        </p:cTn>
-                                        <p:tgtEl>
-                                          <p:spTgt spid="11">
-                                            <p:txEl>
-                                              <p:pRg st="4" end="4"/>
-                                            </p:txEl>
-                                          </p:spTgt>
-                                        </p:tgtEl>
-                                        <p:attrNameLst>
-                                          <p:attrName>style.visibility</p:attrName>
-                                        </p:attrNameLst>
-                                      </p:cBhvr>
-                                      <p:to>
-                                        <p:strVal val="visible"/>
-                                      </p:to>
-                                    </p:set>
-                                  </p:childTnLst>
-                                </p:cTn>
-                              </p:par>
-                            </p:childTnLst>
-                          </p:cTn>
-                        </p:par>
-                      </p:childTnLst>
-                    </p:cTn>
-                  </p:par>
-                  <p:par>
-                    <p:cTn id="23" fill="hold">
-                      <p:stCondLst>
-                        <p:cond delay="indefinite"/>
-                      </p:stCondLst>
-                      <p:childTnLst>
-                        <p:par>
-                          <p:cTn id="24" fill="hold">
-                            <p:stCondLst>
-                              <p:cond delay="0"/>
-                            </p:stCondLst>
-                            <p:childTnLst>
-                              <p:par>
-                                <p:cTn id="25" presetID="1" presetClass="entr" presetSubtype="0" fill="hold" nodeType="clickEffect">
-                                  <p:stCondLst>
-                                    <p:cond delay="0"/>
-                                  </p:stCondLst>
-                                  <p:childTnLst>
-                                    <p:set>
-                                      <p:cBhvr>
-                                        <p:cTn id="26" dur="1" fill="hold">
-                                          <p:stCondLst>
-                                            <p:cond delay="0"/>
-                                          </p:stCondLst>
-                                        </p:cTn>
-                                        <p:tgtEl>
-                                          <p:spTgt spid="11">
-                                            <p:txEl>
-                                              <p:pRg st="5" end="5"/>
                                             </p:txEl>
                                           </p:spTgt>
                                         </p:tgtEl>
@@ -9890,251 +9498,6 @@
                       </p:childTnLst>
                     </p:cTn>
                   </p:par>
-                  <p:par>
-                    <p:cTn id="7" fill="hold">
-                      <p:stCondLst>
-                        <p:cond delay="indefinite"/>
-                      </p:stCondLst>
-                      <p:childTnLst>
-                        <p:par>
-                          <p:cTn id="8" fill="hold">
-                            <p:stCondLst>
-                              <p:cond delay="0"/>
-                            </p:stCondLst>
-                            <p:childTnLst>
-                              <p:par>
-                                <p:cTn id="9" presetID="1" presetClass="entr" presetSubtype="0" fill="hold" nodeType="clickEffect">
-                                  <p:stCondLst>
-                                    <p:cond delay="0"/>
-                                  </p:stCondLst>
-                                  <p:childTnLst>
-                                    <p:set>
-                                      <p:cBhvr>
-                                        <p:cTn id="10" dur="1" fill="hold">
-                                          <p:stCondLst>
-                                            <p:cond delay="0"/>
-                                          </p:stCondLst>
-                                        </p:cTn>
-                                        <p:tgtEl>
-                                          <p:spTgt spid="11">
-                                            <p:txEl>
-                                              <p:pRg st="1" end="1"/>
-                                            </p:txEl>
-                                          </p:spTgt>
-                                        </p:tgtEl>
-                                        <p:attrNameLst>
-                                          <p:attrName>style.visibility</p:attrName>
-                                        </p:attrNameLst>
-                                      </p:cBhvr>
-                                      <p:to>
-                                        <p:strVal val="visible"/>
-                                      </p:to>
-                                    </p:set>
-                                  </p:childTnLst>
-                                </p:cTn>
-                              </p:par>
-                            </p:childTnLst>
-                          </p:cTn>
-                        </p:par>
-                      </p:childTnLst>
-                    </p:cTn>
-                  </p:par>
-                  <p:par>
-                    <p:cTn id="11" fill="hold">
-                      <p:stCondLst>
-                        <p:cond delay="indefinite"/>
-                      </p:stCondLst>
-                      <p:childTnLst>
-                        <p:par>
-                          <p:cTn id="12" fill="hold">
-                            <p:stCondLst>
-                              <p:cond delay="0"/>
-                            </p:stCondLst>
-                            <p:childTnLst>
-                              <p:par>
-                                <p:cTn id="13" presetID="1" presetClass="entr" presetSubtype="0" fill="hold" nodeType="clickEffect">
-                                  <p:stCondLst>
-                                    <p:cond delay="0"/>
-                                  </p:stCondLst>
-                                  <p:childTnLst>
-                                    <p:set>
-                                      <p:cBhvr>
-                                        <p:cTn id="14" dur="1" fill="hold">
-                                          <p:stCondLst>
-                                            <p:cond delay="0"/>
-                                          </p:stCondLst>
-                                        </p:cTn>
-                                        <p:tgtEl>
-                                          <p:spTgt spid="11">
-                                            <p:txEl>
-                                              <p:pRg st="0" end="0"/>
-                                            </p:txEl>
-                                          </p:spTgt>
-                                        </p:tgtEl>
-                                        <p:attrNameLst>
-                                          <p:attrName>style.visibility</p:attrName>
-                                        </p:attrNameLst>
-                                      </p:cBhvr>
-                                      <p:to>
-                                        <p:strVal val="visible"/>
-                                      </p:to>
-                                    </p:set>
-                                  </p:childTnLst>
-                                </p:cTn>
-                              </p:par>
-                            </p:childTnLst>
-                          </p:cTn>
-                        </p:par>
-                      </p:childTnLst>
-                    </p:cTn>
-                  </p:par>
-                  <p:par>
-                    <p:cTn id="15" fill="hold">
-                      <p:stCondLst>
-                        <p:cond delay="indefinite"/>
-                      </p:stCondLst>
-                      <p:childTnLst>
-                        <p:par>
-                          <p:cTn id="16" fill="hold">
-                            <p:stCondLst>
-                              <p:cond delay="0"/>
-                            </p:stCondLst>
-                            <p:childTnLst>
-                              <p:par>
-                                <p:cTn id="17" presetID="1" presetClass="entr" presetSubtype="0" fill="hold" nodeType="clickEffect">
-                                  <p:stCondLst>
-                                    <p:cond delay="0"/>
-                                  </p:stCondLst>
-                                  <p:childTnLst>
-                                    <p:set>
-                                      <p:cBhvr>
-                                        <p:cTn id="18" dur="1" fill="hold">
-                                          <p:stCondLst>
-                                            <p:cond delay="0"/>
-                                          </p:stCondLst>
-                                        </p:cTn>
-                                        <p:tgtEl>
-                                          <p:spTgt spid="11">
-                                            <p:txEl>
-                                              <p:pRg st="2" end="2"/>
-                                            </p:txEl>
-                                          </p:spTgt>
-                                        </p:tgtEl>
-                                        <p:attrNameLst>
-                                          <p:attrName>style.visibility</p:attrName>
-                                        </p:attrNameLst>
-                                      </p:cBhvr>
-                                      <p:to>
-                                        <p:strVal val="visible"/>
-                                      </p:to>
-                                    </p:set>
-                                  </p:childTnLst>
-                                </p:cTn>
-                              </p:par>
-                            </p:childTnLst>
-                          </p:cTn>
-                        </p:par>
-                      </p:childTnLst>
-                    </p:cTn>
-                  </p:par>
-                  <p:par>
-                    <p:cTn id="19" fill="hold">
-                      <p:stCondLst>
-                        <p:cond delay="indefinite"/>
-                      </p:stCondLst>
-                      <p:childTnLst>
-                        <p:par>
-                          <p:cTn id="20" fill="hold">
-                            <p:stCondLst>
-                              <p:cond delay="0"/>
-                            </p:stCondLst>
-                            <p:childTnLst>
-                              <p:par>
-                                <p:cTn id="21" presetID="1" presetClass="entr" presetSubtype="0" fill="hold" nodeType="clickEffect">
-                                  <p:stCondLst>
-                                    <p:cond delay="0"/>
-                                  </p:stCondLst>
-                                  <p:childTnLst>
-                                    <p:set>
-                                      <p:cBhvr>
-                                        <p:cTn id="22" dur="1" fill="hold">
-                                          <p:stCondLst>
-                                            <p:cond delay="0"/>
-                                          </p:stCondLst>
-                                        </p:cTn>
-                                        <p:tgtEl>
-                                          <p:spTgt spid="11">
-                                            <p:txEl>
-                                              <p:pRg st="3" end="3"/>
-                                            </p:txEl>
-                                          </p:spTgt>
-                                        </p:tgtEl>
-                                        <p:attrNameLst>
-                                          <p:attrName>style.visibility</p:attrName>
-                                        </p:attrNameLst>
-                                      </p:cBhvr>
-                                      <p:to>
-                                        <p:strVal val="visible"/>
-                                      </p:to>
-                                    </p:set>
-                                  </p:childTnLst>
-                                </p:cTn>
-                              </p:par>
-                            </p:childTnLst>
-                          </p:cTn>
-                        </p:par>
-                      </p:childTnLst>
-                    </p:cTn>
-                  </p:par>
-                  <p:par>
-                    <p:cTn id="23" fill="hold">
-                      <p:stCondLst>
-                        <p:cond delay="indefinite"/>
-                      </p:stCondLst>
-                      <p:childTnLst>
-                        <p:par>
-                          <p:cTn id="24" fill="hold">
-                            <p:stCondLst>
-                              <p:cond delay="0"/>
-                            </p:stCondLst>
-                            <p:childTnLst>
-                              <p:par>
-                                <p:cTn id="25" presetID="1" presetClass="entr" presetSubtype="0" fill="hold" nodeType="clickEffect">
-                                  <p:stCondLst>
-                                    <p:cond delay="0"/>
-                                  </p:stCondLst>
-                                  <p:childTnLst>
-                                    <p:set>
-                                      <p:cBhvr>
-                                        <p:cTn id="26" dur="1" fill="hold">
-                                          <p:stCondLst>
-                                            <p:cond delay="0"/>
-                                          </p:stCondLst>
-                                        </p:cTn>
-                                        <p:tgtEl>
-                                          <p:spTgt spid="11">
-                                            <p:txEl>
-                                              <p:pRg st="4" end="4"/>
-                                            </p:txEl>
-                                          </p:spTgt>
-                                        </p:tgtEl>
-                                        <p:attrNameLst>
-                                          <p:attrName>style.visibility</p:attrName>
-                                        </p:attrNameLst>
-                                      </p:cBhvr>
-                                      <p:to>
-                                        <p:strVal val="visible"/>
-                                      </p:to>
-                                    </p:set>
-                                  </p:childTnLst>
-                                </p:cTn>
-                              </p:par>
-                            </p:childTnLst>
-                          </p:cTn>
-                        </p:par>
-                      </p:childTnLst>
-                    </p:cTn>
-                  </p:par>
                 </p:childTnLst>
               </p:cTn>
               <p:prevCondLst>
@@ -10470,9 +9833,23 @@
             <a:pPr lvl="1"/>
             <a:r>
               <a:rPr lang="fr-BE" sz="2800" dirty="0" err="1"/>
-              <a:t>envp</a:t>
-            </a:r>
-            <a:endParaRPr lang="fr-BE" dirty="0"/>
+              <a:t>Envp</a:t>
+            </a:r>
+            <a:endParaRPr lang="fr-BE" sz="2800" dirty="0"/>
+          </a:p>
+          <a:p>
+            <a:pPr lvl="2"/>
+            <a:r>
+              <a:rPr lang="fr-BE" dirty="0"/>
+              <a:t>Variables d’environnement</a:t>
+            </a:r>
+          </a:p>
+          <a:p>
+            <a:pPr lvl="2"/>
+            <a:r>
+              <a:rPr lang="fr-BE" dirty="0"/>
+              <a:t>PATH</a:t>
+            </a:r>
           </a:p>
         </p:txBody>
       </p:sp>
@@ -10608,202 +9985,6 @@
                       </p:childTnLst>
                     </p:cTn>
                   </p:par>
-                  <p:par>
-                    <p:cTn id="7" fill="hold">
-                      <p:stCondLst>
-                        <p:cond delay="indefinite"/>
-                      </p:stCondLst>
-                      <p:childTnLst>
-                        <p:par>
-                          <p:cTn id="8" fill="hold">
-                            <p:stCondLst>
-                              <p:cond delay="0"/>
-                            </p:stCondLst>
-                            <p:childTnLst>
-                              <p:par>
-                                <p:cTn id="9" presetID="1" presetClass="entr" presetSubtype="0" fill="hold" nodeType="clickEffect">
-                                  <p:stCondLst>
-                                    <p:cond delay="0"/>
-                                  </p:stCondLst>
-                                  <p:childTnLst>
-                                    <p:set>
-                                      <p:cBhvr>
-                                        <p:cTn id="10" dur="1" fill="hold">
-                                          <p:stCondLst>
-                                            <p:cond delay="0"/>
-                                          </p:stCondLst>
-                                        </p:cTn>
-                                        <p:tgtEl>
-                                          <p:spTgt spid="11">
-                                            <p:txEl>
-                                              <p:pRg st="0" end="0"/>
-                                            </p:txEl>
-                                          </p:spTgt>
-                                        </p:tgtEl>
-                                        <p:attrNameLst>
-                                          <p:attrName>style.visibility</p:attrName>
-                                        </p:attrNameLst>
-                                      </p:cBhvr>
-                                      <p:to>
-                                        <p:strVal val="visible"/>
-                                      </p:to>
-                                    </p:set>
-                                  </p:childTnLst>
-                                </p:cTn>
-                              </p:par>
-                            </p:childTnLst>
-                          </p:cTn>
-                        </p:par>
-                      </p:childTnLst>
-                    </p:cTn>
-                  </p:par>
-                  <p:par>
-                    <p:cTn id="11" fill="hold">
-                      <p:stCondLst>
-                        <p:cond delay="indefinite"/>
-                      </p:stCondLst>
-                      <p:childTnLst>
-                        <p:par>
-                          <p:cTn id="12" fill="hold">
-                            <p:stCondLst>
-                              <p:cond delay="0"/>
-                            </p:stCondLst>
-                            <p:childTnLst>
-                              <p:par>
-                                <p:cTn id="13" presetID="1" presetClass="entr" presetSubtype="0" fill="hold" nodeType="clickEffect">
-                                  <p:stCondLst>
-                                    <p:cond delay="0"/>
-                                  </p:stCondLst>
-                                  <p:childTnLst>
-                                    <p:set>
-                                      <p:cBhvr>
-                                        <p:cTn id="14" dur="1" fill="hold">
-                                          <p:stCondLst>
-                                            <p:cond delay="0"/>
-                                          </p:stCondLst>
-                                        </p:cTn>
-                                        <p:tgtEl>
-                                          <p:spTgt spid="11">
-                                            <p:txEl>
-                                              <p:pRg st="1" end="1"/>
-                                            </p:txEl>
-                                          </p:spTgt>
-                                        </p:tgtEl>
-                                        <p:attrNameLst>
-                                          <p:attrName>style.visibility</p:attrName>
-                                        </p:attrNameLst>
-                                      </p:cBhvr>
-                                      <p:to>
-                                        <p:strVal val="visible"/>
-                                      </p:to>
-                                    </p:set>
-                                  </p:childTnLst>
-                                </p:cTn>
-                              </p:par>
-                            </p:childTnLst>
-                          </p:cTn>
-                        </p:par>
-                      </p:childTnLst>
-                    </p:cTn>
-                  </p:par>
-                  <p:par>
-                    <p:cTn id="15" fill="hold">
-                      <p:stCondLst>
-                        <p:cond delay="indefinite"/>
-                      </p:stCondLst>
-                      <p:childTnLst>
-                        <p:par>
-                          <p:cTn id="16" fill="hold">
-                            <p:stCondLst>
-                              <p:cond delay="0"/>
-                            </p:stCondLst>
-                            <p:childTnLst>
-                              <p:par>
-                                <p:cTn id="17" presetID="1" presetClass="entr" presetSubtype="0" fill="hold" nodeType="clickEffect">
-                                  <p:stCondLst>
-                                    <p:cond delay="0"/>
-                                  </p:stCondLst>
-                                  <p:childTnLst>
-                                    <p:set>
-                                      <p:cBhvr>
-                                        <p:cTn id="18" dur="1" fill="hold">
-                                          <p:stCondLst>
-                                            <p:cond delay="0"/>
-                                          </p:stCondLst>
-                                        </p:cTn>
-                                        <p:tgtEl>
-                                          <p:spTgt spid="11">
-                                            <p:txEl>
-                                              <p:pRg st="2" end="2"/>
-                                            </p:txEl>
-                                          </p:spTgt>
-                                        </p:tgtEl>
-                                        <p:attrNameLst>
-                                          <p:attrName>style.visibility</p:attrName>
-                                        </p:attrNameLst>
-                                      </p:cBhvr>
-                                      <p:to>
-                                        <p:strVal val="visible"/>
-                                      </p:to>
-                                    </p:set>
-                                  </p:childTnLst>
-                                </p:cTn>
-                              </p:par>
-                            </p:childTnLst>
-                          </p:cTn>
-                        </p:par>
-                      </p:childTnLst>
-                    </p:cTn>
-                  </p:par>
-                  <p:par>
-                    <p:cTn id="19" fill="hold">
-                      <p:stCondLst>
-                        <p:cond delay="indefinite"/>
-                      </p:stCondLst>
-                      <p:childTnLst>
-                        <p:par>
-                          <p:cTn id="20" fill="hold">
-                            <p:stCondLst>
-                              <p:cond delay="0"/>
-                            </p:stCondLst>
-                            <p:childTnLst>
-                              <p:par>
-                                <p:cTn id="21" presetID="1" presetClass="entr" presetSubtype="0" fill="hold" nodeType="clickEffect">
-                                  <p:stCondLst>
-                                    <p:cond delay="0"/>
-                                  </p:stCondLst>
-                                  <p:childTnLst>
-                                    <p:set>
-                                      <p:cBhvr>
-                                        <p:cTn id="22" dur="1" fill="hold">
-                                          <p:stCondLst>
-                                            <p:cond delay="0"/>
-                                          </p:stCondLst>
-                                        </p:cTn>
-                                        <p:tgtEl>
-                                          <p:spTgt spid="11">
-                                            <p:txEl>
-                                              <p:pRg st="3" end="3"/>
-                                            </p:txEl>
-                                          </p:spTgt>
-                                        </p:tgtEl>
-                                        <p:attrNameLst>
-                                          <p:attrName>style.visibility</p:attrName>
-                                        </p:attrNameLst>
-                                      </p:cBhvr>
-                                      <p:to>
-                                        <p:strVal val="visible"/>
-                                      </p:to>
-                                    </p:set>
-                                  </p:childTnLst>
-                                </p:cTn>
-                              </p:par>
-                            </p:childTnLst>
-                          </p:cTn>
-                        </p:par>
-                      </p:childTnLst>
-                    </p:cTn>
-                  </p:par>
                 </p:childTnLst>
               </p:cTn>
               <p:prevCondLst>
@@ -11248,153 +10429,6 @@
                       </p:childTnLst>
                     </p:cTn>
                   </p:par>
-                  <p:par>
-                    <p:cTn id="7" fill="hold">
-                      <p:stCondLst>
-                        <p:cond delay="indefinite"/>
-                      </p:stCondLst>
-                      <p:childTnLst>
-                        <p:par>
-                          <p:cTn id="8" fill="hold">
-                            <p:stCondLst>
-                              <p:cond delay="0"/>
-                            </p:stCondLst>
-                            <p:childTnLst>
-                              <p:par>
-                                <p:cTn id="9" presetID="1" presetClass="entr" presetSubtype="0" fill="hold" nodeType="clickEffect">
-                                  <p:stCondLst>
-                                    <p:cond delay="0"/>
-                                  </p:stCondLst>
-                                  <p:childTnLst>
-                                    <p:set>
-                                      <p:cBhvr>
-                                        <p:cTn id="10" dur="1" fill="hold">
-                                          <p:stCondLst>
-                                            <p:cond delay="0"/>
-                                          </p:stCondLst>
-                                        </p:cTn>
-                                        <p:tgtEl>
-                                          <p:spTgt spid="11">
-                                            <p:txEl>
-                                              <p:pRg st="0" end="0"/>
-                                            </p:txEl>
-                                          </p:spTgt>
-                                        </p:tgtEl>
-                                        <p:attrNameLst>
-                                          <p:attrName>style.visibility</p:attrName>
-                                        </p:attrNameLst>
-                                      </p:cBhvr>
-                                      <p:to>
-                                        <p:strVal val="visible"/>
-                                      </p:to>
-                                    </p:set>
-                                  </p:childTnLst>
-                                </p:cTn>
-                              </p:par>
-                            </p:childTnLst>
-                          </p:cTn>
-                        </p:par>
-                      </p:childTnLst>
-                    </p:cTn>
-                  </p:par>
-                  <p:par>
-                    <p:cTn id="11" fill="hold">
-                      <p:stCondLst>
-                        <p:cond delay="indefinite"/>
-                      </p:stCondLst>
-                      <p:childTnLst>
-                        <p:par>
-                          <p:cTn id="12" fill="hold">
-                            <p:stCondLst>
-                              <p:cond delay="0"/>
-                            </p:stCondLst>
-                            <p:childTnLst>
-                              <p:par>
-                                <p:cTn id="13" presetID="1" presetClass="entr" presetSubtype="0" fill="hold" nodeType="clickEffect">
-                                  <p:stCondLst>
-                                    <p:cond delay="0"/>
-                                  </p:stCondLst>
-                                  <p:childTnLst>
-                                    <p:set>
-                                      <p:cBhvr>
-                                        <p:cTn id="14" dur="1" fill="hold">
-                                          <p:stCondLst>
-                                            <p:cond delay="0"/>
-                                          </p:stCondLst>
-                                        </p:cTn>
-                                        <p:tgtEl>
-                                          <p:spTgt spid="11">
-                                            <p:txEl>
-                                              <p:pRg st="1" end="1"/>
-                                            </p:txEl>
-                                          </p:spTgt>
-                                        </p:tgtEl>
-                                        <p:attrNameLst>
-                                          <p:attrName>style.visibility</p:attrName>
-                                        </p:attrNameLst>
-                                      </p:cBhvr>
-                                      <p:to>
-                                        <p:strVal val="visible"/>
-                                      </p:to>
-                                    </p:set>
-                                  </p:childTnLst>
-                                </p:cTn>
-                              </p:par>
-                            </p:childTnLst>
-                          </p:cTn>
-                        </p:par>
-                      </p:childTnLst>
-                    </p:cTn>
-                  </p:par>
-                  <p:par>
-                    <p:cTn id="15" fill="hold">
-                      <p:stCondLst>
-                        <p:cond delay="indefinite"/>
-                      </p:stCondLst>
-                      <p:childTnLst>
-                        <p:par>
-                          <p:cTn id="16" fill="hold">
-                            <p:stCondLst>
-                              <p:cond delay="0"/>
-                            </p:stCondLst>
-                            <p:childTnLst>
-                              <p:par>
-                                <p:cTn id="17" presetID="1" presetClass="entr" presetSubtype="0" fill="hold" nodeType="clickEffect">
-                                  <p:stCondLst>
-                                    <p:cond delay="0"/>
-                                  </p:stCondLst>
-                                  <p:childTnLst>
-                                    <p:set>
-                                      <p:cBhvr>
-                                        <p:cTn id="18" dur="1" fill="hold">
-                                          <p:stCondLst>
-                                            <p:cond delay="0"/>
-                                          </p:stCondLst>
-                                        </p:cTn>
-                                        <p:tgtEl>
-                                          <p:spTgt spid="11">
-                                            <p:txEl>
-                                              <p:pRg st="2" end="2"/>
-                                            </p:txEl>
-                                          </p:spTgt>
-                                        </p:tgtEl>
-                                        <p:attrNameLst>
-                                          <p:attrName>style.visibility</p:attrName>
-                                        </p:attrNameLst>
-                                      </p:cBhvr>
-                                      <p:to>
-                                        <p:strVal val="visible"/>
-                                      </p:to>
-                                    </p:set>
-                                  </p:childTnLst>
-                                </p:cTn>
-                              </p:par>
-                            </p:childTnLst>
-                          </p:cTn>
-                        </p:par>
-                      </p:childTnLst>
-                    </p:cTn>
-                  </p:par>
                 </p:childTnLst>
               </p:cTn>
               <p:prevCondLst>
@@ -11831,153 +10865,6 @@
                                           <p:spTgt spid="6">
                                             <p:txEl>
                                               <p:pRg st="0" end="0"/>
-                                            </p:txEl>
-                                          </p:spTgt>
-                                        </p:tgtEl>
-                                        <p:attrNameLst>
-                                          <p:attrName>style.visibility</p:attrName>
-                                        </p:attrNameLst>
-                                      </p:cBhvr>
-                                      <p:to>
-                                        <p:strVal val="visible"/>
-                                      </p:to>
-                                    </p:set>
-                                  </p:childTnLst>
-                                </p:cTn>
-                              </p:par>
-                            </p:childTnLst>
-                          </p:cTn>
-                        </p:par>
-                      </p:childTnLst>
-                    </p:cTn>
-                  </p:par>
-                  <p:par>
-                    <p:cTn id="7" fill="hold">
-                      <p:stCondLst>
-                        <p:cond delay="indefinite"/>
-                      </p:stCondLst>
-                      <p:childTnLst>
-                        <p:par>
-                          <p:cTn id="8" fill="hold">
-                            <p:stCondLst>
-                              <p:cond delay="0"/>
-                            </p:stCondLst>
-                            <p:childTnLst>
-                              <p:par>
-                                <p:cTn id="9" presetID="1" presetClass="entr" presetSubtype="0" fill="hold" nodeType="clickEffect">
-                                  <p:stCondLst>
-                                    <p:cond delay="0"/>
-                                  </p:stCondLst>
-                                  <p:childTnLst>
-                                    <p:set>
-                                      <p:cBhvr>
-                                        <p:cTn id="10" dur="1" fill="hold">
-                                          <p:stCondLst>
-                                            <p:cond delay="0"/>
-                                          </p:stCondLst>
-                                        </p:cTn>
-                                        <p:tgtEl>
-                                          <p:spTgt spid="11">
-                                            <p:txEl>
-                                              <p:pRg st="0" end="0"/>
-                                            </p:txEl>
-                                          </p:spTgt>
-                                        </p:tgtEl>
-                                        <p:attrNameLst>
-                                          <p:attrName>style.visibility</p:attrName>
-                                        </p:attrNameLst>
-                                      </p:cBhvr>
-                                      <p:to>
-                                        <p:strVal val="visible"/>
-                                      </p:to>
-                                    </p:set>
-                                  </p:childTnLst>
-                                </p:cTn>
-                              </p:par>
-                            </p:childTnLst>
-                          </p:cTn>
-                        </p:par>
-                      </p:childTnLst>
-                    </p:cTn>
-                  </p:par>
-                  <p:par>
-                    <p:cTn id="11" fill="hold">
-                      <p:stCondLst>
-                        <p:cond delay="indefinite"/>
-                      </p:stCondLst>
-                      <p:childTnLst>
-                        <p:par>
-                          <p:cTn id="12" fill="hold">
-                            <p:stCondLst>
-                              <p:cond delay="0"/>
-                            </p:stCondLst>
-                            <p:childTnLst>
-                              <p:par>
-                                <p:cTn id="13" presetID="1" presetClass="entr" presetSubtype="0" fill="hold" nodeType="clickEffect">
-                                  <p:stCondLst>
-                                    <p:cond delay="0"/>
-                                  </p:stCondLst>
-                                  <p:childTnLst>
-                                    <p:set>
-                                      <p:cBhvr>
-                                        <p:cTn id="14" dur="1" fill="hold">
-                                          <p:stCondLst>
-                                            <p:cond delay="0"/>
-                                          </p:stCondLst>
-                                        </p:cTn>
-                                        <p:tgtEl>
-                                          <p:spTgt spid="11">
-                                            <p:txEl>
-                                              <p:pRg st="1" end="1"/>
-                                            </p:txEl>
-                                          </p:spTgt>
-                                        </p:tgtEl>
-                                        <p:attrNameLst>
-                                          <p:attrName>style.visibility</p:attrName>
-                                        </p:attrNameLst>
-                                      </p:cBhvr>
-                                      <p:to>
-                                        <p:strVal val="visible"/>
-                                      </p:to>
-                                    </p:set>
-                                  </p:childTnLst>
-                                </p:cTn>
-                              </p:par>
-                            </p:childTnLst>
-                          </p:cTn>
-                        </p:par>
-                      </p:childTnLst>
-                    </p:cTn>
-                  </p:par>
-                  <p:par>
-                    <p:cTn id="15" fill="hold">
-                      <p:stCondLst>
-                        <p:cond delay="indefinite"/>
-                      </p:stCondLst>
-                      <p:childTnLst>
-                        <p:par>
-                          <p:cTn id="16" fill="hold">
-                            <p:stCondLst>
-                              <p:cond delay="0"/>
-                            </p:stCondLst>
-                            <p:childTnLst>
-                              <p:par>
-                                <p:cTn id="17" presetID="1" presetClass="entr" presetSubtype="0" fill="hold" nodeType="clickEffect">
-                                  <p:stCondLst>
-                                    <p:cond delay="0"/>
-                                  </p:stCondLst>
-                                  <p:childTnLst>
-                                    <p:set>
-                                      <p:cBhvr>
-                                        <p:cTn id="18" dur="1" fill="hold">
-                                          <p:stCondLst>
-                                            <p:cond delay="0"/>
-                                          </p:stCondLst>
-                                        </p:cTn>
-                                        <p:tgtEl>
-                                          <p:spTgt spid="11">
-                                            <p:txEl>
-                                              <p:pRg st="2" end="2"/>
                                             </p:txEl>
                                           </p:spTgt>
                                         </p:tgtEl>
@@ -12436,251 +11323,6 @@
                                           <p:spTgt spid="6">
                                             <p:txEl>
                                               <p:pRg st="0" end="0"/>
-                                            </p:txEl>
-                                          </p:spTgt>
-                                        </p:tgtEl>
-                                        <p:attrNameLst>
-                                          <p:attrName>style.visibility</p:attrName>
-                                        </p:attrNameLst>
-                                      </p:cBhvr>
-                                      <p:to>
-                                        <p:strVal val="visible"/>
-                                      </p:to>
-                                    </p:set>
-                                  </p:childTnLst>
-                                </p:cTn>
-                              </p:par>
-                            </p:childTnLst>
-                          </p:cTn>
-                        </p:par>
-                      </p:childTnLst>
-                    </p:cTn>
-                  </p:par>
-                  <p:par>
-                    <p:cTn id="7" fill="hold">
-                      <p:stCondLst>
-                        <p:cond delay="indefinite"/>
-                      </p:stCondLst>
-                      <p:childTnLst>
-                        <p:par>
-                          <p:cTn id="8" fill="hold">
-                            <p:stCondLst>
-                              <p:cond delay="0"/>
-                            </p:stCondLst>
-                            <p:childTnLst>
-                              <p:par>
-                                <p:cTn id="9" presetID="1" presetClass="entr" presetSubtype="0" fill="hold" nodeType="clickEffect">
-                                  <p:stCondLst>
-                                    <p:cond delay="0"/>
-                                  </p:stCondLst>
-                                  <p:childTnLst>
-                                    <p:set>
-                                      <p:cBhvr>
-                                        <p:cTn id="10" dur="1" fill="hold">
-                                          <p:stCondLst>
-                                            <p:cond delay="0"/>
-                                          </p:stCondLst>
-                                        </p:cTn>
-                                        <p:tgtEl>
-                                          <p:spTgt spid="11">
-                                            <p:txEl>
-                                              <p:pRg st="0" end="0"/>
-                                            </p:txEl>
-                                          </p:spTgt>
-                                        </p:tgtEl>
-                                        <p:attrNameLst>
-                                          <p:attrName>style.visibility</p:attrName>
-                                        </p:attrNameLst>
-                                      </p:cBhvr>
-                                      <p:to>
-                                        <p:strVal val="visible"/>
-                                      </p:to>
-                                    </p:set>
-                                  </p:childTnLst>
-                                </p:cTn>
-                              </p:par>
-                            </p:childTnLst>
-                          </p:cTn>
-                        </p:par>
-                      </p:childTnLst>
-                    </p:cTn>
-                  </p:par>
-                  <p:par>
-                    <p:cTn id="11" fill="hold">
-                      <p:stCondLst>
-                        <p:cond delay="indefinite"/>
-                      </p:stCondLst>
-                      <p:childTnLst>
-                        <p:par>
-                          <p:cTn id="12" fill="hold">
-                            <p:stCondLst>
-                              <p:cond delay="0"/>
-                            </p:stCondLst>
-                            <p:childTnLst>
-                              <p:par>
-                                <p:cTn id="13" presetID="1" presetClass="entr" presetSubtype="0" fill="hold" nodeType="clickEffect">
-                                  <p:stCondLst>
-                                    <p:cond delay="0"/>
-                                  </p:stCondLst>
-                                  <p:childTnLst>
-                                    <p:set>
-                                      <p:cBhvr>
-                                        <p:cTn id="14" dur="1" fill="hold">
-                                          <p:stCondLst>
-                                            <p:cond delay="0"/>
-                                          </p:stCondLst>
-                                        </p:cTn>
-                                        <p:tgtEl>
-                                          <p:spTgt spid="11">
-                                            <p:txEl>
-                                              <p:pRg st="1" end="1"/>
-                                            </p:txEl>
-                                          </p:spTgt>
-                                        </p:tgtEl>
-                                        <p:attrNameLst>
-                                          <p:attrName>style.visibility</p:attrName>
-                                        </p:attrNameLst>
-                                      </p:cBhvr>
-                                      <p:to>
-                                        <p:strVal val="visible"/>
-                                      </p:to>
-                                    </p:set>
-                                  </p:childTnLst>
-                                </p:cTn>
-                              </p:par>
-                            </p:childTnLst>
-                          </p:cTn>
-                        </p:par>
-                      </p:childTnLst>
-                    </p:cTn>
-                  </p:par>
-                  <p:par>
-                    <p:cTn id="15" fill="hold">
-                      <p:stCondLst>
-                        <p:cond delay="indefinite"/>
-                      </p:stCondLst>
-                      <p:childTnLst>
-                        <p:par>
-                          <p:cTn id="16" fill="hold">
-                            <p:stCondLst>
-                              <p:cond delay="0"/>
-                            </p:stCondLst>
-                            <p:childTnLst>
-                              <p:par>
-                                <p:cTn id="17" presetID="1" presetClass="entr" presetSubtype="0" fill="hold" nodeType="clickEffect">
-                                  <p:stCondLst>
-                                    <p:cond delay="0"/>
-                                  </p:stCondLst>
-                                  <p:childTnLst>
-                                    <p:set>
-                                      <p:cBhvr>
-                                        <p:cTn id="18" dur="1" fill="hold">
-                                          <p:stCondLst>
-                                            <p:cond delay="0"/>
-                                          </p:stCondLst>
-                                        </p:cTn>
-                                        <p:tgtEl>
-                                          <p:spTgt spid="11">
-                                            <p:txEl>
-                                              <p:pRg st="2" end="2"/>
-                                            </p:txEl>
-                                          </p:spTgt>
-                                        </p:tgtEl>
-                                        <p:attrNameLst>
-                                          <p:attrName>style.visibility</p:attrName>
-                                        </p:attrNameLst>
-                                      </p:cBhvr>
-                                      <p:to>
-                                        <p:strVal val="visible"/>
-                                      </p:to>
-                                    </p:set>
-                                  </p:childTnLst>
-                                </p:cTn>
-                              </p:par>
-                            </p:childTnLst>
-                          </p:cTn>
-                        </p:par>
-                      </p:childTnLst>
-                    </p:cTn>
-                  </p:par>
-                  <p:par>
-                    <p:cTn id="19" fill="hold">
-                      <p:stCondLst>
-                        <p:cond delay="indefinite"/>
-                      </p:stCondLst>
-                      <p:childTnLst>
-                        <p:par>
-                          <p:cTn id="20" fill="hold">
-                            <p:stCondLst>
-                              <p:cond delay="0"/>
-                            </p:stCondLst>
-                            <p:childTnLst>
-                              <p:par>
-                                <p:cTn id="21" presetID="1" presetClass="entr" presetSubtype="0" fill="hold" nodeType="clickEffect">
-                                  <p:stCondLst>
-                                    <p:cond delay="0"/>
-                                  </p:stCondLst>
-                                  <p:childTnLst>
-                                    <p:set>
-                                      <p:cBhvr>
-                                        <p:cTn id="22" dur="1" fill="hold">
-                                          <p:stCondLst>
-                                            <p:cond delay="0"/>
-                                          </p:stCondLst>
-                                        </p:cTn>
-                                        <p:tgtEl>
-                                          <p:spTgt spid="11">
-                                            <p:txEl>
-                                              <p:pRg st="3" end="3"/>
-                                            </p:txEl>
-                                          </p:spTgt>
-                                        </p:tgtEl>
-                                        <p:attrNameLst>
-                                          <p:attrName>style.visibility</p:attrName>
-                                        </p:attrNameLst>
-                                      </p:cBhvr>
-                                      <p:to>
-                                        <p:strVal val="visible"/>
-                                      </p:to>
-                                    </p:set>
-                                  </p:childTnLst>
-                                </p:cTn>
-                              </p:par>
-                            </p:childTnLst>
-                          </p:cTn>
-                        </p:par>
-                      </p:childTnLst>
-                    </p:cTn>
-                  </p:par>
-                  <p:par>
-                    <p:cTn id="23" fill="hold">
-                      <p:stCondLst>
-                        <p:cond delay="indefinite"/>
-                      </p:stCondLst>
-                      <p:childTnLst>
-                        <p:par>
-                          <p:cTn id="24" fill="hold">
-                            <p:stCondLst>
-                              <p:cond delay="0"/>
-                            </p:stCondLst>
-                            <p:childTnLst>
-                              <p:par>
-                                <p:cTn id="25" presetID="1" presetClass="entr" presetSubtype="0" fill="hold" nodeType="clickEffect">
-                                  <p:stCondLst>
-                                    <p:cond delay="0"/>
-                                  </p:stCondLst>
-                                  <p:childTnLst>
-                                    <p:set>
-                                      <p:cBhvr>
-                                        <p:cTn id="26" dur="1" fill="hold">
-                                          <p:stCondLst>
-                                            <p:cond delay="0"/>
-                                          </p:stCondLst>
-                                        </p:cTn>
-                                        <p:tgtEl>
-                                          <p:spTgt spid="11">
-                                            <p:txEl>
-                                              <p:pRg st="4" end="4"/>
                                             </p:txEl>
                                           </p:spTgt>
                                         </p:tgtEl>
@@ -13565,104 +12207,6 @@
                       </p:childTnLst>
                     </p:cTn>
                   </p:par>
-                  <p:par>
-                    <p:cTn id="7" fill="hold">
-                      <p:stCondLst>
-                        <p:cond delay="indefinite"/>
-                      </p:stCondLst>
-                      <p:childTnLst>
-                        <p:par>
-                          <p:cTn id="8" fill="hold">
-                            <p:stCondLst>
-                              <p:cond delay="0"/>
-                            </p:stCondLst>
-                            <p:childTnLst>
-                              <p:par>
-                                <p:cTn id="9" presetID="1" presetClass="entr" presetSubtype="0" fill="hold" nodeType="clickEffect">
-                                  <p:stCondLst>
-                                    <p:cond delay="0"/>
-                                  </p:stCondLst>
-                                  <p:childTnLst>
-                                    <p:set>
-                                      <p:cBhvr>
-                                        <p:cTn id="10" dur="1" fill="hold">
-                                          <p:stCondLst>
-                                            <p:cond delay="0"/>
-                                          </p:stCondLst>
-                                        </p:cTn>
-                                        <p:tgtEl>
-                                          <p:spTgt spid="11">
-                                            <p:txEl>
-                                              <p:pRg st="0" end="0"/>
-                                            </p:txEl>
-                                          </p:spTgt>
-                                        </p:tgtEl>
-                                        <p:attrNameLst>
-                                          <p:attrName>style.visibility</p:attrName>
-                                        </p:attrNameLst>
-                                      </p:cBhvr>
-                                      <p:to>
-                                        <p:strVal val="visible"/>
-                                      </p:to>
-                                    </p:set>
-                                  </p:childTnLst>
-                                </p:cTn>
-                              </p:par>
-                            </p:childTnLst>
-                          </p:cTn>
-                        </p:par>
-                      </p:childTnLst>
-                    </p:cTn>
-                  </p:par>
-                  <p:par>
-                    <p:cTn id="11" fill="hold">
-                      <p:stCondLst>
-                        <p:cond delay="indefinite"/>
-                      </p:stCondLst>
-                      <p:childTnLst>
-                        <p:par>
-                          <p:cTn id="12" fill="hold">
-                            <p:stCondLst>
-                              <p:cond delay="0"/>
-                            </p:stCondLst>
-                            <p:childTnLst>
-                              <p:par>
-                                <p:cTn id="13" presetID="1" presetClass="entr" presetSubtype="0" fill="hold" nodeType="clickEffect">
-                                  <p:stCondLst>
-                                    <p:cond delay="0"/>
-                                  </p:stCondLst>
-                                  <p:childTnLst>
-                                    <p:set>
-                                      <p:cBhvr>
-                                        <p:cTn id="14" dur="1" fill="hold">
-                                          <p:stCondLst>
-                                            <p:cond delay="0"/>
-                                          </p:stCondLst>
-                                        </p:cTn>
-                                        <p:tgtEl>
-                                          <p:spTgt spid="11">
-                                            <p:txEl>
-                                              <p:pRg st="1" end="1"/>
-                                            </p:txEl>
-                                          </p:spTgt>
-                                        </p:tgtEl>
-                                        <p:attrNameLst>
-                                          <p:attrName>style.visibility</p:attrName>
-                                        </p:attrNameLst>
-                                      </p:cBhvr>
-                                      <p:to>
-                                        <p:strVal val="visible"/>
-                                      </p:to>
-                                    </p:set>
-                                  </p:childTnLst>
-                                </p:cTn>
-                              </p:par>
-                            </p:childTnLst>
-                          </p:cTn>
-                        </p:par>
-                      </p:childTnLst>
-                    </p:cTn>
-                  </p:par>
                 </p:childTnLst>
               </p:cTn>
               <p:prevCondLst>
@@ -14351,251 +12895,6 @@
                       </p:childTnLst>
                     </p:cTn>
                   </p:par>
-                  <p:par>
-                    <p:cTn id="7" fill="hold">
-                      <p:stCondLst>
-                        <p:cond delay="indefinite"/>
-                      </p:stCondLst>
-                      <p:childTnLst>
-                        <p:par>
-                          <p:cTn id="8" fill="hold">
-                            <p:stCondLst>
-                              <p:cond delay="0"/>
-                            </p:stCondLst>
-                            <p:childTnLst>
-                              <p:par>
-                                <p:cTn id="9" presetID="1" presetClass="entr" presetSubtype="0" fill="hold" nodeType="clickEffect">
-                                  <p:stCondLst>
-                                    <p:cond delay="0"/>
-                                  </p:stCondLst>
-                                  <p:childTnLst>
-                                    <p:set>
-                                      <p:cBhvr>
-                                        <p:cTn id="10" dur="1" fill="hold">
-                                          <p:stCondLst>
-                                            <p:cond delay="0"/>
-                                          </p:stCondLst>
-                                        </p:cTn>
-                                        <p:tgtEl>
-                                          <p:spTgt spid="4">
-                                            <p:txEl>
-                                              <p:pRg st="0" end="0"/>
-                                            </p:txEl>
-                                          </p:spTgt>
-                                        </p:tgtEl>
-                                        <p:attrNameLst>
-                                          <p:attrName>style.visibility</p:attrName>
-                                        </p:attrNameLst>
-                                      </p:cBhvr>
-                                      <p:to>
-                                        <p:strVal val="visible"/>
-                                      </p:to>
-                                    </p:set>
-                                  </p:childTnLst>
-                                </p:cTn>
-                              </p:par>
-                            </p:childTnLst>
-                          </p:cTn>
-                        </p:par>
-                      </p:childTnLst>
-                    </p:cTn>
-                  </p:par>
-                  <p:par>
-                    <p:cTn id="11" fill="hold">
-                      <p:stCondLst>
-                        <p:cond delay="indefinite"/>
-                      </p:stCondLst>
-                      <p:childTnLst>
-                        <p:par>
-                          <p:cTn id="12" fill="hold">
-                            <p:stCondLst>
-                              <p:cond delay="0"/>
-                            </p:stCondLst>
-                            <p:childTnLst>
-                              <p:par>
-                                <p:cTn id="13" presetID="1" presetClass="entr" presetSubtype="0" fill="hold" nodeType="clickEffect">
-                                  <p:stCondLst>
-                                    <p:cond delay="0"/>
-                                  </p:stCondLst>
-                                  <p:childTnLst>
-                                    <p:set>
-                                      <p:cBhvr>
-                                        <p:cTn id="14" dur="1" fill="hold">
-                                          <p:stCondLst>
-                                            <p:cond delay="0"/>
-                                          </p:stCondLst>
-                                        </p:cTn>
-                                        <p:tgtEl>
-                                          <p:spTgt spid="4">
-                                            <p:txEl>
-                                              <p:pRg st="1" end="1"/>
-                                            </p:txEl>
-                                          </p:spTgt>
-                                        </p:tgtEl>
-                                        <p:attrNameLst>
-                                          <p:attrName>style.visibility</p:attrName>
-                                        </p:attrNameLst>
-                                      </p:cBhvr>
-                                      <p:to>
-                                        <p:strVal val="visible"/>
-                                      </p:to>
-                                    </p:set>
-                                  </p:childTnLst>
-                                </p:cTn>
-                              </p:par>
-                            </p:childTnLst>
-                          </p:cTn>
-                        </p:par>
-                      </p:childTnLst>
-                    </p:cTn>
-                  </p:par>
-                  <p:par>
-                    <p:cTn id="15" fill="hold">
-                      <p:stCondLst>
-                        <p:cond delay="indefinite"/>
-                      </p:stCondLst>
-                      <p:childTnLst>
-                        <p:par>
-                          <p:cTn id="16" fill="hold">
-                            <p:stCondLst>
-                              <p:cond delay="0"/>
-                            </p:stCondLst>
-                            <p:childTnLst>
-                              <p:par>
-                                <p:cTn id="17" presetID="1" presetClass="entr" presetSubtype="0" fill="hold" nodeType="clickEffect">
-                                  <p:stCondLst>
-                                    <p:cond delay="0"/>
-                                  </p:stCondLst>
-                                  <p:childTnLst>
-                                    <p:set>
-                                      <p:cBhvr>
-                                        <p:cTn id="18" dur="1" fill="hold">
-                                          <p:stCondLst>
-                                            <p:cond delay="0"/>
-                                          </p:stCondLst>
-                                        </p:cTn>
-                                        <p:tgtEl>
-                                          <p:spTgt spid="4">
-                                            <p:txEl>
-                                              <p:pRg st="2" end="2"/>
-                                            </p:txEl>
-                                          </p:spTgt>
-                                        </p:tgtEl>
-                                        <p:attrNameLst>
-                                          <p:attrName>style.visibility</p:attrName>
-                                        </p:attrNameLst>
-                                      </p:cBhvr>
-                                      <p:to>
-                                        <p:strVal val="visible"/>
-                                      </p:to>
-                                    </p:set>
-                                  </p:childTnLst>
-                                </p:cTn>
-                              </p:par>
-                            </p:childTnLst>
-                          </p:cTn>
-                        </p:par>
-                      </p:childTnLst>
-                    </p:cTn>
-                  </p:par>
-                  <p:par>
-                    <p:cTn id="19" fill="hold">
-                      <p:stCondLst>
-                        <p:cond delay="indefinite"/>
-                      </p:stCondLst>
-                      <p:childTnLst>
-                        <p:par>
-                          <p:cTn id="20" fill="hold">
-                            <p:stCondLst>
-                              <p:cond delay="0"/>
-                            </p:stCondLst>
-                            <p:childTnLst>
-                              <p:par>
-                                <p:cTn id="21" presetID="1" presetClass="entr" presetSubtype="0" fill="hold" nodeType="clickEffect">
-                                  <p:stCondLst>
-                                    <p:cond delay="0"/>
-                                  </p:stCondLst>
-                                  <p:childTnLst>
-                                    <p:set>
-                                      <p:cBhvr>
-                                        <p:cTn id="22" dur="1" fill="hold">
-                                          <p:stCondLst>
-                                            <p:cond delay="0"/>
-                                          </p:stCondLst>
-                                        </p:cTn>
-                                        <p:tgtEl>
-                                          <p:spTgt spid="4">
-                                            <p:txEl>
-                                              <p:pRg st="3" end="3"/>
-                                            </p:txEl>
-                                          </p:spTgt>
-                                        </p:tgtEl>
-                                        <p:attrNameLst>
-                                          <p:attrName>style.visibility</p:attrName>
-                                        </p:attrNameLst>
-                                      </p:cBhvr>
-                                      <p:to>
-                                        <p:strVal val="visible"/>
-                                      </p:to>
-                                    </p:set>
-                                  </p:childTnLst>
-                                </p:cTn>
-                              </p:par>
-                            </p:childTnLst>
-                          </p:cTn>
-                        </p:par>
-                      </p:childTnLst>
-                    </p:cTn>
-                  </p:par>
-                  <p:par>
-                    <p:cTn id="23" fill="hold">
-                      <p:stCondLst>
-                        <p:cond delay="indefinite"/>
-                      </p:stCondLst>
-                      <p:childTnLst>
-                        <p:par>
-                          <p:cTn id="24" fill="hold">
-                            <p:stCondLst>
-                              <p:cond delay="0"/>
-                            </p:stCondLst>
-                            <p:childTnLst>
-                              <p:par>
-                                <p:cTn id="25" presetID="1" presetClass="entr" presetSubtype="0" fill="hold" nodeType="clickEffect">
-                                  <p:stCondLst>
-                                    <p:cond delay="0"/>
-                                  </p:stCondLst>
-                                  <p:childTnLst>
-                                    <p:set>
-                                      <p:cBhvr>
-                                        <p:cTn id="26" dur="1" fill="hold">
-                                          <p:stCondLst>
-                                            <p:cond delay="0"/>
-                                          </p:stCondLst>
-                                        </p:cTn>
-                                        <p:tgtEl>
-                                          <p:spTgt spid="4">
-                                            <p:txEl>
-                                              <p:pRg st="4" end="4"/>
-                                            </p:txEl>
-                                          </p:spTgt>
-                                        </p:tgtEl>
-                                        <p:attrNameLst>
-                                          <p:attrName>style.visibility</p:attrName>
-                                        </p:attrNameLst>
-                                      </p:cBhvr>
-                                      <p:to>
-                                        <p:strVal val="visible"/>
-                                      </p:to>
-                                    </p:set>
-                                  </p:childTnLst>
-                                </p:cTn>
-                              </p:par>
-                            </p:childTnLst>
-                          </p:cTn>
-                        </p:par>
-                      </p:childTnLst>
-                    </p:cTn>
-                  </p:par>
                 </p:childTnLst>
               </p:cTn>
               <p:prevCondLst>
@@ -15275,300 +13574,6 @@
                                           <p:spTgt spid="6">
                                             <p:txEl>
                                               <p:pRg st="0" end="0"/>
-                                            </p:txEl>
-                                          </p:spTgt>
-                                        </p:tgtEl>
-                                        <p:attrNameLst>
-                                          <p:attrName>style.visibility</p:attrName>
-                                        </p:attrNameLst>
-                                      </p:cBhvr>
-                                      <p:to>
-                                        <p:strVal val="visible"/>
-                                      </p:to>
-                                    </p:set>
-                                  </p:childTnLst>
-                                </p:cTn>
-                              </p:par>
-                            </p:childTnLst>
-                          </p:cTn>
-                        </p:par>
-                      </p:childTnLst>
-                    </p:cTn>
-                  </p:par>
-                  <p:par>
-                    <p:cTn id="7" fill="hold">
-                      <p:stCondLst>
-                        <p:cond delay="indefinite"/>
-                      </p:stCondLst>
-                      <p:childTnLst>
-                        <p:par>
-                          <p:cTn id="8" fill="hold">
-                            <p:stCondLst>
-                              <p:cond delay="0"/>
-                            </p:stCondLst>
-                            <p:childTnLst>
-                              <p:par>
-                                <p:cTn id="9" presetID="1" presetClass="entr" presetSubtype="0" fill="hold" nodeType="clickEffect">
-                                  <p:stCondLst>
-                                    <p:cond delay="0"/>
-                                  </p:stCondLst>
-                                  <p:childTnLst>
-                                    <p:set>
-                                      <p:cBhvr>
-                                        <p:cTn id="10" dur="1" fill="hold">
-                                          <p:stCondLst>
-                                            <p:cond delay="0"/>
-                                          </p:stCondLst>
-                                        </p:cTn>
-                                        <p:tgtEl>
-                                          <p:spTgt spid="9">
-                                            <p:txEl>
-                                              <p:pRg st="1" end="1"/>
-                                            </p:txEl>
-                                          </p:spTgt>
-                                        </p:tgtEl>
-                                        <p:attrNameLst>
-                                          <p:attrName>style.visibility</p:attrName>
-                                        </p:attrNameLst>
-                                      </p:cBhvr>
-                                      <p:to>
-                                        <p:strVal val="visible"/>
-                                      </p:to>
-                                    </p:set>
-                                  </p:childTnLst>
-                                </p:cTn>
-                              </p:par>
-                            </p:childTnLst>
-                          </p:cTn>
-                        </p:par>
-                      </p:childTnLst>
-                    </p:cTn>
-                  </p:par>
-                  <p:par>
-                    <p:cTn id="11" fill="hold">
-                      <p:stCondLst>
-                        <p:cond delay="indefinite"/>
-                      </p:stCondLst>
-                      <p:childTnLst>
-                        <p:par>
-                          <p:cTn id="12" fill="hold">
-                            <p:stCondLst>
-                              <p:cond delay="0"/>
-                            </p:stCondLst>
-                            <p:childTnLst>
-                              <p:par>
-                                <p:cTn id="13" presetID="1" presetClass="entr" presetSubtype="0" fill="hold" nodeType="clickEffect">
-                                  <p:stCondLst>
-                                    <p:cond delay="0"/>
-                                  </p:stCondLst>
-                                  <p:childTnLst>
-                                    <p:set>
-                                      <p:cBhvr>
-                                        <p:cTn id="14" dur="1" fill="hold">
-                                          <p:stCondLst>
-                                            <p:cond delay="0"/>
-                                          </p:stCondLst>
-                                        </p:cTn>
-                                        <p:tgtEl>
-                                          <p:spTgt spid="9">
-                                            <p:txEl>
-                                              <p:pRg st="0" end="0"/>
-                                            </p:txEl>
-                                          </p:spTgt>
-                                        </p:tgtEl>
-                                        <p:attrNameLst>
-                                          <p:attrName>style.visibility</p:attrName>
-                                        </p:attrNameLst>
-                                      </p:cBhvr>
-                                      <p:to>
-                                        <p:strVal val="visible"/>
-                                      </p:to>
-                                    </p:set>
-                                  </p:childTnLst>
-                                </p:cTn>
-                              </p:par>
-                            </p:childTnLst>
-                          </p:cTn>
-                        </p:par>
-                      </p:childTnLst>
-                    </p:cTn>
-                  </p:par>
-                  <p:par>
-                    <p:cTn id="15" fill="hold">
-                      <p:stCondLst>
-                        <p:cond delay="indefinite"/>
-                      </p:stCondLst>
-                      <p:childTnLst>
-                        <p:par>
-                          <p:cTn id="16" fill="hold">
-                            <p:stCondLst>
-                              <p:cond delay="0"/>
-                            </p:stCondLst>
-                            <p:childTnLst>
-                              <p:par>
-                                <p:cTn id="17" presetID="1" presetClass="entr" presetSubtype="0" fill="hold" nodeType="clickEffect">
-                                  <p:stCondLst>
-                                    <p:cond delay="0"/>
-                                  </p:stCondLst>
-                                  <p:childTnLst>
-                                    <p:set>
-                                      <p:cBhvr>
-                                        <p:cTn id="18" dur="1" fill="hold">
-                                          <p:stCondLst>
-                                            <p:cond delay="0"/>
-                                          </p:stCondLst>
-                                        </p:cTn>
-                                        <p:tgtEl>
-                                          <p:spTgt spid="9">
-                                            <p:txEl>
-                                              <p:pRg st="2" end="2"/>
-                                            </p:txEl>
-                                          </p:spTgt>
-                                        </p:tgtEl>
-                                        <p:attrNameLst>
-                                          <p:attrName>style.visibility</p:attrName>
-                                        </p:attrNameLst>
-                                      </p:cBhvr>
-                                      <p:to>
-                                        <p:strVal val="visible"/>
-                                      </p:to>
-                                    </p:set>
-                                  </p:childTnLst>
-                                </p:cTn>
-                              </p:par>
-                            </p:childTnLst>
-                          </p:cTn>
-                        </p:par>
-                      </p:childTnLst>
-                    </p:cTn>
-                  </p:par>
-                  <p:par>
-                    <p:cTn id="19" fill="hold">
-                      <p:stCondLst>
-                        <p:cond delay="indefinite"/>
-                      </p:stCondLst>
-                      <p:childTnLst>
-                        <p:par>
-                          <p:cTn id="20" fill="hold">
-                            <p:stCondLst>
-                              <p:cond delay="0"/>
-                            </p:stCondLst>
-                            <p:childTnLst>
-                              <p:par>
-                                <p:cTn id="21" presetID="1" presetClass="entr" presetSubtype="0" fill="hold" nodeType="clickEffect">
-                                  <p:stCondLst>
-                                    <p:cond delay="0"/>
-                                  </p:stCondLst>
-                                  <p:childTnLst>
-                                    <p:set>
-                                      <p:cBhvr>
-                                        <p:cTn id="22" dur="1" fill="hold">
-                                          <p:stCondLst>
-                                            <p:cond delay="0"/>
-                                          </p:stCondLst>
-                                        </p:cTn>
-                                        <p:tgtEl>
-                                          <p:spTgt spid="9">
-                                            <p:txEl>
-                                              <p:pRg st="3" end="3"/>
-                                            </p:txEl>
-                                          </p:spTgt>
-                                        </p:tgtEl>
-                                        <p:attrNameLst>
-                                          <p:attrName>style.visibility</p:attrName>
-                                        </p:attrNameLst>
-                                      </p:cBhvr>
-                                      <p:to>
-                                        <p:strVal val="visible"/>
-                                      </p:to>
-                                    </p:set>
-                                  </p:childTnLst>
-                                </p:cTn>
-                              </p:par>
-                            </p:childTnLst>
-                          </p:cTn>
-                        </p:par>
-                      </p:childTnLst>
-                    </p:cTn>
-                  </p:par>
-                  <p:par>
-                    <p:cTn id="23" fill="hold">
-                      <p:stCondLst>
-                        <p:cond delay="indefinite"/>
-                      </p:stCondLst>
-                      <p:childTnLst>
-                        <p:par>
-                          <p:cTn id="24" fill="hold">
-                            <p:stCondLst>
-                              <p:cond delay="0"/>
-                            </p:stCondLst>
-                            <p:childTnLst>
-                              <p:par>
-                                <p:cTn id="25" presetID="1" presetClass="entr" presetSubtype="0" fill="hold" nodeType="clickEffect">
-                                  <p:stCondLst>
-                                    <p:cond delay="0"/>
-                                  </p:stCondLst>
-                                  <p:childTnLst>
-                                    <p:set>
-                                      <p:cBhvr>
-                                        <p:cTn id="26" dur="1" fill="hold">
-                                          <p:stCondLst>
-                                            <p:cond delay="0"/>
-                                          </p:stCondLst>
-                                        </p:cTn>
-                                        <p:tgtEl>
-                                          <p:spTgt spid="9">
-                                            <p:txEl>
-                                              <p:pRg st="4" end="4"/>
-                                            </p:txEl>
-                                          </p:spTgt>
-                                        </p:tgtEl>
-                                        <p:attrNameLst>
-                                          <p:attrName>style.visibility</p:attrName>
-                                        </p:attrNameLst>
-                                      </p:cBhvr>
-                                      <p:to>
-                                        <p:strVal val="visible"/>
-                                      </p:to>
-                                    </p:set>
-                                  </p:childTnLst>
-                                </p:cTn>
-                              </p:par>
-                            </p:childTnLst>
-                          </p:cTn>
-                        </p:par>
-                      </p:childTnLst>
-                    </p:cTn>
-                  </p:par>
-                  <p:par>
-                    <p:cTn id="27" fill="hold">
-                      <p:stCondLst>
-                        <p:cond delay="indefinite"/>
-                      </p:stCondLst>
-                      <p:childTnLst>
-                        <p:par>
-                          <p:cTn id="28" fill="hold">
-                            <p:stCondLst>
-                              <p:cond delay="0"/>
-                            </p:stCondLst>
-                            <p:childTnLst>
-                              <p:par>
-                                <p:cTn id="29" presetID="1" presetClass="entr" presetSubtype="0" fill="hold" nodeType="clickEffect">
-                                  <p:stCondLst>
-                                    <p:cond delay="0"/>
-                                  </p:stCondLst>
-                                  <p:childTnLst>
-                                    <p:set>
-                                      <p:cBhvr>
-                                        <p:cTn id="30" dur="1" fill="hold">
-                                          <p:stCondLst>
-                                            <p:cond delay="0"/>
-                                          </p:stCondLst>
-                                        </p:cTn>
-                                        <p:tgtEl>
-                                          <p:spTgt spid="9">
-                                            <p:txEl>
-                                              <p:pRg st="5" end="5"/>
                                             </p:txEl>
                                           </p:spTgt>
                                         </p:tgtEl>
@@ -18556,575 +16561,6 @@
   <p:clrMapOvr>
     <a:masterClrMapping/>
   </p:clrMapOvr>
-  <p:timing>
-    <p:tnLst>
-      <p:par>
-        <p:cTn id="1" dur="indefinite" restart="never" nodeType="tmRoot">
-          <p:childTnLst>
-            <p:seq concurrent="1" nextAc="seek">
-              <p:cTn id="2" dur="indefinite" nodeType="mainSeq">
-                <p:childTnLst>
-                  <p:par>
-                    <p:cTn id="3" fill="hold">
-                      <p:stCondLst>
-                        <p:cond delay="indefinite"/>
-                      </p:stCondLst>
-                      <p:childTnLst>
-                        <p:par>
-                          <p:cTn id="4" fill="hold">
-                            <p:stCondLst>
-                              <p:cond delay="0"/>
-                            </p:stCondLst>
-                            <p:childTnLst>
-                              <p:par>
-                                <p:cTn id="5" presetID="1" presetClass="entr" presetSubtype="0" fill="hold" nodeType="clickEffect">
-                                  <p:stCondLst>
-                                    <p:cond delay="0"/>
-                                  </p:stCondLst>
-                                  <p:childTnLst>
-                                    <p:set>
-                                      <p:cBhvr>
-                                        <p:cTn id="6" dur="1" fill="hold">
-                                          <p:stCondLst>
-                                            <p:cond delay="0"/>
-                                          </p:stCondLst>
-                                        </p:cTn>
-                                        <p:tgtEl>
-                                          <p:spTgt spid="7">
-                                            <p:txEl>
-                                              <p:pRg st="0" end="0"/>
-                                            </p:txEl>
-                                          </p:spTgt>
-                                        </p:tgtEl>
-                                        <p:attrNameLst>
-                                          <p:attrName>style.visibility</p:attrName>
-                                        </p:attrNameLst>
-                                      </p:cBhvr>
-                                      <p:to>
-                                        <p:strVal val="visible"/>
-                                      </p:to>
-                                    </p:set>
-                                  </p:childTnLst>
-                                </p:cTn>
-                              </p:par>
-                            </p:childTnLst>
-                          </p:cTn>
-                        </p:par>
-                      </p:childTnLst>
-                    </p:cTn>
-                  </p:par>
-                  <p:par>
-                    <p:cTn id="7" fill="hold">
-                      <p:stCondLst>
-                        <p:cond delay="indefinite"/>
-                      </p:stCondLst>
-                      <p:childTnLst>
-                        <p:par>
-                          <p:cTn id="8" fill="hold">
-                            <p:stCondLst>
-                              <p:cond delay="0"/>
-                            </p:stCondLst>
-                            <p:childTnLst>
-                              <p:par>
-                                <p:cTn id="9" presetID="1" presetClass="entr" presetSubtype="0" fill="hold" nodeType="clickEffect">
-                                  <p:stCondLst>
-                                    <p:cond delay="0"/>
-                                  </p:stCondLst>
-                                  <p:childTnLst>
-                                    <p:set>
-                                      <p:cBhvr>
-                                        <p:cTn id="10" dur="1" fill="hold">
-                                          <p:stCondLst>
-                                            <p:cond delay="0"/>
-                                          </p:stCondLst>
-                                        </p:cTn>
-                                        <p:tgtEl>
-                                          <p:spTgt spid="7">
-                                            <p:txEl>
-                                              <p:pRg st="1" end="1"/>
-                                            </p:txEl>
-                                          </p:spTgt>
-                                        </p:tgtEl>
-                                        <p:attrNameLst>
-                                          <p:attrName>style.visibility</p:attrName>
-                                        </p:attrNameLst>
-                                      </p:cBhvr>
-                                      <p:to>
-                                        <p:strVal val="visible"/>
-                                      </p:to>
-                                    </p:set>
-                                  </p:childTnLst>
-                                </p:cTn>
-                              </p:par>
-                            </p:childTnLst>
-                          </p:cTn>
-                        </p:par>
-                      </p:childTnLst>
-                    </p:cTn>
-                  </p:par>
-                  <p:par>
-                    <p:cTn id="11" fill="hold">
-                      <p:stCondLst>
-                        <p:cond delay="indefinite"/>
-                      </p:stCondLst>
-                      <p:childTnLst>
-                        <p:par>
-                          <p:cTn id="12" fill="hold">
-                            <p:stCondLst>
-                              <p:cond delay="0"/>
-                            </p:stCondLst>
-                            <p:childTnLst>
-                              <p:par>
-                                <p:cTn id="13" presetID="1" presetClass="entr" presetSubtype="0" fill="hold" nodeType="clickEffect">
-                                  <p:stCondLst>
-                                    <p:cond delay="0"/>
-                                  </p:stCondLst>
-                                  <p:childTnLst>
-                                    <p:set>
-                                      <p:cBhvr>
-                                        <p:cTn id="14" dur="1" fill="hold">
-                                          <p:stCondLst>
-                                            <p:cond delay="0"/>
-                                          </p:stCondLst>
-                                        </p:cTn>
-                                        <p:tgtEl>
-                                          <p:spTgt spid="7">
-                                            <p:txEl>
-                                              <p:pRg st="2" end="2"/>
-                                            </p:txEl>
-                                          </p:spTgt>
-                                        </p:tgtEl>
-                                        <p:attrNameLst>
-                                          <p:attrName>style.visibility</p:attrName>
-                                        </p:attrNameLst>
-                                      </p:cBhvr>
-                                      <p:to>
-                                        <p:strVal val="visible"/>
-                                      </p:to>
-                                    </p:set>
-                                  </p:childTnLst>
-                                </p:cTn>
-                              </p:par>
-                            </p:childTnLst>
-                          </p:cTn>
-                        </p:par>
-                      </p:childTnLst>
-                    </p:cTn>
-                  </p:par>
-                  <p:par>
-                    <p:cTn id="15" fill="hold">
-                      <p:stCondLst>
-                        <p:cond delay="indefinite"/>
-                      </p:stCondLst>
-                      <p:childTnLst>
-                        <p:par>
-                          <p:cTn id="16" fill="hold">
-                            <p:stCondLst>
-                              <p:cond delay="0"/>
-                            </p:stCondLst>
-                            <p:childTnLst>
-                              <p:par>
-                                <p:cTn id="17" presetID="1" presetClass="entr" presetSubtype="0" fill="hold" nodeType="clickEffect">
-                                  <p:stCondLst>
-                                    <p:cond delay="0"/>
-                                  </p:stCondLst>
-                                  <p:childTnLst>
-                                    <p:set>
-                                      <p:cBhvr>
-                                        <p:cTn id="18" dur="1" fill="hold">
-                                          <p:stCondLst>
-                                            <p:cond delay="0"/>
-                                          </p:stCondLst>
-                                        </p:cTn>
-                                        <p:tgtEl>
-                                          <p:spTgt spid="7">
-                                            <p:txEl>
-                                              <p:pRg st="3" end="3"/>
-                                            </p:txEl>
-                                          </p:spTgt>
-                                        </p:tgtEl>
-                                        <p:attrNameLst>
-                                          <p:attrName>style.visibility</p:attrName>
-                                        </p:attrNameLst>
-                                      </p:cBhvr>
-                                      <p:to>
-                                        <p:strVal val="visible"/>
-                                      </p:to>
-                                    </p:set>
-                                  </p:childTnLst>
-                                </p:cTn>
-                              </p:par>
-                            </p:childTnLst>
-                          </p:cTn>
-                        </p:par>
-                      </p:childTnLst>
-                    </p:cTn>
-                  </p:par>
-                  <p:par>
-                    <p:cTn id="19" fill="hold">
-                      <p:stCondLst>
-                        <p:cond delay="indefinite"/>
-                      </p:stCondLst>
-                      <p:childTnLst>
-                        <p:par>
-                          <p:cTn id="20" fill="hold">
-                            <p:stCondLst>
-                              <p:cond delay="0"/>
-                            </p:stCondLst>
-                            <p:childTnLst>
-                              <p:par>
-                                <p:cTn id="21" presetID="1" presetClass="entr" presetSubtype="0" fill="hold" nodeType="clickEffect">
-                                  <p:stCondLst>
-                                    <p:cond delay="0"/>
-                                  </p:stCondLst>
-                                  <p:childTnLst>
-                                    <p:set>
-                                      <p:cBhvr>
-                                        <p:cTn id="22" dur="1" fill="hold">
-                                          <p:stCondLst>
-                                            <p:cond delay="0"/>
-                                          </p:stCondLst>
-                                        </p:cTn>
-                                        <p:tgtEl>
-                                          <p:spTgt spid="7">
-                                            <p:txEl>
-                                              <p:pRg st="4" end="4"/>
-                                            </p:txEl>
-                                          </p:spTgt>
-                                        </p:tgtEl>
-                                        <p:attrNameLst>
-                                          <p:attrName>style.visibility</p:attrName>
-                                        </p:attrNameLst>
-                                      </p:cBhvr>
-                                      <p:to>
-                                        <p:strVal val="visible"/>
-                                      </p:to>
-                                    </p:set>
-                                  </p:childTnLst>
-                                </p:cTn>
-                              </p:par>
-                            </p:childTnLst>
-                          </p:cTn>
-                        </p:par>
-                      </p:childTnLst>
-                    </p:cTn>
-                  </p:par>
-                  <p:par>
-                    <p:cTn id="23" fill="hold">
-                      <p:stCondLst>
-                        <p:cond delay="indefinite"/>
-                      </p:stCondLst>
-                      <p:childTnLst>
-                        <p:par>
-                          <p:cTn id="24" fill="hold">
-                            <p:stCondLst>
-                              <p:cond delay="0"/>
-                            </p:stCondLst>
-                            <p:childTnLst>
-                              <p:par>
-                                <p:cTn id="25" presetID="1" presetClass="entr" presetSubtype="0" fill="hold" nodeType="clickEffect">
-                                  <p:stCondLst>
-                                    <p:cond delay="0"/>
-                                  </p:stCondLst>
-                                  <p:childTnLst>
-                                    <p:set>
-                                      <p:cBhvr>
-                                        <p:cTn id="26" dur="1" fill="hold">
-                                          <p:stCondLst>
-                                            <p:cond delay="0"/>
-                                          </p:stCondLst>
-                                        </p:cTn>
-                                        <p:tgtEl>
-                                          <p:spTgt spid="7">
-                                            <p:txEl>
-                                              <p:pRg st="5" end="5"/>
-                                            </p:txEl>
-                                          </p:spTgt>
-                                        </p:tgtEl>
-                                        <p:attrNameLst>
-                                          <p:attrName>style.visibility</p:attrName>
-                                        </p:attrNameLst>
-                                      </p:cBhvr>
-                                      <p:to>
-                                        <p:strVal val="visible"/>
-                                      </p:to>
-                                    </p:set>
-                                  </p:childTnLst>
-                                </p:cTn>
-                              </p:par>
-                            </p:childTnLst>
-                          </p:cTn>
-                        </p:par>
-                      </p:childTnLst>
-                    </p:cTn>
-                  </p:par>
-                  <p:par>
-                    <p:cTn id="27" fill="hold">
-                      <p:stCondLst>
-                        <p:cond delay="indefinite"/>
-                      </p:stCondLst>
-                      <p:childTnLst>
-                        <p:par>
-                          <p:cTn id="28" fill="hold">
-                            <p:stCondLst>
-                              <p:cond delay="0"/>
-                            </p:stCondLst>
-                            <p:childTnLst>
-                              <p:par>
-                                <p:cTn id="29" presetID="1" presetClass="entr" presetSubtype="0" fill="hold" nodeType="clickEffect">
-                                  <p:stCondLst>
-                                    <p:cond delay="0"/>
-                                  </p:stCondLst>
-                                  <p:childTnLst>
-                                    <p:set>
-                                      <p:cBhvr>
-                                        <p:cTn id="30" dur="1" fill="hold">
-                                          <p:stCondLst>
-                                            <p:cond delay="0"/>
-                                          </p:stCondLst>
-                                        </p:cTn>
-                                        <p:tgtEl>
-                                          <p:spTgt spid="7">
-                                            <p:txEl>
-                                              <p:pRg st="6" end="6"/>
-                                            </p:txEl>
-                                          </p:spTgt>
-                                        </p:tgtEl>
-                                        <p:attrNameLst>
-                                          <p:attrName>style.visibility</p:attrName>
-                                        </p:attrNameLst>
-                                      </p:cBhvr>
-                                      <p:to>
-                                        <p:strVal val="visible"/>
-                                      </p:to>
-                                    </p:set>
-                                  </p:childTnLst>
-                                </p:cTn>
-                              </p:par>
-                            </p:childTnLst>
-                          </p:cTn>
-                        </p:par>
-                      </p:childTnLst>
-                    </p:cTn>
-                  </p:par>
-                  <p:par>
-                    <p:cTn id="31" fill="hold">
-                      <p:stCondLst>
-                        <p:cond delay="indefinite"/>
-                      </p:stCondLst>
-                      <p:childTnLst>
-                        <p:par>
-                          <p:cTn id="32" fill="hold">
-                            <p:stCondLst>
-                              <p:cond delay="0"/>
-                            </p:stCondLst>
-                            <p:childTnLst>
-                              <p:par>
-                                <p:cTn id="33" presetID="1" presetClass="entr" presetSubtype="0" fill="hold" nodeType="clickEffect">
-                                  <p:stCondLst>
-                                    <p:cond delay="0"/>
-                                  </p:stCondLst>
-                                  <p:childTnLst>
-                                    <p:set>
-                                      <p:cBhvr>
-                                        <p:cTn id="34" dur="1" fill="hold">
-                                          <p:stCondLst>
-                                            <p:cond delay="0"/>
-                                          </p:stCondLst>
-                                        </p:cTn>
-                                        <p:tgtEl>
-                                          <p:spTgt spid="7">
-                                            <p:txEl>
-                                              <p:pRg st="7" end="7"/>
-                                            </p:txEl>
-                                          </p:spTgt>
-                                        </p:tgtEl>
-                                        <p:attrNameLst>
-                                          <p:attrName>style.visibility</p:attrName>
-                                        </p:attrNameLst>
-                                      </p:cBhvr>
-                                      <p:to>
-                                        <p:strVal val="visible"/>
-                                      </p:to>
-                                    </p:set>
-                                  </p:childTnLst>
-                                </p:cTn>
-                              </p:par>
-                            </p:childTnLst>
-                          </p:cTn>
-                        </p:par>
-                      </p:childTnLst>
-                    </p:cTn>
-                  </p:par>
-                  <p:par>
-                    <p:cTn id="35" fill="hold">
-                      <p:stCondLst>
-                        <p:cond delay="indefinite"/>
-                      </p:stCondLst>
-                      <p:childTnLst>
-                        <p:par>
-                          <p:cTn id="36" fill="hold">
-                            <p:stCondLst>
-                              <p:cond delay="0"/>
-                            </p:stCondLst>
-                            <p:childTnLst>
-                              <p:par>
-                                <p:cTn id="37" presetID="1" presetClass="entr" presetSubtype="0" fill="hold" nodeType="clickEffect">
-                                  <p:stCondLst>
-                                    <p:cond delay="0"/>
-                                  </p:stCondLst>
-                                  <p:childTnLst>
-                                    <p:set>
-                                      <p:cBhvr>
-                                        <p:cTn id="38" dur="1" fill="hold">
-                                          <p:stCondLst>
-                                            <p:cond delay="0"/>
-                                          </p:stCondLst>
-                                        </p:cTn>
-                                        <p:tgtEl>
-                                          <p:spTgt spid="7">
-                                            <p:txEl>
-                                              <p:pRg st="8" end="8"/>
-                                            </p:txEl>
-                                          </p:spTgt>
-                                        </p:tgtEl>
-                                        <p:attrNameLst>
-                                          <p:attrName>style.visibility</p:attrName>
-                                        </p:attrNameLst>
-                                      </p:cBhvr>
-                                      <p:to>
-                                        <p:strVal val="visible"/>
-                                      </p:to>
-                                    </p:set>
-                                  </p:childTnLst>
-                                </p:cTn>
-                              </p:par>
-                            </p:childTnLst>
-                          </p:cTn>
-                        </p:par>
-                      </p:childTnLst>
-                    </p:cTn>
-                  </p:par>
-                  <p:par>
-                    <p:cTn id="39" fill="hold">
-                      <p:stCondLst>
-                        <p:cond delay="indefinite"/>
-                      </p:stCondLst>
-                      <p:childTnLst>
-                        <p:par>
-                          <p:cTn id="40" fill="hold">
-                            <p:stCondLst>
-                              <p:cond delay="0"/>
-                            </p:stCondLst>
-                            <p:childTnLst>
-                              <p:par>
-                                <p:cTn id="41" presetID="1" presetClass="entr" presetSubtype="0" fill="hold" nodeType="clickEffect">
-                                  <p:stCondLst>
-                                    <p:cond delay="0"/>
-                                  </p:stCondLst>
-                                  <p:childTnLst>
-                                    <p:set>
-                                      <p:cBhvr>
-                                        <p:cTn id="42" dur="1" fill="hold">
-                                          <p:stCondLst>
-                                            <p:cond delay="0"/>
-                                          </p:stCondLst>
-                                        </p:cTn>
-                                        <p:tgtEl>
-                                          <p:spTgt spid="7">
-                                            <p:txEl>
-                                              <p:pRg st="9" end="9"/>
-                                            </p:txEl>
-                                          </p:spTgt>
-                                        </p:tgtEl>
-                                        <p:attrNameLst>
-                                          <p:attrName>style.visibility</p:attrName>
-                                        </p:attrNameLst>
-                                      </p:cBhvr>
-                                      <p:to>
-                                        <p:strVal val="visible"/>
-                                      </p:to>
-                                    </p:set>
-                                  </p:childTnLst>
-                                </p:cTn>
-                              </p:par>
-                            </p:childTnLst>
-                          </p:cTn>
-                        </p:par>
-                      </p:childTnLst>
-                    </p:cTn>
-                  </p:par>
-                  <p:par>
-                    <p:cTn id="43" fill="hold">
-                      <p:stCondLst>
-                        <p:cond delay="indefinite"/>
-                      </p:stCondLst>
-                      <p:childTnLst>
-                        <p:par>
-                          <p:cTn id="44" fill="hold">
-                            <p:stCondLst>
-                              <p:cond delay="0"/>
-                            </p:stCondLst>
-                            <p:childTnLst>
-                              <p:par>
-                                <p:cTn id="45" presetID="1" presetClass="entr" presetSubtype="0" fill="hold" nodeType="clickEffect">
-                                  <p:stCondLst>
-                                    <p:cond delay="0"/>
-                                  </p:stCondLst>
-                                  <p:childTnLst>
-                                    <p:set>
-                                      <p:cBhvr>
-                                        <p:cTn id="46" dur="1" fill="hold">
-                                          <p:stCondLst>
-                                            <p:cond delay="0"/>
-                                          </p:stCondLst>
-                                        </p:cTn>
-                                        <p:tgtEl>
-                                          <p:spTgt spid="7">
-                                            <p:txEl>
-                                              <p:pRg st="10" end="10"/>
-                                            </p:txEl>
-                                          </p:spTgt>
-                                        </p:tgtEl>
-                                        <p:attrNameLst>
-                                          <p:attrName>style.visibility</p:attrName>
-                                        </p:attrNameLst>
-                                      </p:cBhvr>
-                                      <p:to>
-                                        <p:strVal val="visible"/>
-                                      </p:to>
-                                    </p:set>
-                                  </p:childTnLst>
-                                </p:cTn>
-                              </p:par>
-                            </p:childTnLst>
-                          </p:cTn>
-                        </p:par>
-                      </p:childTnLst>
-                    </p:cTn>
-                  </p:par>
-                </p:childTnLst>
-              </p:cTn>
-              <p:prevCondLst>
-                <p:cond evt="onPrev" delay="0">
-                  <p:tgtEl>
-                    <p:sldTgt/>
-                  </p:tgtEl>
-                </p:cond>
-              </p:prevCondLst>
-              <p:nextCondLst>
-                <p:cond evt="onNext" delay="0">
-                  <p:tgtEl>
-                    <p:sldTgt/>
-                  </p:tgtEl>
-                </p:cond>
-              </p:nextCondLst>
-            </p:seq>
-          </p:childTnLst>
-        </p:cTn>
-      </p:par>
-    </p:tnLst>
-  </p:timing>
 </p:sld>
 </file>
 
@@ -19276,183 +16712,6 @@
   <p:clrMapOvr>
     <a:masterClrMapping/>
   </p:clrMapOvr>
-  <p:timing>
-    <p:tnLst>
-      <p:par>
-        <p:cTn id="1" dur="indefinite" restart="never" nodeType="tmRoot">
-          <p:childTnLst>
-            <p:seq concurrent="1" nextAc="seek">
-              <p:cTn id="2" dur="indefinite" nodeType="mainSeq">
-                <p:childTnLst>
-                  <p:par>
-                    <p:cTn id="3" fill="hold">
-                      <p:stCondLst>
-                        <p:cond delay="indefinite"/>
-                      </p:stCondLst>
-                      <p:childTnLst>
-                        <p:par>
-                          <p:cTn id="4" fill="hold">
-                            <p:stCondLst>
-                              <p:cond delay="0"/>
-                            </p:stCondLst>
-                            <p:childTnLst>
-                              <p:par>
-                                <p:cTn id="5" presetID="1" presetClass="entr" presetSubtype="0" fill="hold" nodeType="clickEffect">
-                                  <p:stCondLst>
-                                    <p:cond delay="0"/>
-                                  </p:stCondLst>
-                                  <p:childTnLst>
-                                    <p:set>
-                                      <p:cBhvr>
-                                        <p:cTn id="6" dur="1" fill="hold">
-                                          <p:stCondLst>
-                                            <p:cond delay="0"/>
-                                          </p:stCondLst>
-                                        </p:cTn>
-                                        <p:tgtEl>
-                                          <p:spTgt spid="8">
-                                            <p:txEl>
-                                              <p:pRg st="0" end="0"/>
-                                            </p:txEl>
-                                          </p:spTgt>
-                                        </p:tgtEl>
-                                        <p:attrNameLst>
-                                          <p:attrName>style.visibility</p:attrName>
-                                        </p:attrNameLst>
-                                      </p:cBhvr>
-                                      <p:to>
-                                        <p:strVal val="visible"/>
-                                      </p:to>
-                                    </p:set>
-                                  </p:childTnLst>
-                                </p:cTn>
-                              </p:par>
-                            </p:childTnLst>
-                          </p:cTn>
-                        </p:par>
-                      </p:childTnLst>
-                    </p:cTn>
-                  </p:par>
-                  <p:par>
-                    <p:cTn id="7" fill="hold">
-                      <p:stCondLst>
-                        <p:cond delay="indefinite"/>
-                      </p:stCondLst>
-                      <p:childTnLst>
-                        <p:par>
-                          <p:cTn id="8" fill="hold">
-                            <p:stCondLst>
-                              <p:cond delay="0"/>
-                            </p:stCondLst>
-                            <p:childTnLst>
-                              <p:par>
-                                <p:cTn id="9" presetID="1" presetClass="entr" presetSubtype="0" fill="hold" nodeType="clickEffect">
-                                  <p:stCondLst>
-                                    <p:cond delay="0"/>
-                                  </p:stCondLst>
-                                  <p:childTnLst>
-                                    <p:set>
-                                      <p:cBhvr>
-                                        <p:cTn id="10" dur="1" fill="hold">
-                                          <p:stCondLst>
-                                            <p:cond delay="0"/>
-                                          </p:stCondLst>
-                                        </p:cTn>
-                                        <p:tgtEl>
-                                          <p:spTgt spid="8">
-                                            <p:txEl>
-                                              <p:pRg st="1" end="1"/>
-                                            </p:txEl>
-                                          </p:spTgt>
-                                        </p:tgtEl>
-                                        <p:attrNameLst>
-                                          <p:attrName>style.visibility</p:attrName>
-                                        </p:attrNameLst>
-                                      </p:cBhvr>
-                                      <p:to>
-                                        <p:strVal val="visible"/>
-                                      </p:to>
-                                    </p:set>
-                                  </p:childTnLst>
-                                </p:cTn>
-                              </p:par>
-                            </p:childTnLst>
-                          </p:cTn>
-                        </p:par>
-                      </p:childTnLst>
-                    </p:cTn>
-                  </p:par>
-                  <p:par>
-                    <p:cTn id="11" fill="hold">
-                      <p:stCondLst>
-                        <p:cond delay="indefinite"/>
-                      </p:stCondLst>
-                      <p:childTnLst>
-                        <p:par>
-                          <p:cTn id="12" fill="hold">
-                            <p:stCondLst>
-                              <p:cond delay="0"/>
-                            </p:stCondLst>
-                            <p:childTnLst>
-                              <p:par>
-                                <p:cTn id="13" presetID="1" presetClass="entr" presetSubtype="0" fill="hold" nodeType="clickEffect">
-                                  <p:stCondLst>
-                                    <p:cond delay="0"/>
-                                  </p:stCondLst>
-                                  <p:childTnLst>
-                                    <p:set>
-                                      <p:cBhvr>
-                                        <p:cTn id="14" dur="1" fill="hold">
-                                          <p:stCondLst>
-                                            <p:cond delay="0"/>
-                                          </p:stCondLst>
-                                        </p:cTn>
-                                        <p:tgtEl>
-                                          <p:spTgt spid="8">
-                                            <p:txEl>
-                                              <p:pRg st="2" end="2"/>
-                                            </p:txEl>
-                                          </p:spTgt>
-                                        </p:tgtEl>
-                                        <p:attrNameLst>
-                                          <p:attrName>style.visibility</p:attrName>
-                                        </p:attrNameLst>
-                                      </p:cBhvr>
-                                      <p:to>
-                                        <p:strVal val="visible"/>
-                                      </p:to>
-                                    </p:set>
-                                  </p:childTnLst>
-                                </p:cTn>
-                              </p:par>
-                            </p:childTnLst>
-                          </p:cTn>
-                        </p:par>
-                      </p:childTnLst>
-                    </p:cTn>
-                  </p:par>
-                </p:childTnLst>
-              </p:cTn>
-              <p:prevCondLst>
-                <p:cond evt="onPrev" delay="0">
-                  <p:tgtEl>
-                    <p:sldTgt/>
-                  </p:tgtEl>
-                </p:cond>
-              </p:prevCondLst>
-              <p:nextCondLst>
-                <p:cond evt="onNext" delay="0">
-                  <p:tgtEl>
-                    <p:sldTgt/>
-                  </p:tgtEl>
-                </p:cond>
-              </p:nextCondLst>
-            </p:seq>
-          </p:childTnLst>
-        </p:cTn>
-      </p:par>
-    </p:tnLst>
-  </p:timing>
 </p:sld>
 </file>
 
@@ -19678,134 +16937,6 @@
   <p:clrMapOvr>
     <a:masterClrMapping/>
   </p:clrMapOvr>
-  <p:timing>
-    <p:tnLst>
-      <p:par>
-        <p:cTn id="1" dur="indefinite" restart="never" nodeType="tmRoot">
-          <p:childTnLst>
-            <p:seq concurrent="1" nextAc="seek">
-              <p:cTn id="2" dur="indefinite" nodeType="mainSeq">
-                <p:childTnLst>
-                  <p:par>
-                    <p:cTn id="3" fill="hold">
-                      <p:stCondLst>
-                        <p:cond delay="indefinite"/>
-                      </p:stCondLst>
-                      <p:childTnLst>
-                        <p:par>
-                          <p:cTn id="4" fill="hold">
-                            <p:stCondLst>
-                              <p:cond delay="0"/>
-                            </p:stCondLst>
-                            <p:childTnLst>
-                              <p:par>
-                                <p:cTn id="5" presetID="1" presetClass="entr" presetSubtype="0" fill="hold" nodeType="clickEffect">
-                                  <p:stCondLst>
-                                    <p:cond delay="0"/>
-                                  </p:stCondLst>
-                                  <p:childTnLst>
-                                    <p:set>
-                                      <p:cBhvr>
-                                        <p:cTn id="6" dur="1" fill="hold">
-                                          <p:stCondLst>
-                                            <p:cond delay="0"/>
-                                          </p:stCondLst>
-                                        </p:cTn>
-                                        <p:tgtEl>
-                                          <p:spTgt spid="8">
-                                            <p:txEl>
-                                              <p:pRg st="0" end="0"/>
-                                            </p:txEl>
-                                          </p:spTgt>
-                                        </p:tgtEl>
-                                        <p:attrNameLst>
-                                          <p:attrName>style.visibility</p:attrName>
-                                        </p:attrNameLst>
-                                      </p:cBhvr>
-                                      <p:to>
-                                        <p:strVal val="visible"/>
-                                      </p:to>
-                                    </p:set>
-                                  </p:childTnLst>
-                                </p:cTn>
-                              </p:par>
-                            </p:childTnLst>
-                          </p:cTn>
-                        </p:par>
-                      </p:childTnLst>
-                    </p:cTn>
-                  </p:par>
-                  <p:par>
-                    <p:cTn id="7" fill="hold">
-                      <p:stCondLst>
-                        <p:cond delay="indefinite"/>
-                      </p:stCondLst>
-                      <p:childTnLst>
-                        <p:par>
-                          <p:cTn id="8" fill="hold">
-                            <p:stCondLst>
-                              <p:cond delay="0"/>
-                            </p:stCondLst>
-                            <p:childTnLst>
-                              <p:par>
-                                <p:cTn id="9" presetID="1" presetClass="entr" presetSubtype="0" fill="hold" nodeType="clickEffect">
-                                  <p:stCondLst>
-                                    <p:cond delay="0"/>
-                                  </p:stCondLst>
-                                  <p:childTnLst>
-                                    <p:set>
-                                      <p:cBhvr>
-                                        <p:cTn id="10" dur="1" fill="hold">
-                                          <p:stCondLst>
-                                            <p:cond delay="0"/>
-                                          </p:stCondLst>
-                                        </p:cTn>
-                                        <p:tgtEl>
-                                          <p:spTgt spid="8">
-                                            <p:txEl>
-                                              <p:pRg st="2" end="2"/>
-                                            </p:txEl>
-                                          </p:spTgt>
-                                        </p:tgtEl>
-                                        <p:attrNameLst>
-                                          <p:attrName>style.visibility</p:attrName>
-                                        </p:attrNameLst>
-                                      </p:cBhvr>
-                                      <p:to>
-                                        <p:strVal val="visible"/>
-                                      </p:to>
-                                    </p:set>
-                                  </p:childTnLst>
-                                </p:cTn>
-                              </p:par>
-                            </p:childTnLst>
-                          </p:cTn>
-                        </p:par>
-                      </p:childTnLst>
-                    </p:cTn>
-                  </p:par>
-                </p:childTnLst>
-              </p:cTn>
-              <p:prevCondLst>
-                <p:cond evt="onPrev" delay="0">
-                  <p:tgtEl>
-                    <p:sldTgt/>
-                  </p:tgtEl>
-                </p:cond>
-              </p:prevCondLst>
-              <p:nextCondLst>
-                <p:cond evt="onNext" delay="0">
-                  <p:tgtEl>
-                    <p:sldTgt/>
-                  </p:tgtEl>
-                </p:cond>
-              </p:nextCondLst>
-            </p:seq>
-          </p:childTnLst>
-        </p:cTn>
-      </p:par>
-    </p:tnLst>
-  </p:timing>
 </p:sld>
 </file>
 
@@ -19921,183 +17052,6 @@
   <p:clrMapOvr>
     <a:masterClrMapping/>
   </p:clrMapOvr>
-  <p:timing>
-    <p:tnLst>
-      <p:par>
-        <p:cTn id="1" dur="indefinite" restart="never" nodeType="tmRoot">
-          <p:childTnLst>
-            <p:seq concurrent="1" nextAc="seek">
-              <p:cTn id="2" dur="indefinite" nodeType="mainSeq">
-                <p:childTnLst>
-                  <p:par>
-                    <p:cTn id="3" fill="hold">
-                      <p:stCondLst>
-                        <p:cond delay="indefinite"/>
-                      </p:stCondLst>
-                      <p:childTnLst>
-                        <p:par>
-                          <p:cTn id="4" fill="hold">
-                            <p:stCondLst>
-                              <p:cond delay="0"/>
-                            </p:stCondLst>
-                            <p:childTnLst>
-                              <p:par>
-                                <p:cTn id="5" presetID="1" presetClass="entr" presetSubtype="0" fill="hold" nodeType="clickEffect">
-                                  <p:stCondLst>
-                                    <p:cond delay="0"/>
-                                  </p:stCondLst>
-                                  <p:childTnLst>
-                                    <p:set>
-                                      <p:cBhvr>
-                                        <p:cTn id="6" dur="1" fill="hold">
-                                          <p:stCondLst>
-                                            <p:cond delay="0"/>
-                                          </p:stCondLst>
-                                        </p:cTn>
-                                        <p:tgtEl>
-                                          <p:spTgt spid="8">
-                                            <p:txEl>
-                                              <p:pRg st="0" end="0"/>
-                                            </p:txEl>
-                                          </p:spTgt>
-                                        </p:tgtEl>
-                                        <p:attrNameLst>
-                                          <p:attrName>style.visibility</p:attrName>
-                                        </p:attrNameLst>
-                                      </p:cBhvr>
-                                      <p:to>
-                                        <p:strVal val="visible"/>
-                                      </p:to>
-                                    </p:set>
-                                  </p:childTnLst>
-                                </p:cTn>
-                              </p:par>
-                            </p:childTnLst>
-                          </p:cTn>
-                        </p:par>
-                      </p:childTnLst>
-                    </p:cTn>
-                  </p:par>
-                  <p:par>
-                    <p:cTn id="7" fill="hold">
-                      <p:stCondLst>
-                        <p:cond delay="indefinite"/>
-                      </p:stCondLst>
-                      <p:childTnLst>
-                        <p:par>
-                          <p:cTn id="8" fill="hold">
-                            <p:stCondLst>
-                              <p:cond delay="0"/>
-                            </p:stCondLst>
-                            <p:childTnLst>
-                              <p:par>
-                                <p:cTn id="9" presetID="1" presetClass="entr" presetSubtype="0" fill="hold" nodeType="clickEffect">
-                                  <p:stCondLst>
-                                    <p:cond delay="0"/>
-                                  </p:stCondLst>
-                                  <p:childTnLst>
-                                    <p:set>
-                                      <p:cBhvr>
-                                        <p:cTn id="10" dur="1" fill="hold">
-                                          <p:stCondLst>
-                                            <p:cond delay="0"/>
-                                          </p:stCondLst>
-                                        </p:cTn>
-                                        <p:tgtEl>
-                                          <p:spTgt spid="8">
-                                            <p:txEl>
-                                              <p:pRg st="1" end="1"/>
-                                            </p:txEl>
-                                          </p:spTgt>
-                                        </p:tgtEl>
-                                        <p:attrNameLst>
-                                          <p:attrName>style.visibility</p:attrName>
-                                        </p:attrNameLst>
-                                      </p:cBhvr>
-                                      <p:to>
-                                        <p:strVal val="visible"/>
-                                      </p:to>
-                                    </p:set>
-                                  </p:childTnLst>
-                                </p:cTn>
-                              </p:par>
-                            </p:childTnLst>
-                          </p:cTn>
-                        </p:par>
-                      </p:childTnLst>
-                    </p:cTn>
-                  </p:par>
-                  <p:par>
-                    <p:cTn id="11" fill="hold">
-                      <p:stCondLst>
-                        <p:cond delay="indefinite"/>
-                      </p:stCondLst>
-                      <p:childTnLst>
-                        <p:par>
-                          <p:cTn id="12" fill="hold">
-                            <p:stCondLst>
-                              <p:cond delay="0"/>
-                            </p:stCondLst>
-                            <p:childTnLst>
-                              <p:par>
-                                <p:cTn id="13" presetID="1" presetClass="entr" presetSubtype="0" fill="hold" nodeType="clickEffect">
-                                  <p:stCondLst>
-                                    <p:cond delay="0"/>
-                                  </p:stCondLst>
-                                  <p:childTnLst>
-                                    <p:set>
-                                      <p:cBhvr>
-                                        <p:cTn id="14" dur="1" fill="hold">
-                                          <p:stCondLst>
-                                            <p:cond delay="0"/>
-                                          </p:stCondLst>
-                                        </p:cTn>
-                                        <p:tgtEl>
-                                          <p:spTgt spid="8">
-                                            <p:txEl>
-                                              <p:pRg st="2" end="2"/>
-                                            </p:txEl>
-                                          </p:spTgt>
-                                        </p:tgtEl>
-                                        <p:attrNameLst>
-                                          <p:attrName>style.visibility</p:attrName>
-                                        </p:attrNameLst>
-                                      </p:cBhvr>
-                                      <p:to>
-                                        <p:strVal val="visible"/>
-                                      </p:to>
-                                    </p:set>
-                                  </p:childTnLst>
-                                </p:cTn>
-                              </p:par>
-                            </p:childTnLst>
-                          </p:cTn>
-                        </p:par>
-                      </p:childTnLst>
-                    </p:cTn>
-                  </p:par>
-                </p:childTnLst>
-              </p:cTn>
-              <p:prevCondLst>
-                <p:cond evt="onPrev" delay="0">
-                  <p:tgtEl>
-                    <p:sldTgt/>
-                  </p:tgtEl>
-                </p:cond>
-              </p:prevCondLst>
-              <p:nextCondLst>
-                <p:cond evt="onNext" delay="0">
-                  <p:tgtEl>
-                    <p:sldTgt/>
-                  </p:tgtEl>
-                </p:cond>
-              </p:nextCondLst>
-            </p:seq>
-          </p:childTnLst>
-        </p:cTn>
-      </p:par>
-    </p:tnLst>
-  </p:timing>
 </p:sld>
 </file>
 
@@ -20557,232 +17511,6 @@
   <p:clrMapOvr>
     <a:masterClrMapping/>
   </p:clrMapOvr>
-  <p:timing>
-    <p:tnLst>
-      <p:par>
-        <p:cTn id="1" dur="indefinite" restart="never" nodeType="tmRoot">
-          <p:childTnLst>
-            <p:seq concurrent="1" nextAc="seek">
-              <p:cTn id="2" dur="indefinite" nodeType="mainSeq">
-                <p:childTnLst>
-                  <p:par>
-                    <p:cTn id="3" fill="hold">
-                      <p:stCondLst>
-                        <p:cond delay="indefinite"/>
-                      </p:stCondLst>
-                      <p:childTnLst>
-                        <p:par>
-                          <p:cTn id="4" fill="hold">
-                            <p:stCondLst>
-                              <p:cond delay="0"/>
-                            </p:stCondLst>
-                            <p:childTnLst>
-                              <p:par>
-                                <p:cTn id="5" presetID="1" presetClass="entr" presetSubtype="0" fill="hold" nodeType="clickEffect">
-                                  <p:stCondLst>
-                                    <p:cond delay="0"/>
-                                  </p:stCondLst>
-                                  <p:childTnLst>
-                                    <p:set>
-                                      <p:cBhvr>
-                                        <p:cTn id="6" dur="1" fill="hold">
-                                          <p:stCondLst>
-                                            <p:cond delay="0"/>
-                                          </p:stCondLst>
-                                        </p:cTn>
-                                        <p:tgtEl>
-                                          <p:spTgt spid="6">
-                                            <p:txEl>
-                                              <p:pRg st="1" end="1"/>
-                                            </p:txEl>
-                                          </p:spTgt>
-                                        </p:tgtEl>
-                                        <p:attrNameLst>
-                                          <p:attrName>style.visibility</p:attrName>
-                                        </p:attrNameLst>
-                                      </p:cBhvr>
-                                      <p:to>
-                                        <p:strVal val="visible"/>
-                                      </p:to>
-                                    </p:set>
-                                  </p:childTnLst>
-                                </p:cTn>
-                              </p:par>
-                            </p:childTnLst>
-                          </p:cTn>
-                        </p:par>
-                      </p:childTnLst>
-                    </p:cTn>
-                  </p:par>
-                  <p:par>
-                    <p:cTn id="7" fill="hold">
-                      <p:stCondLst>
-                        <p:cond delay="indefinite"/>
-                      </p:stCondLst>
-                      <p:childTnLst>
-                        <p:par>
-                          <p:cTn id="8" fill="hold">
-                            <p:stCondLst>
-                              <p:cond delay="0"/>
-                            </p:stCondLst>
-                            <p:childTnLst>
-                              <p:par>
-                                <p:cTn id="9" presetID="1" presetClass="entr" presetSubtype="0" fill="hold" nodeType="clickEffect">
-                                  <p:stCondLst>
-                                    <p:cond delay="0"/>
-                                  </p:stCondLst>
-                                  <p:childTnLst>
-                                    <p:set>
-                                      <p:cBhvr>
-                                        <p:cTn id="10" dur="1" fill="hold">
-                                          <p:stCondLst>
-                                            <p:cond delay="0"/>
-                                          </p:stCondLst>
-                                        </p:cTn>
-                                        <p:tgtEl>
-                                          <p:spTgt spid="6">
-                                            <p:txEl>
-                                              <p:pRg st="2" end="2"/>
-                                            </p:txEl>
-                                          </p:spTgt>
-                                        </p:tgtEl>
-                                        <p:attrNameLst>
-                                          <p:attrName>style.visibility</p:attrName>
-                                        </p:attrNameLst>
-                                      </p:cBhvr>
-                                      <p:to>
-                                        <p:strVal val="visible"/>
-                                      </p:to>
-                                    </p:set>
-                                  </p:childTnLst>
-                                </p:cTn>
-                              </p:par>
-                            </p:childTnLst>
-                          </p:cTn>
-                        </p:par>
-                      </p:childTnLst>
-                    </p:cTn>
-                  </p:par>
-                  <p:par>
-                    <p:cTn id="11" fill="hold">
-                      <p:stCondLst>
-                        <p:cond delay="indefinite"/>
-                      </p:stCondLst>
-                      <p:childTnLst>
-                        <p:par>
-                          <p:cTn id="12" fill="hold">
-                            <p:stCondLst>
-                              <p:cond delay="0"/>
-                            </p:stCondLst>
-                            <p:childTnLst>
-                              <p:par>
-                                <p:cTn id="13" presetID="1" presetClass="entr" presetSubtype="0" fill="hold" nodeType="clickEffect">
-                                  <p:stCondLst>
-                                    <p:cond delay="0"/>
-                                  </p:stCondLst>
-                                  <p:childTnLst>
-                                    <p:set>
-                                      <p:cBhvr>
-                                        <p:cTn id="14" dur="1" fill="hold">
-                                          <p:stCondLst>
-                                            <p:cond delay="0"/>
-                                          </p:stCondLst>
-                                        </p:cTn>
-                                        <p:tgtEl>
-                                          <p:spTgt spid="6">
-                                            <p:txEl>
-                                              <p:pRg st="3" end="3"/>
-                                            </p:txEl>
-                                          </p:spTgt>
-                                        </p:tgtEl>
-                                        <p:attrNameLst>
-                                          <p:attrName>style.visibility</p:attrName>
-                                        </p:attrNameLst>
-                                      </p:cBhvr>
-                                      <p:to>
-                                        <p:strVal val="visible"/>
-                                      </p:to>
-                                    </p:set>
-                                  </p:childTnLst>
-                                </p:cTn>
-                              </p:par>
-                            </p:childTnLst>
-                          </p:cTn>
-                        </p:par>
-                      </p:childTnLst>
-                    </p:cTn>
-                  </p:par>
-                  <p:par>
-                    <p:cTn id="15" fill="hold">
-                      <p:stCondLst>
-                        <p:cond delay="indefinite"/>
-                      </p:stCondLst>
-                      <p:childTnLst>
-                        <p:par>
-                          <p:cTn id="16" fill="hold">
-                            <p:stCondLst>
-                              <p:cond delay="0"/>
-                            </p:stCondLst>
-                            <p:childTnLst>
-                              <p:par>
-                                <p:cTn id="17" presetID="1" presetClass="entr" presetSubtype="0" fill="hold" nodeType="clickEffect">
-                                  <p:stCondLst>
-                                    <p:cond delay="0"/>
-                                  </p:stCondLst>
-                                  <p:childTnLst>
-                                    <p:set>
-                                      <p:cBhvr>
-                                        <p:cTn id="18" dur="1" fill="hold">
-                                          <p:stCondLst>
-                                            <p:cond delay="0"/>
-                                          </p:stCondLst>
-                                        </p:cTn>
-                                        <p:tgtEl>
-                                          <p:spTgt spid="6">
-                                            <p:txEl>
-                                              <p:pRg st="0" end="0"/>
-                                            </p:txEl>
-                                          </p:spTgt>
-                                        </p:tgtEl>
-                                        <p:attrNameLst>
-                                          <p:attrName>style.visibility</p:attrName>
-                                        </p:attrNameLst>
-                                      </p:cBhvr>
-                                      <p:to>
-                                        <p:strVal val="visible"/>
-                                      </p:to>
-                                    </p:set>
-                                  </p:childTnLst>
-                                </p:cTn>
-                              </p:par>
-                            </p:childTnLst>
-                          </p:cTn>
-                        </p:par>
-                      </p:childTnLst>
-                    </p:cTn>
-                  </p:par>
-                </p:childTnLst>
-              </p:cTn>
-              <p:prevCondLst>
-                <p:cond evt="onPrev" delay="0">
-                  <p:tgtEl>
-                    <p:sldTgt/>
-                  </p:tgtEl>
-                </p:cond>
-              </p:prevCondLst>
-              <p:nextCondLst>
-                <p:cond evt="onNext" delay="0">
-                  <p:tgtEl>
-                    <p:sldTgt/>
-                  </p:tgtEl>
-                </p:cond>
-              </p:nextCondLst>
-            </p:seq>
-          </p:childTnLst>
-        </p:cTn>
-      </p:par>
-    </p:tnLst>
-  </p:timing>
 </p:sld>
 </file>
 
@@ -21347,251 +18075,6 @@
                                           <p:spTgt spid="6">
                                             <p:txEl>
                                               <p:pRg st="0" end="0"/>
-                                            </p:txEl>
-                                          </p:spTgt>
-                                        </p:tgtEl>
-                                        <p:attrNameLst>
-                                          <p:attrName>style.visibility</p:attrName>
-                                        </p:attrNameLst>
-                                      </p:cBhvr>
-                                      <p:to>
-                                        <p:strVal val="visible"/>
-                                      </p:to>
-                                    </p:set>
-                                  </p:childTnLst>
-                                </p:cTn>
-                              </p:par>
-                            </p:childTnLst>
-                          </p:cTn>
-                        </p:par>
-                      </p:childTnLst>
-                    </p:cTn>
-                  </p:par>
-                  <p:par>
-                    <p:cTn id="7" fill="hold">
-                      <p:stCondLst>
-                        <p:cond delay="indefinite"/>
-                      </p:stCondLst>
-                      <p:childTnLst>
-                        <p:par>
-                          <p:cTn id="8" fill="hold">
-                            <p:stCondLst>
-                              <p:cond delay="0"/>
-                            </p:stCondLst>
-                            <p:childTnLst>
-                              <p:par>
-                                <p:cTn id="9" presetID="1" presetClass="entr" presetSubtype="0" fill="hold" nodeType="clickEffect">
-                                  <p:stCondLst>
-                                    <p:cond delay="0"/>
-                                  </p:stCondLst>
-                                  <p:childTnLst>
-                                    <p:set>
-                                      <p:cBhvr>
-                                        <p:cTn id="10" dur="1" fill="hold">
-                                          <p:stCondLst>
-                                            <p:cond delay="0"/>
-                                          </p:stCondLst>
-                                        </p:cTn>
-                                        <p:tgtEl>
-                                          <p:spTgt spid="3">
-                                            <p:txEl>
-                                              <p:pRg st="0" end="0"/>
-                                            </p:txEl>
-                                          </p:spTgt>
-                                        </p:tgtEl>
-                                        <p:attrNameLst>
-                                          <p:attrName>style.visibility</p:attrName>
-                                        </p:attrNameLst>
-                                      </p:cBhvr>
-                                      <p:to>
-                                        <p:strVal val="visible"/>
-                                      </p:to>
-                                    </p:set>
-                                  </p:childTnLst>
-                                </p:cTn>
-                              </p:par>
-                            </p:childTnLst>
-                          </p:cTn>
-                        </p:par>
-                      </p:childTnLst>
-                    </p:cTn>
-                  </p:par>
-                  <p:par>
-                    <p:cTn id="11" fill="hold">
-                      <p:stCondLst>
-                        <p:cond delay="indefinite"/>
-                      </p:stCondLst>
-                      <p:childTnLst>
-                        <p:par>
-                          <p:cTn id="12" fill="hold">
-                            <p:stCondLst>
-                              <p:cond delay="0"/>
-                            </p:stCondLst>
-                            <p:childTnLst>
-                              <p:par>
-                                <p:cTn id="13" presetID="1" presetClass="entr" presetSubtype="0" fill="hold" nodeType="clickEffect">
-                                  <p:stCondLst>
-                                    <p:cond delay="0"/>
-                                  </p:stCondLst>
-                                  <p:childTnLst>
-                                    <p:set>
-                                      <p:cBhvr>
-                                        <p:cTn id="14" dur="1" fill="hold">
-                                          <p:stCondLst>
-                                            <p:cond delay="0"/>
-                                          </p:stCondLst>
-                                        </p:cTn>
-                                        <p:tgtEl>
-                                          <p:spTgt spid="3">
-                                            <p:txEl>
-                                              <p:pRg st="1" end="1"/>
-                                            </p:txEl>
-                                          </p:spTgt>
-                                        </p:tgtEl>
-                                        <p:attrNameLst>
-                                          <p:attrName>style.visibility</p:attrName>
-                                        </p:attrNameLst>
-                                      </p:cBhvr>
-                                      <p:to>
-                                        <p:strVal val="visible"/>
-                                      </p:to>
-                                    </p:set>
-                                  </p:childTnLst>
-                                </p:cTn>
-                              </p:par>
-                            </p:childTnLst>
-                          </p:cTn>
-                        </p:par>
-                      </p:childTnLst>
-                    </p:cTn>
-                  </p:par>
-                  <p:par>
-                    <p:cTn id="15" fill="hold">
-                      <p:stCondLst>
-                        <p:cond delay="indefinite"/>
-                      </p:stCondLst>
-                      <p:childTnLst>
-                        <p:par>
-                          <p:cTn id="16" fill="hold">
-                            <p:stCondLst>
-                              <p:cond delay="0"/>
-                            </p:stCondLst>
-                            <p:childTnLst>
-                              <p:par>
-                                <p:cTn id="17" presetID="1" presetClass="entr" presetSubtype="0" fill="hold" nodeType="clickEffect">
-                                  <p:stCondLst>
-                                    <p:cond delay="0"/>
-                                  </p:stCondLst>
-                                  <p:childTnLst>
-                                    <p:set>
-                                      <p:cBhvr>
-                                        <p:cTn id="18" dur="1" fill="hold">
-                                          <p:stCondLst>
-                                            <p:cond delay="0"/>
-                                          </p:stCondLst>
-                                        </p:cTn>
-                                        <p:tgtEl>
-                                          <p:spTgt spid="3">
-                                            <p:txEl>
-                                              <p:pRg st="2" end="2"/>
-                                            </p:txEl>
-                                          </p:spTgt>
-                                        </p:tgtEl>
-                                        <p:attrNameLst>
-                                          <p:attrName>style.visibility</p:attrName>
-                                        </p:attrNameLst>
-                                      </p:cBhvr>
-                                      <p:to>
-                                        <p:strVal val="visible"/>
-                                      </p:to>
-                                    </p:set>
-                                  </p:childTnLst>
-                                </p:cTn>
-                              </p:par>
-                            </p:childTnLst>
-                          </p:cTn>
-                        </p:par>
-                      </p:childTnLst>
-                    </p:cTn>
-                  </p:par>
-                  <p:par>
-                    <p:cTn id="19" fill="hold">
-                      <p:stCondLst>
-                        <p:cond delay="indefinite"/>
-                      </p:stCondLst>
-                      <p:childTnLst>
-                        <p:par>
-                          <p:cTn id="20" fill="hold">
-                            <p:stCondLst>
-                              <p:cond delay="0"/>
-                            </p:stCondLst>
-                            <p:childTnLst>
-                              <p:par>
-                                <p:cTn id="21" presetID="1" presetClass="entr" presetSubtype="0" fill="hold" nodeType="clickEffect">
-                                  <p:stCondLst>
-                                    <p:cond delay="0"/>
-                                  </p:stCondLst>
-                                  <p:childTnLst>
-                                    <p:set>
-                                      <p:cBhvr>
-                                        <p:cTn id="22" dur="1" fill="hold">
-                                          <p:stCondLst>
-                                            <p:cond delay="0"/>
-                                          </p:stCondLst>
-                                        </p:cTn>
-                                        <p:tgtEl>
-                                          <p:spTgt spid="3">
-                                            <p:txEl>
-                                              <p:pRg st="3" end="3"/>
-                                            </p:txEl>
-                                          </p:spTgt>
-                                        </p:tgtEl>
-                                        <p:attrNameLst>
-                                          <p:attrName>style.visibility</p:attrName>
-                                        </p:attrNameLst>
-                                      </p:cBhvr>
-                                      <p:to>
-                                        <p:strVal val="visible"/>
-                                      </p:to>
-                                    </p:set>
-                                  </p:childTnLst>
-                                </p:cTn>
-                              </p:par>
-                            </p:childTnLst>
-                          </p:cTn>
-                        </p:par>
-                      </p:childTnLst>
-                    </p:cTn>
-                  </p:par>
-                  <p:par>
-                    <p:cTn id="23" fill="hold">
-                      <p:stCondLst>
-                        <p:cond delay="indefinite"/>
-                      </p:stCondLst>
-                      <p:childTnLst>
-                        <p:par>
-                          <p:cTn id="24" fill="hold">
-                            <p:stCondLst>
-                              <p:cond delay="0"/>
-                            </p:stCondLst>
-                            <p:childTnLst>
-                              <p:par>
-                                <p:cTn id="25" presetID="1" presetClass="entr" presetSubtype="0" fill="hold" nodeType="clickEffect">
-                                  <p:stCondLst>
-                                    <p:cond delay="0"/>
-                                  </p:stCondLst>
-                                  <p:childTnLst>
-                                    <p:set>
-                                      <p:cBhvr>
-                                        <p:cTn id="26" dur="1" fill="hold">
-                                          <p:stCondLst>
-                                            <p:cond delay="0"/>
-                                          </p:stCondLst>
-                                        </p:cTn>
-                                        <p:tgtEl>
-                                          <p:spTgt spid="3">
-                                            <p:txEl>
-                                              <p:pRg st="4" end="4"/>
                                             </p:txEl>
                                           </p:spTgt>
                                         </p:tgtEl>
@@ -22084,153 +18567,6 @@
                       </p:childTnLst>
                     </p:cTn>
                   </p:par>
-                  <p:par>
-                    <p:cTn id="7" fill="hold">
-                      <p:stCondLst>
-                        <p:cond delay="indefinite"/>
-                      </p:stCondLst>
-                      <p:childTnLst>
-                        <p:par>
-                          <p:cTn id="8" fill="hold">
-                            <p:stCondLst>
-                              <p:cond delay="0"/>
-                            </p:stCondLst>
-                            <p:childTnLst>
-                              <p:par>
-                                <p:cTn id="9" presetID="1" presetClass="entr" presetSubtype="0" fill="hold" nodeType="clickEffect">
-                                  <p:stCondLst>
-                                    <p:cond delay="0"/>
-                                  </p:stCondLst>
-                                  <p:childTnLst>
-                                    <p:set>
-                                      <p:cBhvr>
-                                        <p:cTn id="10" dur="1" fill="hold">
-                                          <p:stCondLst>
-                                            <p:cond delay="0"/>
-                                          </p:stCondLst>
-                                        </p:cTn>
-                                        <p:tgtEl>
-                                          <p:spTgt spid="3">
-                                            <p:txEl>
-                                              <p:pRg st="0" end="0"/>
-                                            </p:txEl>
-                                          </p:spTgt>
-                                        </p:tgtEl>
-                                        <p:attrNameLst>
-                                          <p:attrName>style.visibility</p:attrName>
-                                        </p:attrNameLst>
-                                      </p:cBhvr>
-                                      <p:to>
-                                        <p:strVal val="visible"/>
-                                      </p:to>
-                                    </p:set>
-                                  </p:childTnLst>
-                                </p:cTn>
-                              </p:par>
-                            </p:childTnLst>
-                          </p:cTn>
-                        </p:par>
-                      </p:childTnLst>
-                    </p:cTn>
-                  </p:par>
-                  <p:par>
-                    <p:cTn id="11" fill="hold">
-                      <p:stCondLst>
-                        <p:cond delay="indefinite"/>
-                      </p:stCondLst>
-                      <p:childTnLst>
-                        <p:par>
-                          <p:cTn id="12" fill="hold">
-                            <p:stCondLst>
-                              <p:cond delay="0"/>
-                            </p:stCondLst>
-                            <p:childTnLst>
-                              <p:par>
-                                <p:cTn id="13" presetID="1" presetClass="entr" presetSubtype="0" fill="hold" nodeType="clickEffect">
-                                  <p:stCondLst>
-                                    <p:cond delay="0"/>
-                                  </p:stCondLst>
-                                  <p:childTnLst>
-                                    <p:set>
-                                      <p:cBhvr>
-                                        <p:cTn id="14" dur="1" fill="hold">
-                                          <p:stCondLst>
-                                            <p:cond delay="0"/>
-                                          </p:stCondLst>
-                                        </p:cTn>
-                                        <p:tgtEl>
-                                          <p:spTgt spid="3">
-                                            <p:txEl>
-                                              <p:pRg st="1" end="1"/>
-                                            </p:txEl>
-                                          </p:spTgt>
-                                        </p:tgtEl>
-                                        <p:attrNameLst>
-                                          <p:attrName>style.visibility</p:attrName>
-                                        </p:attrNameLst>
-                                      </p:cBhvr>
-                                      <p:to>
-                                        <p:strVal val="visible"/>
-                                      </p:to>
-                                    </p:set>
-                                  </p:childTnLst>
-                                </p:cTn>
-                              </p:par>
-                            </p:childTnLst>
-                          </p:cTn>
-                        </p:par>
-                      </p:childTnLst>
-                    </p:cTn>
-                  </p:par>
-                  <p:par>
-                    <p:cTn id="15" fill="hold">
-                      <p:stCondLst>
-                        <p:cond delay="indefinite"/>
-                      </p:stCondLst>
-                      <p:childTnLst>
-                        <p:par>
-                          <p:cTn id="16" fill="hold">
-                            <p:stCondLst>
-                              <p:cond delay="0"/>
-                            </p:stCondLst>
-                            <p:childTnLst>
-                              <p:par>
-                                <p:cTn id="17" presetID="1" presetClass="entr" presetSubtype="0" fill="hold" nodeType="clickEffect">
-                                  <p:stCondLst>
-                                    <p:cond delay="0"/>
-                                  </p:stCondLst>
-                                  <p:childTnLst>
-                                    <p:set>
-                                      <p:cBhvr>
-                                        <p:cTn id="18" dur="1" fill="hold">
-                                          <p:stCondLst>
-                                            <p:cond delay="0"/>
-                                          </p:stCondLst>
-                                        </p:cTn>
-                                        <p:tgtEl>
-                                          <p:spTgt spid="3">
-                                            <p:txEl>
-                                              <p:pRg st="2" end="2"/>
-                                            </p:txEl>
-                                          </p:spTgt>
-                                        </p:tgtEl>
-                                        <p:attrNameLst>
-                                          <p:attrName>style.visibility</p:attrName>
-                                        </p:attrNameLst>
-                                      </p:cBhvr>
-                                      <p:to>
-                                        <p:strVal val="visible"/>
-                                      </p:to>
-                                    </p:set>
-                                  </p:childTnLst>
-                                </p:cTn>
-                              </p:par>
-                            </p:childTnLst>
-                          </p:cTn>
-                        </p:par>
-                      </p:childTnLst>
-                    </p:cTn>
-                  </p:par>
                 </p:childTnLst>
               </p:cTn>
               <p:prevCondLst>
@@ -22696,55 +19032,6 @@
                       </p:childTnLst>
                     </p:cTn>
                   </p:par>
-                  <p:par>
-                    <p:cTn id="7" fill="hold">
-                      <p:stCondLst>
-                        <p:cond delay="indefinite"/>
-                      </p:stCondLst>
-                      <p:childTnLst>
-                        <p:par>
-                          <p:cTn id="8" fill="hold">
-                            <p:stCondLst>
-                              <p:cond delay="0"/>
-                            </p:stCondLst>
-                            <p:childTnLst>
-                              <p:par>
-                                <p:cTn id="9" presetID="1" presetClass="entr" presetSubtype="0" fill="hold" nodeType="clickEffect">
-                                  <p:stCondLst>
-                                    <p:cond delay="0"/>
-                                  </p:stCondLst>
-                                  <p:childTnLst>
-                                    <p:set>
-                                      <p:cBhvr>
-                                        <p:cTn id="10" dur="1" fill="hold">
-                                          <p:stCondLst>
-                                            <p:cond delay="0"/>
-                                          </p:stCondLst>
-                                        </p:cTn>
-                                        <p:tgtEl>
-                                          <p:spTgt spid="3">
-                                            <p:txEl>
-                                              <p:pRg st="0" end="0"/>
-                                            </p:txEl>
-                                          </p:spTgt>
-                                        </p:tgtEl>
-                                        <p:attrNameLst>
-                                          <p:attrName>style.visibility</p:attrName>
-                                        </p:attrNameLst>
-                                      </p:cBhvr>
-                                      <p:to>
-                                        <p:strVal val="visible"/>
-                                      </p:to>
-                                    </p:set>
-                                  </p:childTnLst>
-                                </p:cTn>
-                              </p:par>
-                            </p:childTnLst>
-                          </p:cTn>
-                        </p:par>
-                      </p:childTnLst>
-                    </p:cTn>
-                  </p:par>
                 </p:childTnLst>
               </p:cTn>
               <p:prevCondLst>
@@ -23362,281 +19649,6 @@
   <p:clrMapOvr>
     <a:masterClrMapping/>
   </p:clrMapOvr>
-  <p:timing>
-    <p:tnLst>
-      <p:par>
-        <p:cTn id="1" dur="indefinite" restart="never" nodeType="tmRoot">
-          <p:childTnLst>
-            <p:seq concurrent="1" nextAc="seek">
-              <p:cTn id="2" dur="indefinite" nodeType="mainSeq">
-                <p:childTnLst>
-                  <p:par>
-                    <p:cTn id="3" fill="hold">
-                      <p:stCondLst>
-                        <p:cond delay="indefinite"/>
-                      </p:stCondLst>
-                      <p:childTnLst>
-                        <p:par>
-                          <p:cTn id="4" fill="hold">
-                            <p:stCondLst>
-                              <p:cond delay="0"/>
-                            </p:stCondLst>
-                            <p:childTnLst>
-                              <p:par>
-                                <p:cTn id="5" presetID="1" presetClass="entr" presetSubtype="0" fill="hold" nodeType="clickEffect">
-                                  <p:stCondLst>
-                                    <p:cond delay="0"/>
-                                  </p:stCondLst>
-                                  <p:childTnLst>
-                                    <p:set>
-                                      <p:cBhvr>
-                                        <p:cTn id="6" dur="1" fill="hold">
-                                          <p:stCondLst>
-                                            <p:cond delay="0"/>
-                                          </p:stCondLst>
-                                        </p:cTn>
-                                        <p:tgtEl>
-                                          <p:spTgt spid="6">
-                                            <p:txEl>
-                                              <p:pRg st="0" end="0"/>
-                                            </p:txEl>
-                                          </p:spTgt>
-                                        </p:tgtEl>
-                                        <p:attrNameLst>
-                                          <p:attrName>style.visibility</p:attrName>
-                                        </p:attrNameLst>
-                                      </p:cBhvr>
-                                      <p:to>
-                                        <p:strVal val="visible"/>
-                                      </p:to>
-                                    </p:set>
-                                  </p:childTnLst>
-                                </p:cTn>
-                              </p:par>
-                            </p:childTnLst>
-                          </p:cTn>
-                        </p:par>
-                      </p:childTnLst>
-                    </p:cTn>
-                  </p:par>
-                  <p:par>
-                    <p:cTn id="7" fill="hold">
-                      <p:stCondLst>
-                        <p:cond delay="indefinite"/>
-                      </p:stCondLst>
-                      <p:childTnLst>
-                        <p:par>
-                          <p:cTn id="8" fill="hold">
-                            <p:stCondLst>
-                              <p:cond delay="0"/>
-                            </p:stCondLst>
-                            <p:childTnLst>
-                              <p:par>
-                                <p:cTn id="9" presetID="1" presetClass="entr" presetSubtype="0" fill="hold" nodeType="clickEffect">
-                                  <p:stCondLst>
-                                    <p:cond delay="0"/>
-                                  </p:stCondLst>
-                                  <p:childTnLst>
-                                    <p:set>
-                                      <p:cBhvr>
-                                        <p:cTn id="10" dur="1" fill="hold">
-                                          <p:stCondLst>
-                                            <p:cond delay="0"/>
-                                          </p:stCondLst>
-                                        </p:cTn>
-                                        <p:tgtEl>
-                                          <p:spTgt spid="6">
-                                            <p:txEl>
-                                              <p:pRg st="1" end="1"/>
-                                            </p:txEl>
-                                          </p:spTgt>
-                                        </p:tgtEl>
-                                        <p:attrNameLst>
-                                          <p:attrName>style.visibility</p:attrName>
-                                        </p:attrNameLst>
-                                      </p:cBhvr>
-                                      <p:to>
-                                        <p:strVal val="visible"/>
-                                      </p:to>
-                                    </p:set>
-                                  </p:childTnLst>
-                                </p:cTn>
-                              </p:par>
-                            </p:childTnLst>
-                          </p:cTn>
-                        </p:par>
-                      </p:childTnLst>
-                    </p:cTn>
-                  </p:par>
-                  <p:par>
-                    <p:cTn id="11" fill="hold">
-                      <p:stCondLst>
-                        <p:cond delay="indefinite"/>
-                      </p:stCondLst>
-                      <p:childTnLst>
-                        <p:par>
-                          <p:cTn id="12" fill="hold">
-                            <p:stCondLst>
-                              <p:cond delay="0"/>
-                            </p:stCondLst>
-                            <p:childTnLst>
-                              <p:par>
-                                <p:cTn id="13" presetID="1" presetClass="entr" presetSubtype="0" fill="hold" nodeType="clickEffect">
-                                  <p:stCondLst>
-                                    <p:cond delay="0"/>
-                                  </p:stCondLst>
-                                  <p:childTnLst>
-                                    <p:set>
-                                      <p:cBhvr>
-                                        <p:cTn id="14" dur="1" fill="hold">
-                                          <p:stCondLst>
-                                            <p:cond delay="0"/>
-                                          </p:stCondLst>
-                                        </p:cTn>
-                                        <p:tgtEl>
-                                          <p:spTgt spid="6">
-                                            <p:txEl>
-                                              <p:pRg st="2" end="2"/>
-                                            </p:txEl>
-                                          </p:spTgt>
-                                        </p:tgtEl>
-                                        <p:attrNameLst>
-                                          <p:attrName>style.visibility</p:attrName>
-                                        </p:attrNameLst>
-                                      </p:cBhvr>
-                                      <p:to>
-                                        <p:strVal val="visible"/>
-                                      </p:to>
-                                    </p:set>
-                                  </p:childTnLst>
-                                </p:cTn>
-                              </p:par>
-                            </p:childTnLst>
-                          </p:cTn>
-                        </p:par>
-                      </p:childTnLst>
-                    </p:cTn>
-                  </p:par>
-                  <p:par>
-                    <p:cTn id="15" fill="hold">
-                      <p:stCondLst>
-                        <p:cond delay="indefinite"/>
-                      </p:stCondLst>
-                      <p:childTnLst>
-                        <p:par>
-                          <p:cTn id="16" fill="hold">
-                            <p:stCondLst>
-                              <p:cond delay="0"/>
-                            </p:stCondLst>
-                            <p:childTnLst>
-                              <p:par>
-                                <p:cTn id="17" presetID="1" presetClass="entr" presetSubtype="0" fill="hold" nodeType="clickEffect">
-                                  <p:stCondLst>
-                                    <p:cond delay="0"/>
-                                  </p:stCondLst>
-                                  <p:childTnLst>
-                                    <p:set>
-                                      <p:cBhvr>
-                                        <p:cTn id="18" dur="1" fill="hold">
-                                          <p:stCondLst>
-                                            <p:cond delay="0"/>
-                                          </p:stCondLst>
-                                        </p:cTn>
-                                        <p:tgtEl>
-                                          <p:spTgt spid="6">
-                                            <p:txEl>
-                                              <p:pRg st="3" end="3"/>
-                                            </p:txEl>
-                                          </p:spTgt>
-                                        </p:tgtEl>
-                                        <p:attrNameLst>
-                                          <p:attrName>style.visibility</p:attrName>
-                                        </p:attrNameLst>
-                                      </p:cBhvr>
-                                      <p:to>
-                                        <p:strVal val="visible"/>
-                                      </p:to>
-                                    </p:set>
-                                  </p:childTnLst>
-                                </p:cTn>
-                              </p:par>
-                            </p:childTnLst>
-                          </p:cTn>
-                        </p:par>
-                      </p:childTnLst>
-                    </p:cTn>
-                  </p:par>
-                  <p:par>
-                    <p:cTn id="19" fill="hold">
-                      <p:stCondLst>
-                        <p:cond delay="indefinite"/>
-                      </p:stCondLst>
-                      <p:childTnLst>
-                        <p:par>
-                          <p:cTn id="20" fill="hold">
-                            <p:stCondLst>
-                              <p:cond delay="0"/>
-                            </p:stCondLst>
-                            <p:childTnLst>
-                              <p:par>
-                                <p:cTn id="21" presetID="1" presetClass="entr" presetSubtype="0" fill="hold" nodeType="clickEffect">
-                                  <p:stCondLst>
-                                    <p:cond delay="0"/>
-                                  </p:stCondLst>
-                                  <p:childTnLst>
-                                    <p:set>
-                                      <p:cBhvr>
-                                        <p:cTn id="22" dur="1" fill="hold">
-                                          <p:stCondLst>
-                                            <p:cond delay="0"/>
-                                          </p:stCondLst>
-                                        </p:cTn>
-                                        <p:tgtEl>
-                                          <p:spTgt spid="6">
-                                            <p:txEl>
-                                              <p:pRg st="4" end="4"/>
-                                            </p:txEl>
-                                          </p:spTgt>
-                                        </p:tgtEl>
-                                        <p:attrNameLst>
-                                          <p:attrName>style.visibility</p:attrName>
-                                        </p:attrNameLst>
-                                      </p:cBhvr>
-                                      <p:to>
-                                        <p:strVal val="visible"/>
-                                      </p:to>
-                                    </p:set>
-                                  </p:childTnLst>
-                                </p:cTn>
-                              </p:par>
-                            </p:childTnLst>
-                          </p:cTn>
-                        </p:par>
-                      </p:childTnLst>
-                    </p:cTn>
-                  </p:par>
-                </p:childTnLst>
-              </p:cTn>
-              <p:prevCondLst>
-                <p:cond evt="onPrev" delay="0">
-                  <p:tgtEl>
-                    <p:sldTgt/>
-                  </p:tgtEl>
-                </p:cond>
-              </p:prevCondLst>
-              <p:nextCondLst>
-                <p:cond evt="onNext" delay="0">
-                  <p:tgtEl>
-                    <p:sldTgt/>
-                  </p:tgtEl>
-                </p:cond>
-              </p:nextCondLst>
-            </p:seq>
-          </p:childTnLst>
-        </p:cTn>
-      </p:par>
-    </p:tnLst>
-  </p:timing>
 </p:sld>
 </file>
 
@@ -24080,202 +20092,6 @@
                       </p:childTnLst>
                     </p:cTn>
                   </p:par>
-                  <p:par>
-                    <p:cTn id="7" fill="hold">
-                      <p:stCondLst>
-                        <p:cond delay="indefinite"/>
-                      </p:stCondLst>
-                      <p:childTnLst>
-                        <p:par>
-                          <p:cTn id="8" fill="hold">
-                            <p:stCondLst>
-                              <p:cond delay="0"/>
-                            </p:stCondLst>
-                            <p:childTnLst>
-                              <p:par>
-                                <p:cTn id="9" presetID="1" presetClass="entr" presetSubtype="0" fill="hold" nodeType="clickEffect">
-                                  <p:stCondLst>
-                                    <p:cond delay="0"/>
-                                  </p:stCondLst>
-                                  <p:childTnLst>
-                                    <p:set>
-                                      <p:cBhvr>
-                                        <p:cTn id="10" dur="1" fill="hold">
-                                          <p:stCondLst>
-                                            <p:cond delay="0"/>
-                                          </p:stCondLst>
-                                        </p:cTn>
-                                        <p:tgtEl>
-                                          <p:spTgt spid="11">
-                                            <p:txEl>
-                                              <p:pRg st="0" end="0"/>
-                                            </p:txEl>
-                                          </p:spTgt>
-                                        </p:tgtEl>
-                                        <p:attrNameLst>
-                                          <p:attrName>style.visibility</p:attrName>
-                                        </p:attrNameLst>
-                                      </p:cBhvr>
-                                      <p:to>
-                                        <p:strVal val="visible"/>
-                                      </p:to>
-                                    </p:set>
-                                  </p:childTnLst>
-                                </p:cTn>
-                              </p:par>
-                            </p:childTnLst>
-                          </p:cTn>
-                        </p:par>
-                      </p:childTnLst>
-                    </p:cTn>
-                  </p:par>
-                  <p:par>
-                    <p:cTn id="11" fill="hold">
-                      <p:stCondLst>
-                        <p:cond delay="indefinite"/>
-                      </p:stCondLst>
-                      <p:childTnLst>
-                        <p:par>
-                          <p:cTn id="12" fill="hold">
-                            <p:stCondLst>
-                              <p:cond delay="0"/>
-                            </p:stCondLst>
-                            <p:childTnLst>
-                              <p:par>
-                                <p:cTn id="13" presetID="1" presetClass="entr" presetSubtype="0" fill="hold" nodeType="clickEffect">
-                                  <p:stCondLst>
-                                    <p:cond delay="0"/>
-                                  </p:stCondLst>
-                                  <p:childTnLst>
-                                    <p:set>
-                                      <p:cBhvr>
-                                        <p:cTn id="14" dur="1" fill="hold">
-                                          <p:stCondLst>
-                                            <p:cond delay="0"/>
-                                          </p:stCondLst>
-                                        </p:cTn>
-                                        <p:tgtEl>
-                                          <p:spTgt spid="11">
-                                            <p:txEl>
-                                              <p:pRg st="1" end="1"/>
-                                            </p:txEl>
-                                          </p:spTgt>
-                                        </p:tgtEl>
-                                        <p:attrNameLst>
-                                          <p:attrName>style.visibility</p:attrName>
-                                        </p:attrNameLst>
-                                      </p:cBhvr>
-                                      <p:to>
-                                        <p:strVal val="visible"/>
-                                      </p:to>
-                                    </p:set>
-                                  </p:childTnLst>
-                                </p:cTn>
-                              </p:par>
-                            </p:childTnLst>
-                          </p:cTn>
-                        </p:par>
-                      </p:childTnLst>
-                    </p:cTn>
-                  </p:par>
-                  <p:par>
-                    <p:cTn id="15" fill="hold">
-                      <p:stCondLst>
-                        <p:cond delay="indefinite"/>
-                      </p:stCondLst>
-                      <p:childTnLst>
-                        <p:par>
-                          <p:cTn id="16" fill="hold">
-                            <p:stCondLst>
-                              <p:cond delay="0"/>
-                            </p:stCondLst>
-                            <p:childTnLst>
-                              <p:par>
-                                <p:cTn id="17" presetID="1" presetClass="entr" presetSubtype="0" fill="hold" nodeType="clickEffect">
-                                  <p:stCondLst>
-                                    <p:cond delay="0"/>
-                                  </p:stCondLst>
-                                  <p:childTnLst>
-                                    <p:set>
-                                      <p:cBhvr>
-                                        <p:cTn id="18" dur="1" fill="hold">
-                                          <p:stCondLst>
-                                            <p:cond delay="0"/>
-                                          </p:stCondLst>
-                                        </p:cTn>
-                                        <p:tgtEl>
-                                          <p:spTgt spid="11">
-                                            <p:txEl>
-                                              <p:pRg st="2" end="2"/>
-                                            </p:txEl>
-                                          </p:spTgt>
-                                        </p:tgtEl>
-                                        <p:attrNameLst>
-                                          <p:attrName>style.visibility</p:attrName>
-                                        </p:attrNameLst>
-                                      </p:cBhvr>
-                                      <p:to>
-                                        <p:strVal val="visible"/>
-                                      </p:to>
-                                    </p:set>
-                                  </p:childTnLst>
-                                </p:cTn>
-                              </p:par>
-                            </p:childTnLst>
-                          </p:cTn>
-                        </p:par>
-                      </p:childTnLst>
-                    </p:cTn>
-                  </p:par>
-                  <p:par>
-                    <p:cTn id="19" fill="hold">
-                      <p:stCondLst>
-                        <p:cond delay="indefinite"/>
-                      </p:stCondLst>
-                      <p:childTnLst>
-                        <p:par>
-                          <p:cTn id="20" fill="hold">
-                            <p:stCondLst>
-                              <p:cond delay="0"/>
-                            </p:stCondLst>
-                            <p:childTnLst>
-                              <p:par>
-                                <p:cTn id="21" presetID="1" presetClass="entr" presetSubtype="0" fill="hold" nodeType="clickEffect">
-                                  <p:stCondLst>
-                                    <p:cond delay="0"/>
-                                  </p:stCondLst>
-                                  <p:childTnLst>
-                                    <p:set>
-                                      <p:cBhvr>
-                                        <p:cTn id="22" dur="1" fill="hold">
-                                          <p:stCondLst>
-                                            <p:cond delay="0"/>
-                                          </p:stCondLst>
-                                        </p:cTn>
-                                        <p:tgtEl>
-                                          <p:spTgt spid="11">
-                                            <p:txEl>
-                                              <p:pRg st="3" end="3"/>
-                                            </p:txEl>
-                                          </p:spTgt>
-                                        </p:tgtEl>
-                                        <p:attrNameLst>
-                                          <p:attrName>style.visibility</p:attrName>
-                                        </p:attrNameLst>
-                                      </p:cBhvr>
-                                      <p:to>
-                                        <p:strVal val="visible"/>
-                                      </p:to>
-                                    </p:set>
-                                  </p:childTnLst>
-                                </p:cTn>
-                              </p:par>
-                            </p:childTnLst>
-                          </p:cTn>
-                        </p:par>
-                      </p:childTnLst>
-                    </p:cTn>
-                  </p:par>
                 </p:childTnLst>
               </p:cTn>
               <p:prevCondLst>
@@ -24812,447 +20628,6 @@
                                           <p:spTgt spid="6">
                                             <p:txEl>
                                               <p:pRg st="0" end="0"/>
-                                            </p:txEl>
-                                          </p:spTgt>
-                                        </p:tgtEl>
-                                        <p:attrNameLst>
-                                          <p:attrName>style.visibility</p:attrName>
-                                        </p:attrNameLst>
-                                      </p:cBhvr>
-                                      <p:to>
-                                        <p:strVal val="visible"/>
-                                      </p:to>
-                                    </p:set>
-                                  </p:childTnLst>
-                                </p:cTn>
-                              </p:par>
-                            </p:childTnLst>
-                          </p:cTn>
-                        </p:par>
-                      </p:childTnLst>
-                    </p:cTn>
-                  </p:par>
-                  <p:par>
-                    <p:cTn id="7" fill="hold">
-                      <p:stCondLst>
-                        <p:cond delay="indefinite"/>
-                      </p:stCondLst>
-                      <p:childTnLst>
-                        <p:par>
-                          <p:cTn id="8" fill="hold">
-                            <p:stCondLst>
-                              <p:cond delay="0"/>
-                            </p:stCondLst>
-                            <p:childTnLst>
-                              <p:par>
-                                <p:cTn id="9" presetID="1" presetClass="entr" presetSubtype="0" fill="hold" nodeType="clickEffect">
-                                  <p:stCondLst>
-                                    <p:cond delay="0"/>
-                                  </p:stCondLst>
-                                  <p:childTnLst>
-                                    <p:set>
-                                      <p:cBhvr>
-                                        <p:cTn id="10" dur="1" fill="hold">
-                                          <p:stCondLst>
-                                            <p:cond delay="0"/>
-                                          </p:stCondLst>
-                                        </p:cTn>
-                                        <p:tgtEl>
-                                          <p:spTgt spid="11">
-                                            <p:txEl>
-                                              <p:pRg st="0" end="0"/>
-                                            </p:txEl>
-                                          </p:spTgt>
-                                        </p:tgtEl>
-                                        <p:attrNameLst>
-                                          <p:attrName>style.visibility</p:attrName>
-                                        </p:attrNameLst>
-                                      </p:cBhvr>
-                                      <p:to>
-                                        <p:strVal val="visible"/>
-                                      </p:to>
-                                    </p:set>
-                                  </p:childTnLst>
-                                </p:cTn>
-                              </p:par>
-                            </p:childTnLst>
-                          </p:cTn>
-                        </p:par>
-                      </p:childTnLst>
-                    </p:cTn>
-                  </p:par>
-                  <p:par>
-                    <p:cTn id="11" fill="hold">
-                      <p:stCondLst>
-                        <p:cond delay="indefinite"/>
-                      </p:stCondLst>
-                      <p:childTnLst>
-                        <p:par>
-                          <p:cTn id="12" fill="hold">
-                            <p:stCondLst>
-                              <p:cond delay="0"/>
-                            </p:stCondLst>
-                            <p:childTnLst>
-                              <p:par>
-                                <p:cTn id="13" presetID="1" presetClass="entr" presetSubtype="0" fill="hold" nodeType="clickEffect">
-                                  <p:stCondLst>
-                                    <p:cond delay="0"/>
-                                  </p:stCondLst>
-                                  <p:childTnLst>
-                                    <p:set>
-                                      <p:cBhvr>
-                                        <p:cTn id="14" dur="1" fill="hold">
-                                          <p:stCondLst>
-                                            <p:cond delay="0"/>
-                                          </p:stCondLst>
-                                        </p:cTn>
-                                        <p:tgtEl>
-                                          <p:spTgt spid="11">
-                                            <p:txEl>
-                                              <p:pRg st="1" end="1"/>
-                                            </p:txEl>
-                                          </p:spTgt>
-                                        </p:tgtEl>
-                                        <p:attrNameLst>
-                                          <p:attrName>style.visibility</p:attrName>
-                                        </p:attrNameLst>
-                                      </p:cBhvr>
-                                      <p:to>
-                                        <p:strVal val="visible"/>
-                                      </p:to>
-                                    </p:set>
-                                  </p:childTnLst>
-                                </p:cTn>
-                              </p:par>
-                            </p:childTnLst>
-                          </p:cTn>
-                        </p:par>
-                      </p:childTnLst>
-                    </p:cTn>
-                  </p:par>
-                  <p:par>
-                    <p:cTn id="15" fill="hold">
-                      <p:stCondLst>
-                        <p:cond delay="indefinite"/>
-                      </p:stCondLst>
-                      <p:childTnLst>
-                        <p:par>
-                          <p:cTn id="16" fill="hold">
-                            <p:stCondLst>
-                              <p:cond delay="0"/>
-                            </p:stCondLst>
-                            <p:childTnLst>
-                              <p:par>
-                                <p:cTn id="17" presetID="1" presetClass="entr" presetSubtype="0" fill="hold" nodeType="clickEffect">
-                                  <p:stCondLst>
-                                    <p:cond delay="0"/>
-                                  </p:stCondLst>
-                                  <p:childTnLst>
-                                    <p:set>
-                                      <p:cBhvr>
-                                        <p:cTn id="18" dur="1" fill="hold">
-                                          <p:stCondLst>
-                                            <p:cond delay="0"/>
-                                          </p:stCondLst>
-                                        </p:cTn>
-                                        <p:tgtEl>
-                                          <p:spTgt spid="11">
-                                            <p:txEl>
-                                              <p:pRg st="2" end="2"/>
-                                            </p:txEl>
-                                          </p:spTgt>
-                                        </p:tgtEl>
-                                        <p:attrNameLst>
-                                          <p:attrName>style.visibility</p:attrName>
-                                        </p:attrNameLst>
-                                      </p:cBhvr>
-                                      <p:to>
-                                        <p:strVal val="visible"/>
-                                      </p:to>
-                                    </p:set>
-                                  </p:childTnLst>
-                                </p:cTn>
-                              </p:par>
-                            </p:childTnLst>
-                          </p:cTn>
-                        </p:par>
-                      </p:childTnLst>
-                    </p:cTn>
-                  </p:par>
-                  <p:par>
-                    <p:cTn id="19" fill="hold">
-                      <p:stCondLst>
-                        <p:cond delay="indefinite"/>
-                      </p:stCondLst>
-                      <p:childTnLst>
-                        <p:par>
-                          <p:cTn id="20" fill="hold">
-                            <p:stCondLst>
-                              <p:cond delay="0"/>
-                            </p:stCondLst>
-                            <p:childTnLst>
-                              <p:par>
-                                <p:cTn id="21" presetID="1" presetClass="entr" presetSubtype="0" fill="hold" nodeType="clickEffect">
-                                  <p:stCondLst>
-                                    <p:cond delay="0"/>
-                                  </p:stCondLst>
-                                  <p:childTnLst>
-                                    <p:set>
-                                      <p:cBhvr>
-                                        <p:cTn id="22" dur="1" fill="hold">
-                                          <p:stCondLst>
-                                            <p:cond delay="0"/>
-                                          </p:stCondLst>
-                                        </p:cTn>
-                                        <p:tgtEl>
-                                          <p:spTgt spid="11">
-                                            <p:txEl>
-                                              <p:pRg st="3" end="3"/>
-                                            </p:txEl>
-                                          </p:spTgt>
-                                        </p:tgtEl>
-                                        <p:attrNameLst>
-                                          <p:attrName>style.visibility</p:attrName>
-                                        </p:attrNameLst>
-                                      </p:cBhvr>
-                                      <p:to>
-                                        <p:strVal val="visible"/>
-                                      </p:to>
-                                    </p:set>
-                                  </p:childTnLst>
-                                </p:cTn>
-                              </p:par>
-                            </p:childTnLst>
-                          </p:cTn>
-                        </p:par>
-                      </p:childTnLst>
-                    </p:cTn>
-                  </p:par>
-                  <p:par>
-                    <p:cTn id="23" fill="hold">
-                      <p:stCondLst>
-                        <p:cond delay="indefinite"/>
-                      </p:stCondLst>
-                      <p:childTnLst>
-                        <p:par>
-                          <p:cTn id="24" fill="hold">
-                            <p:stCondLst>
-                              <p:cond delay="0"/>
-                            </p:stCondLst>
-                            <p:childTnLst>
-                              <p:par>
-                                <p:cTn id="25" presetID="1" presetClass="entr" presetSubtype="0" fill="hold" nodeType="clickEffect">
-                                  <p:stCondLst>
-                                    <p:cond delay="0"/>
-                                  </p:stCondLst>
-                                  <p:childTnLst>
-                                    <p:set>
-                                      <p:cBhvr>
-                                        <p:cTn id="26" dur="1" fill="hold">
-                                          <p:stCondLst>
-                                            <p:cond delay="0"/>
-                                          </p:stCondLst>
-                                        </p:cTn>
-                                        <p:tgtEl>
-                                          <p:spTgt spid="11">
-                                            <p:txEl>
-                                              <p:pRg st="4" end="4"/>
-                                            </p:txEl>
-                                          </p:spTgt>
-                                        </p:tgtEl>
-                                        <p:attrNameLst>
-                                          <p:attrName>style.visibility</p:attrName>
-                                        </p:attrNameLst>
-                                      </p:cBhvr>
-                                      <p:to>
-                                        <p:strVal val="visible"/>
-                                      </p:to>
-                                    </p:set>
-                                  </p:childTnLst>
-                                </p:cTn>
-                              </p:par>
-                            </p:childTnLst>
-                          </p:cTn>
-                        </p:par>
-                      </p:childTnLst>
-                    </p:cTn>
-                  </p:par>
-                  <p:par>
-                    <p:cTn id="27" fill="hold">
-                      <p:stCondLst>
-                        <p:cond delay="indefinite"/>
-                      </p:stCondLst>
-                      <p:childTnLst>
-                        <p:par>
-                          <p:cTn id="28" fill="hold">
-                            <p:stCondLst>
-                              <p:cond delay="0"/>
-                            </p:stCondLst>
-                            <p:childTnLst>
-                              <p:par>
-                                <p:cTn id="29" presetID="1" presetClass="entr" presetSubtype="0" fill="hold" nodeType="clickEffect">
-                                  <p:stCondLst>
-                                    <p:cond delay="0"/>
-                                  </p:stCondLst>
-                                  <p:childTnLst>
-                                    <p:set>
-                                      <p:cBhvr>
-                                        <p:cTn id="30" dur="1" fill="hold">
-                                          <p:stCondLst>
-                                            <p:cond delay="0"/>
-                                          </p:stCondLst>
-                                        </p:cTn>
-                                        <p:tgtEl>
-                                          <p:spTgt spid="11">
-                                            <p:txEl>
-                                              <p:pRg st="5" end="5"/>
-                                            </p:txEl>
-                                          </p:spTgt>
-                                        </p:tgtEl>
-                                        <p:attrNameLst>
-                                          <p:attrName>style.visibility</p:attrName>
-                                        </p:attrNameLst>
-                                      </p:cBhvr>
-                                      <p:to>
-                                        <p:strVal val="visible"/>
-                                      </p:to>
-                                    </p:set>
-                                  </p:childTnLst>
-                                </p:cTn>
-                              </p:par>
-                            </p:childTnLst>
-                          </p:cTn>
-                        </p:par>
-                      </p:childTnLst>
-                    </p:cTn>
-                  </p:par>
-                  <p:par>
-                    <p:cTn id="31" fill="hold">
-                      <p:stCondLst>
-                        <p:cond delay="indefinite"/>
-                      </p:stCondLst>
-                      <p:childTnLst>
-                        <p:par>
-                          <p:cTn id="32" fill="hold">
-                            <p:stCondLst>
-                              <p:cond delay="0"/>
-                            </p:stCondLst>
-                            <p:childTnLst>
-                              <p:par>
-                                <p:cTn id="33" presetID="1" presetClass="entr" presetSubtype="0" fill="hold" nodeType="clickEffect">
-                                  <p:stCondLst>
-                                    <p:cond delay="0"/>
-                                  </p:stCondLst>
-                                  <p:childTnLst>
-                                    <p:set>
-                                      <p:cBhvr>
-                                        <p:cTn id="34" dur="1" fill="hold">
-                                          <p:stCondLst>
-                                            <p:cond delay="0"/>
-                                          </p:stCondLst>
-                                        </p:cTn>
-                                        <p:tgtEl>
-                                          <p:spTgt spid="11">
-                                            <p:txEl>
-                                              <p:pRg st="6" end="6"/>
-                                            </p:txEl>
-                                          </p:spTgt>
-                                        </p:tgtEl>
-                                        <p:attrNameLst>
-                                          <p:attrName>style.visibility</p:attrName>
-                                        </p:attrNameLst>
-                                      </p:cBhvr>
-                                      <p:to>
-                                        <p:strVal val="visible"/>
-                                      </p:to>
-                                    </p:set>
-                                  </p:childTnLst>
-                                </p:cTn>
-                              </p:par>
-                            </p:childTnLst>
-                          </p:cTn>
-                        </p:par>
-                      </p:childTnLst>
-                    </p:cTn>
-                  </p:par>
-                  <p:par>
-                    <p:cTn id="35" fill="hold">
-                      <p:stCondLst>
-                        <p:cond delay="indefinite"/>
-                      </p:stCondLst>
-                      <p:childTnLst>
-                        <p:par>
-                          <p:cTn id="36" fill="hold">
-                            <p:stCondLst>
-                              <p:cond delay="0"/>
-                            </p:stCondLst>
-                            <p:childTnLst>
-                              <p:par>
-                                <p:cTn id="37" presetID="1" presetClass="entr" presetSubtype="0" fill="hold" nodeType="clickEffect">
-                                  <p:stCondLst>
-                                    <p:cond delay="0"/>
-                                  </p:stCondLst>
-                                  <p:childTnLst>
-                                    <p:set>
-                                      <p:cBhvr>
-                                        <p:cTn id="38" dur="1" fill="hold">
-                                          <p:stCondLst>
-                                            <p:cond delay="0"/>
-                                          </p:stCondLst>
-                                        </p:cTn>
-                                        <p:tgtEl>
-                                          <p:spTgt spid="11">
-                                            <p:txEl>
-                                              <p:pRg st="7" end="7"/>
-                                            </p:txEl>
-                                          </p:spTgt>
-                                        </p:tgtEl>
-                                        <p:attrNameLst>
-                                          <p:attrName>style.visibility</p:attrName>
-                                        </p:attrNameLst>
-                                      </p:cBhvr>
-                                      <p:to>
-                                        <p:strVal val="visible"/>
-                                      </p:to>
-                                    </p:set>
-                                  </p:childTnLst>
-                                </p:cTn>
-                              </p:par>
-                            </p:childTnLst>
-                          </p:cTn>
-                        </p:par>
-                      </p:childTnLst>
-                    </p:cTn>
-                  </p:par>
-                  <p:par>
-                    <p:cTn id="39" fill="hold">
-                      <p:stCondLst>
-                        <p:cond delay="indefinite"/>
-                      </p:stCondLst>
-                      <p:childTnLst>
-                        <p:par>
-                          <p:cTn id="40" fill="hold">
-                            <p:stCondLst>
-                              <p:cond delay="0"/>
-                            </p:stCondLst>
-                            <p:childTnLst>
-                              <p:par>
-                                <p:cTn id="41" presetID="1" presetClass="entr" presetSubtype="0" fill="hold" nodeType="clickEffect">
-                                  <p:stCondLst>
-                                    <p:cond delay="0"/>
-                                  </p:stCondLst>
-                                  <p:childTnLst>
-                                    <p:set>
-                                      <p:cBhvr>
-                                        <p:cTn id="42" dur="1" fill="hold">
-                                          <p:stCondLst>
-                                            <p:cond delay="0"/>
-                                          </p:stCondLst>
-                                        </p:cTn>
-                                        <p:tgtEl>
-                                          <p:spTgt spid="11">
-                                            <p:txEl>
-                                              <p:pRg st="8" end="8"/>
                                             </p:txEl>
                                           </p:spTgt>
                                         </p:tgtEl>

</xml_diff>

<commit_message>
update powerpoint add schemas
</commit_message>
<xml_diff>
--- a/56359/Présentation/AntoineGhigny_ExploitatonDeFaillesDeSecurite.pptx
+++ b/56359/Présentation/AntoineGhigny_ExploitatonDeFaillesDeSecurite.pptx
@@ -5,7 +5,7 @@
     <p:sldMasterId id="2147483648" r:id="rId1"/>
   </p:sldMasterIdLst>
   <p:notesMasterIdLst>
-    <p:notesMasterId r:id="rId37"/>
+    <p:notesMasterId r:id="rId38"/>
   </p:notesMasterIdLst>
   <p:sldIdLst>
     <p:sldId id="256" r:id="rId2"/>
@@ -36,13 +36,14 @@
     <p:sldId id="293" r:id="rId27"/>
     <p:sldId id="294" r:id="rId28"/>
     <p:sldId id="292" r:id="rId29"/>
-    <p:sldId id="289" r:id="rId30"/>
-    <p:sldId id="270" r:id="rId31"/>
-    <p:sldId id="297" r:id="rId32"/>
-    <p:sldId id="298" r:id="rId33"/>
-    <p:sldId id="296" r:id="rId34"/>
-    <p:sldId id="271" r:id="rId35"/>
-    <p:sldId id="284" r:id="rId36"/>
+    <p:sldId id="303" r:id="rId30"/>
+    <p:sldId id="289" r:id="rId31"/>
+    <p:sldId id="270" r:id="rId32"/>
+    <p:sldId id="297" r:id="rId33"/>
+    <p:sldId id="298" r:id="rId34"/>
+    <p:sldId id="296" r:id="rId35"/>
+    <p:sldId id="271" r:id="rId36"/>
+    <p:sldId id="284" r:id="rId37"/>
   </p:sldIdLst>
   <p:sldSz cx="12192000" cy="6858000"/>
   <p:notesSz cx="6858000" cy="9144000"/>
@@ -2690,6 +2691,15 @@
               <a:latin typeface="Halcom"/>
             </a:endParaRPr>
           </a:p>
+          <a:p>
+            <a:endParaRPr lang="fr-FR" b="0" i="0" dirty="0">
+              <a:solidFill>
+                <a:srgbClr val="FFFFFF"/>
+              </a:solidFill>
+              <a:effectLst/>
+              <a:latin typeface="Halcom"/>
+            </a:endParaRPr>
+          </a:p>
         </p:txBody>
       </p:sp>
       <p:sp>
@@ -2718,7 +2728,7 @@
     </p:spTree>
     <p:extLst>
       <p:ext uri="{BB962C8B-B14F-4D97-AF65-F5344CB8AC3E}">
-        <p14:creationId xmlns:p14="http://schemas.microsoft.com/office/powerpoint/2010/main" val="1484814626"/>
+        <p14:creationId xmlns:p14="http://schemas.microsoft.com/office/powerpoint/2010/main" val="938414379"/>
       </p:ext>
     </p:extLst>
   </p:cSld>
@@ -2900,7 +2910,7 @@
       </p:grpSpPr>
       <p:sp>
         <p:nvSpPr>
-          <p:cNvPr id="2" name="Espace réservé de l'image des diapositives 1"/>
+          <p:cNvPr id="2" name="Slide Image Placeholder 1"/>
           <p:cNvSpPr>
             <a:spLocks noGrp="1" noRot="1" noChangeAspect="1"/>
           </p:cNvSpPr>
@@ -2912,7 +2922,7 @@
       </p:sp>
       <p:sp>
         <p:nvSpPr>
-          <p:cNvPr id="3" name="Espace réservé des notes 2"/>
+          <p:cNvPr id="3" name="Notes Placeholder 2"/>
           <p:cNvSpPr>
             <a:spLocks noGrp="1"/>
           </p:cNvSpPr>
@@ -2925,28 +2935,19 @@
           <a:bodyPr/>
           <a:lstStyle/>
           <a:p>
-            <a:endParaRPr lang="fr-FR" dirty="0"/>
-          </a:p>
-          <a:p>
-            <a:endParaRPr lang="fr-BE" dirty="0"/>
-          </a:p>
-          <a:p>
-            <a:r>
-              <a:rPr lang="fr-BE" dirty="0"/>
-              <a:t>https://www.weareclimb.fr/guides/investir-crypto/ecologie-environnement-cryptomonnaie</a:t>
-            </a:r>
-          </a:p>
-          <a:p>
-            <a:r>
-              <a:rPr lang="fr-BE" dirty="0"/>
-              <a:t>https://www.journaldunet.com/economie/finance/1506105-les-cryptomonnaies-sont-elles-ecologiques-ou-non/</a:t>
-            </a:r>
-          </a:p>
-        </p:txBody>
-      </p:sp>
-      <p:sp>
-        <p:nvSpPr>
-          <p:cNvPr id="4" name="Espace réservé du numéro de diapositive 3"/>
+            <a:endParaRPr lang="fr-FR" b="0" i="0" dirty="0">
+              <a:solidFill>
+                <a:srgbClr val="FFFFFF"/>
+              </a:solidFill>
+              <a:effectLst/>
+              <a:latin typeface="Halcom"/>
+            </a:endParaRPr>
+          </a:p>
+        </p:txBody>
+      </p:sp>
+      <p:sp>
+        <p:nvSpPr>
+          <p:cNvPr id="4" name="Slide Number Placeholder 3"/>
           <p:cNvSpPr>
             <a:spLocks noGrp="1"/>
           </p:cNvSpPr>
@@ -2970,7 +2971,7 @@
     </p:spTree>
     <p:extLst>
       <p:ext uri="{BB962C8B-B14F-4D97-AF65-F5344CB8AC3E}">
-        <p14:creationId xmlns:p14="http://schemas.microsoft.com/office/powerpoint/2010/main" val="1789556067"/>
+        <p14:creationId xmlns:p14="http://schemas.microsoft.com/office/powerpoint/2010/main" val="1484814626"/>
       </p:ext>
     </p:extLst>
   </p:cSld>
@@ -3069,7 +3070,7 @@
     </p:spTree>
     <p:extLst>
       <p:ext uri="{BB962C8B-B14F-4D97-AF65-F5344CB8AC3E}">
-        <p14:creationId xmlns:p14="http://schemas.microsoft.com/office/powerpoint/2010/main" val="2383255132"/>
+        <p14:creationId xmlns:p14="http://schemas.microsoft.com/office/powerpoint/2010/main" val="1789556067"/>
       </p:ext>
     </p:extLst>
   </p:cSld>
@@ -3168,7 +3169,7 @@
     </p:spTree>
     <p:extLst>
       <p:ext uri="{BB962C8B-B14F-4D97-AF65-F5344CB8AC3E}">
-        <p14:creationId xmlns:p14="http://schemas.microsoft.com/office/powerpoint/2010/main" val="3397178852"/>
+        <p14:creationId xmlns:p14="http://schemas.microsoft.com/office/powerpoint/2010/main" val="2383255132"/>
       </p:ext>
     </p:extLst>
   </p:cSld>
@@ -3267,7 +3268,7 @@
     </p:spTree>
     <p:extLst>
       <p:ext uri="{BB962C8B-B14F-4D97-AF65-F5344CB8AC3E}">
-        <p14:creationId xmlns:p14="http://schemas.microsoft.com/office/powerpoint/2010/main" val="426276008"/>
+        <p14:creationId xmlns:p14="http://schemas.microsoft.com/office/powerpoint/2010/main" val="3397178852"/>
       </p:ext>
     </p:extLst>
   </p:cSld>
@@ -3321,18 +3322,21 @@
           <a:bodyPr/>
           <a:lstStyle/>
           <a:p>
+            <a:endParaRPr lang="fr-FR" dirty="0"/>
+          </a:p>
+          <a:p>
+            <a:endParaRPr lang="fr-BE" dirty="0"/>
+          </a:p>
+          <a:p>
             <a:r>
               <a:rPr lang="fr-BE" dirty="0"/>
-              <a:t>Lorsqu’on demande aux gens pourquoi ils ont peu des cryptomonnaies, pour beaucoup, les sommes nécessaires à un investissement sont bien trop importants, il est facile de se dire que c’est hors de portée, d’autant plus lorsque l’on voit des sommes si importantes de la valeur de celles-ci. Et pourtant ce n’est pas vrai, il est possible d’acheter des fragments de cryptos…</a:t>
-            </a:r>
-          </a:p>
-          <a:p>
-            <a:endParaRPr lang="fr-BE" dirty="0"/>
+              <a:t>https://www.weareclimb.fr/guides/investir-crypto/ecologie-environnement-cryptomonnaie</a:t>
+            </a:r>
           </a:p>
           <a:p>
             <a:r>
               <a:rPr lang="fr-BE" dirty="0"/>
-              <a:t>https://www.capital.fr/crypto/3-raisons-pour-lesquels-les-cryptomonnaies-font-peur-et-comment-etre-rassure-1433579</a:t>
+              <a:t>https://www.journaldunet.com/economie/finance/1506105-les-cryptomonnaies-sont-elles-ecologiques-ou-non/</a:t>
             </a:r>
           </a:p>
         </p:txBody>
@@ -3363,7 +3367,7 @@
     </p:spTree>
     <p:extLst>
       <p:ext uri="{BB962C8B-B14F-4D97-AF65-F5344CB8AC3E}">
-        <p14:creationId xmlns:p14="http://schemas.microsoft.com/office/powerpoint/2010/main" val="1148149551"/>
+        <p14:creationId xmlns:p14="http://schemas.microsoft.com/office/powerpoint/2010/main" val="426276008"/>
       </p:ext>
     </p:extLst>
   </p:cSld>
@@ -3451,6 +3455,102 @@
             <a:fld id="{D7E2A26B-DFC1-4D08-ADAD-50C16B11DC3D}" type="slidenum">
               <a:rPr lang="fr-FR" smtClean="0"/>
               <a:t>35</a:t>
+            </a:fld>
+            <a:endParaRPr lang="fr-FR"/>
+          </a:p>
+        </p:txBody>
+      </p:sp>
+    </p:spTree>
+    <p:extLst>
+      <p:ext uri="{BB962C8B-B14F-4D97-AF65-F5344CB8AC3E}">
+        <p14:creationId xmlns:p14="http://schemas.microsoft.com/office/powerpoint/2010/main" val="1148149551"/>
+      </p:ext>
+    </p:extLst>
+  </p:cSld>
+  <p:clrMapOvr>
+    <a:masterClrMapping/>
+  </p:clrMapOvr>
+</p:notes>
+</file>
+
+<file path=ppt/notesSlides/notesSlide36.xml><?xml version="1.0" encoding="utf-8"?>
+<p:notes xmlns:a="http://schemas.openxmlformats.org/drawingml/2006/main" xmlns:r="http://schemas.openxmlformats.org/officeDocument/2006/relationships" xmlns:p="http://schemas.openxmlformats.org/presentationml/2006/main">
+  <p:cSld>
+    <p:spTree>
+      <p:nvGrpSpPr>
+        <p:cNvPr id="1" name=""/>
+        <p:cNvGrpSpPr/>
+        <p:nvPr/>
+      </p:nvGrpSpPr>
+      <p:grpSpPr>
+        <a:xfrm>
+          <a:off x="0" y="0"/>
+          <a:ext cx="0" cy="0"/>
+          <a:chOff x="0" y="0"/>
+          <a:chExt cx="0" cy="0"/>
+        </a:xfrm>
+      </p:grpSpPr>
+      <p:sp>
+        <p:nvSpPr>
+          <p:cNvPr id="2" name="Espace réservé de l'image des diapositives 1"/>
+          <p:cNvSpPr>
+            <a:spLocks noGrp="1" noRot="1" noChangeAspect="1"/>
+          </p:cNvSpPr>
+          <p:nvPr>
+            <p:ph type="sldImg"/>
+          </p:nvPr>
+        </p:nvSpPr>
+        <p:spPr/>
+      </p:sp>
+      <p:sp>
+        <p:nvSpPr>
+          <p:cNvPr id="3" name="Espace réservé des notes 2"/>
+          <p:cNvSpPr>
+            <a:spLocks noGrp="1"/>
+          </p:cNvSpPr>
+          <p:nvPr>
+            <p:ph type="body" idx="1"/>
+          </p:nvPr>
+        </p:nvSpPr>
+        <p:spPr/>
+        <p:txBody>
+          <a:bodyPr/>
+          <a:lstStyle/>
+          <a:p>
+            <a:r>
+              <a:rPr lang="fr-BE" dirty="0"/>
+              <a:t>Lorsqu’on demande aux gens pourquoi ils ont peu des cryptomonnaies, pour beaucoup, les sommes nécessaires à un investissement sont bien trop importants, il est facile de se dire que c’est hors de portée, d’autant plus lorsque l’on voit des sommes si importantes de la valeur de celles-ci. Et pourtant ce n’est pas vrai, il est possible d’acheter des fragments de cryptos…</a:t>
+            </a:r>
+          </a:p>
+          <a:p>
+            <a:endParaRPr lang="fr-BE" dirty="0"/>
+          </a:p>
+          <a:p>
+            <a:r>
+              <a:rPr lang="fr-BE" dirty="0"/>
+              <a:t>https://www.capital.fr/crypto/3-raisons-pour-lesquels-les-cryptomonnaies-font-peur-et-comment-etre-rassure-1433579</a:t>
+            </a:r>
+          </a:p>
+        </p:txBody>
+      </p:sp>
+      <p:sp>
+        <p:nvSpPr>
+          <p:cNvPr id="4" name="Espace réservé du numéro de diapositive 3"/>
+          <p:cNvSpPr>
+            <a:spLocks noGrp="1"/>
+          </p:cNvSpPr>
+          <p:nvPr>
+            <p:ph type="sldNum" sz="quarter" idx="5"/>
+          </p:nvPr>
+        </p:nvSpPr>
+        <p:spPr/>
+        <p:txBody>
+          <a:bodyPr/>
+          <a:lstStyle/>
+          <a:p>
+            <a:fld id="{D7E2A26B-DFC1-4D08-ADAD-50C16B11DC3D}" type="slidenum">
+              <a:rPr lang="fr-FR" smtClean="0"/>
+              <a:t>36</a:t>
             </a:fld>
             <a:endParaRPr lang="fr-FR"/>
           </a:p>
@@ -9840,14 +9940,14 @@
           <a:p>
             <a:pPr lvl="2"/>
             <a:r>
-              <a:rPr lang="fr-BE" dirty="0"/>
+              <a:rPr lang="fr-BE" sz="2400" dirty="0"/>
               <a:t>Variables d’environnement</a:t>
             </a:r>
           </a:p>
           <a:p>
             <a:pPr lvl="2"/>
             <a:r>
-              <a:rPr lang="fr-BE" dirty="0"/>
+              <a:rPr lang="fr-BE" sz="2400" dirty="0"/>
               <a:t>PATH</a:t>
             </a:r>
           </a:p>
@@ -16002,6 +16102,530 @@
                 <a:latin typeface="Verdana" panose="020B0604030504040204" pitchFamily="34" charset="0"/>
                 <a:ea typeface="Verdana" panose="020B0604030504040204" pitchFamily="34" charset="0"/>
               </a:rPr>
+              <a:t> : Programme en C</a:t>
+            </a:r>
+          </a:p>
+        </p:txBody>
+      </p:sp>
+      <p:pic>
+        <p:nvPicPr>
+          <p:cNvPr id="4" name="Image 3">
+            <a:extLst>
+              <a:ext uri="{FF2B5EF4-FFF2-40B4-BE49-F238E27FC236}">
+                <a16:creationId xmlns:a16="http://schemas.microsoft.com/office/drawing/2014/main" id="{40C07E51-91D1-6BB1-3FBC-C8CCDB03B546}"/>
+              </a:ext>
+            </a:extLst>
+          </p:cNvPr>
+          <p:cNvPicPr>
+            <a:picLocks noChangeAspect="1"/>
+          </p:cNvPicPr>
+          <p:nvPr/>
+        </p:nvPicPr>
+        <p:blipFill>
+          <a:blip r:embed="rId3"/>
+          <a:stretch>
+            <a:fillRect/>
+          </a:stretch>
+        </p:blipFill>
+        <p:spPr>
+          <a:xfrm>
+            <a:off x="1720255" y="2237228"/>
+            <a:ext cx="8929486" cy="3120985"/>
+          </a:xfrm>
+          <a:prstGeom prst="rect">
+            <a:avLst/>
+          </a:prstGeom>
+        </p:spPr>
+      </p:pic>
+    </p:spTree>
+    <p:extLst>
+      <p:ext uri="{BB962C8B-B14F-4D97-AF65-F5344CB8AC3E}">
+        <p14:creationId xmlns:p14="http://schemas.microsoft.com/office/powerpoint/2010/main" val="1404216042"/>
+      </p:ext>
+    </p:extLst>
+  </p:cSld>
+  <p:clrMapOvr>
+    <a:masterClrMapping/>
+  </p:clrMapOvr>
+</p:sld>
+</file>
+
+<file path=ppt/slides/slide3.xml><?xml version="1.0" encoding="utf-8"?>
+<p:sld xmlns:a="http://schemas.openxmlformats.org/drawingml/2006/main" xmlns:r="http://schemas.openxmlformats.org/officeDocument/2006/relationships" xmlns:p="http://schemas.openxmlformats.org/presentationml/2006/main">
+  <p:cSld>
+    <p:spTree>
+      <p:nvGrpSpPr>
+        <p:cNvPr id="1" name=""/>
+        <p:cNvGrpSpPr/>
+        <p:nvPr/>
+      </p:nvGrpSpPr>
+      <p:grpSpPr>
+        <a:xfrm>
+          <a:off x="0" y="0"/>
+          <a:ext cx="0" cy="0"/>
+          <a:chOff x="0" y="0"/>
+          <a:chExt cx="0" cy="0"/>
+        </a:xfrm>
+      </p:grpSpPr>
+      <p:pic>
+        <p:nvPicPr>
+          <p:cNvPr id="2052" name="Picture 4" descr="Faille de sécurité majeure sur les réseaux sans-fils - Mon Technicien">
+            <a:extLst>
+              <a:ext uri="{FF2B5EF4-FFF2-40B4-BE49-F238E27FC236}">
+                <a16:creationId xmlns:a16="http://schemas.microsoft.com/office/drawing/2014/main" id="{BF0B1622-B50F-3152-4AFD-63C9754AE57E}"/>
+              </a:ext>
+            </a:extLst>
+          </p:cNvPr>
+          <p:cNvPicPr>
+            <a:picLocks noChangeAspect="1" noChangeArrowheads="1"/>
+          </p:cNvPicPr>
+          <p:nvPr/>
+        </p:nvPicPr>
+        <p:blipFill>
+          <a:blip r:embed="rId3">
+            <a:extLst>
+              <a:ext uri="{28A0092B-C50C-407E-A947-70E740481C1C}">
+                <a14:useLocalDpi xmlns:a14="http://schemas.microsoft.com/office/drawing/2010/main" val="0"/>
+              </a:ext>
+            </a:extLst>
+          </a:blip>
+          <a:srcRect/>
+          <a:stretch>
+            <a:fillRect/>
+          </a:stretch>
+        </p:blipFill>
+        <p:spPr bwMode="auto">
+          <a:xfrm>
+            <a:off x="7305381" y="2530741"/>
+            <a:ext cx="4696119" cy="2348060"/>
+          </a:xfrm>
+          <a:prstGeom prst="rect">
+            <a:avLst/>
+          </a:prstGeom>
+          <a:noFill/>
+          <a:extLst>
+            <a:ext uri="{909E8E84-426E-40DD-AFC4-6F175D3DCCD1}">
+              <a14:hiddenFill xmlns:a14="http://schemas.microsoft.com/office/drawing/2010/main">
+                <a:solidFill>
+                  <a:srgbClr val="FFFFFF"/>
+                </a:solidFill>
+              </a14:hiddenFill>
+            </a:ext>
+          </a:extLst>
+        </p:spPr>
+      </p:pic>
+      <p:sp>
+        <p:nvSpPr>
+          <p:cNvPr id="4" name="Titre 1">
+            <a:extLst>
+              <a:ext uri="{FF2B5EF4-FFF2-40B4-BE49-F238E27FC236}">
+                <a16:creationId xmlns:a16="http://schemas.microsoft.com/office/drawing/2014/main" id="{15F6865E-DB83-B3FB-ABEC-41BA4FCB47AB}"/>
+              </a:ext>
+            </a:extLst>
+          </p:cNvPr>
+          <p:cNvSpPr txBox="1">
+            <a:spLocks/>
+          </p:cNvSpPr>
+          <p:nvPr/>
+        </p:nvSpPr>
+        <p:spPr>
+          <a:xfrm>
+            <a:off x="322579" y="261920"/>
+            <a:ext cx="8057491" cy="1324596"/>
+          </a:xfrm>
+          <a:prstGeom prst="rect">
+            <a:avLst/>
+          </a:prstGeom>
+        </p:spPr>
+        <p:txBody>
+          <a:bodyPr vert="horz" lIns="91440" tIns="45720" rIns="91440" bIns="45720" rtlCol="0" anchor="ctr">
+            <a:normAutofit/>
+          </a:bodyPr>
+          <a:lstStyle>
+            <a:lvl1pPr algn="l" defTabSz="914400" rtl="0" eaLnBrk="1" latinLnBrk="0" hangingPunct="1">
+              <a:lnSpc>
+                <a:spcPct val="90000"/>
+              </a:lnSpc>
+              <a:spcBef>
+                <a:spcPct val="0"/>
+              </a:spcBef>
+              <a:buNone/>
+              <a:defRPr sz="4400" kern="1200">
+                <a:solidFill>
+                  <a:schemeClr val="tx1"/>
+                </a:solidFill>
+                <a:latin typeface="+mj-lt"/>
+                <a:ea typeface="+mj-ea"/>
+                <a:cs typeface="+mj-cs"/>
+              </a:defRPr>
+            </a:lvl1pPr>
+          </a:lstStyle>
+          <a:p>
+            <a:r>
+              <a:rPr lang="fr-FR" b="1" dirty="0">
+                <a:latin typeface="Verdana" panose="020B0604030504040204" pitchFamily="34" charset="0"/>
+                <a:ea typeface="Verdana" panose="020B0604030504040204" pitchFamily="34" charset="0"/>
+              </a:rPr>
+              <a:t>Introduction</a:t>
+            </a:r>
+            <a:endParaRPr lang="fr-BE" b="1" dirty="0">
+              <a:latin typeface="Verdana" panose="020B0604030504040204" pitchFamily="34" charset="0"/>
+              <a:ea typeface="Verdana" panose="020B0604030504040204" pitchFamily="34" charset="0"/>
+            </a:endParaRPr>
+          </a:p>
+        </p:txBody>
+      </p:sp>
+      <p:sp>
+        <p:nvSpPr>
+          <p:cNvPr id="7" name="Espace réservé du contenu 2">
+            <a:extLst>
+              <a:ext uri="{FF2B5EF4-FFF2-40B4-BE49-F238E27FC236}">
+                <a16:creationId xmlns:a16="http://schemas.microsoft.com/office/drawing/2014/main" id="{457AA67C-2F96-30AF-9EE8-93AAF412AB68}"/>
+              </a:ext>
+            </a:extLst>
+          </p:cNvPr>
+          <p:cNvSpPr txBox="1">
+            <a:spLocks/>
+          </p:cNvSpPr>
+          <p:nvPr/>
+        </p:nvSpPr>
+        <p:spPr>
+          <a:xfrm>
+            <a:off x="489878" y="1965532"/>
+            <a:ext cx="6825321" cy="4351338"/>
+          </a:xfrm>
+          <a:prstGeom prst="rect">
+            <a:avLst/>
+          </a:prstGeom>
+        </p:spPr>
+        <p:txBody>
+          <a:bodyPr vert="horz" lIns="91440" tIns="45720" rIns="91440" bIns="45720" rtlCol="0">
+            <a:normAutofit fontScale="92500" lnSpcReduction="20000"/>
+          </a:bodyPr>
+          <a:lstStyle>
+            <a:lvl1pPr marL="228600" indent="-228600" algn="l" defTabSz="914400" rtl="0" eaLnBrk="1" latinLnBrk="0" hangingPunct="1">
+              <a:lnSpc>
+                <a:spcPct val="90000"/>
+              </a:lnSpc>
+              <a:spcBef>
+                <a:spcPts val="1000"/>
+              </a:spcBef>
+              <a:buFont typeface="Arial" panose="020B0604020202020204" pitchFamily="34" charset="0"/>
+              <a:buChar char="•"/>
+              <a:defRPr sz="2800" kern="1200">
+                <a:solidFill>
+                  <a:schemeClr val="tx1"/>
+                </a:solidFill>
+                <a:latin typeface="+mn-lt"/>
+                <a:ea typeface="+mn-ea"/>
+                <a:cs typeface="+mn-cs"/>
+              </a:defRPr>
+            </a:lvl1pPr>
+            <a:lvl2pPr marL="685800" indent="-228600" algn="l" defTabSz="914400" rtl="0" eaLnBrk="1" latinLnBrk="0" hangingPunct="1">
+              <a:lnSpc>
+                <a:spcPct val="90000"/>
+              </a:lnSpc>
+              <a:spcBef>
+                <a:spcPts val="500"/>
+              </a:spcBef>
+              <a:buFont typeface="Arial" panose="020B0604020202020204" pitchFamily="34" charset="0"/>
+              <a:buChar char="•"/>
+              <a:defRPr sz="2400" kern="1200">
+                <a:solidFill>
+                  <a:schemeClr val="tx1"/>
+                </a:solidFill>
+                <a:latin typeface="+mn-lt"/>
+                <a:ea typeface="+mn-ea"/>
+                <a:cs typeface="+mn-cs"/>
+              </a:defRPr>
+            </a:lvl2pPr>
+            <a:lvl3pPr marL="1143000" indent="-228600" algn="l" defTabSz="914400" rtl="0" eaLnBrk="1" latinLnBrk="0" hangingPunct="1">
+              <a:lnSpc>
+                <a:spcPct val="90000"/>
+              </a:lnSpc>
+              <a:spcBef>
+                <a:spcPts val="500"/>
+              </a:spcBef>
+              <a:buFont typeface="Arial" panose="020B0604020202020204" pitchFamily="34" charset="0"/>
+              <a:buChar char="•"/>
+              <a:defRPr sz="2000" kern="1200">
+                <a:solidFill>
+                  <a:schemeClr val="tx1"/>
+                </a:solidFill>
+                <a:latin typeface="+mn-lt"/>
+                <a:ea typeface="+mn-ea"/>
+                <a:cs typeface="+mn-cs"/>
+              </a:defRPr>
+            </a:lvl3pPr>
+            <a:lvl4pPr marL="1600200" indent="-228600" algn="l" defTabSz="914400" rtl="0" eaLnBrk="1" latinLnBrk="0" hangingPunct="1">
+              <a:lnSpc>
+                <a:spcPct val="90000"/>
+              </a:lnSpc>
+              <a:spcBef>
+                <a:spcPts val="500"/>
+              </a:spcBef>
+              <a:buFont typeface="Arial" panose="020B0604020202020204" pitchFamily="34" charset="0"/>
+              <a:buChar char="•"/>
+              <a:defRPr sz="1800" kern="1200">
+                <a:solidFill>
+                  <a:schemeClr val="tx1"/>
+                </a:solidFill>
+                <a:latin typeface="+mn-lt"/>
+                <a:ea typeface="+mn-ea"/>
+                <a:cs typeface="+mn-cs"/>
+              </a:defRPr>
+            </a:lvl4pPr>
+            <a:lvl5pPr marL="2057400" indent="-228600" algn="l" defTabSz="914400" rtl="0" eaLnBrk="1" latinLnBrk="0" hangingPunct="1">
+              <a:lnSpc>
+                <a:spcPct val="90000"/>
+              </a:lnSpc>
+              <a:spcBef>
+                <a:spcPts val="500"/>
+              </a:spcBef>
+              <a:buFont typeface="Arial" panose="020B0604020202020204" pitchFamily="34" charset="0"/>
+              <a:buChar char="•"/>
+              <a:defRPr sz="1800" kern="1200">
+                <a:solidFill>
+                  <a:schemeClr val="tx1"/>
+                </a:solidFill>
+                <a:latin typeface="+mn-lt"/>
+                <a:ea typeface="+mn-ea"/>
+                <a:cs typeface="+mn-cs"/>
+              </a:defRPr>
+            </a:lvl5pPr>
+            <a:lvl6pPr marL="2514600" indent="-228600" algn="l" defTabSz="914400" rtl="0" eaLnBrk="1" latinLnBrk="0" hangingPunct="1">
+              <a:lnSpc>
+                <a:spcPct val="90000"/>
+              </a:lnSpc>
+              <a:spcBef>
+                <a:spcPts val="500"/>
+              </a:spcBef>
+              <a:buFont typeface="Arial" panose="020B0604020202020204" pitchFamily="34" charset="0"/>
+              <a:buChar char="•"/>
+              <a:defRPr sz="1800" kern="1200">
+                <a:solidFill>
+                  <a:schemeClr val="tx1"/>
+                </a:solidFill>
+                <a:latin typeface="+mn-lt"/>
+                <a:ea typeface="+mn-ea"/>
+                <a:cs typeface="+mn-cs"/>
+              </a:defRPr>
+            </a:lvl6pPr>
+            <a:lvl7pPr marL="2971800" indent="-228600" algn="l" defTabSz="914400" rtl="0" eaLnBrk="1" latinLnBrk="0" hangingPunct="1">
+              <a:lnSpc>
+                <a:spcPct val="90000"/>
+              </a:lnSpc>
+              <a:spcBef>
+                <a:spcPts val="500"/>
+              </a:spcBef>
+              <a:buFont typeface="Arial" panose="020B0604020202020204" pitchFamily="34" charset="0"/>
+              <a:buChar char="•"/>
+              <a:defRPr sz="1800" kern="1200">
+                <a:solidFill>
+                  <a:schemeClr val="tx1"/>
+                </a:solidFill>
+                <a:latin typeface="+mn-lt"/>
+                <a:ea typeface="+mn-ea"/>
+                <a:cs typeface="+mn-cs"/>
+              </a:defRPr>
+            </a:lvl7pPr>
+            <a:lvl8pPr marL="3429000" indent="-228600" algn="l" defTabSz="914400" rtl="0" eaLnBrk="1" latinLnBrk="0" hangingPunct="1">
+              <a:lnSpc>
+                <a:spcPct val="90000"/>
+              </a:lnSpc>
+              <a:spcBef>
+                <a:spcPts val="500"/>
+              </a:spcBef>
+              <a:buFont typeface="Arial" panose="020B0604020202020204" pitchFamily="34" charset="0"/>
+              <a:buChar char="•"/>
+              <a:defRPr sz="1800" kern="1200">
+                <a:solidFill>
+                  <a:schemeClr val="tx1"/>
+                </a:solidFill>
+                <a:latin typeface="+mn-lt"/>
+                <a:ea typeface="+mn-ea"/>
+                <a:cs typeface="+mn-cs"/>
+              </a:defRPr>
+            </a:lvl8pPr>
+            <a:lvl9pPr marL="3886200" indent="-228600" algn="l" defTabSz="914400" rtl="0" eaLnBrk="1" latinLnBrk="0" hangingPunct="1">
+              <a:lnSpc>
+                <a:spcPct val="90000"/>
+              </a:lnSpc>
+              <a:spcBef>
+                <a:spcPts val="500"/>
+              </a:spcBef>
+              <a:buFont typeface="Arial" panose="020B0604020202020204" pitchFamily="34" charset="0"/>
+              <a:buChar char="•"/>
+              <a:defRPr sz="1800" kern="1200">
+                <a:solidFill>
+                  <a:schemeClr val="tx1"/>
+                </a:solidFill>
+                <a:latin typeface="+mn-lt"/>
+                <a:ea typeface="+mn-ea"/>
+                <a:cs typeface="+mn-cs"/>
+              </a:defRPr>
+            </a:lvl9pPr>
+          </a:lstStyle>
+          <a:p>
+            <a:r>
+              <a:rPr lang="fr-BE" dirty="0"/>
+              <a:t>Aborder 2 failles de sécurité</a:t>
+            </a:r>
+          </a:p>
+          <a:p>
+            <a:pPr lvl="1"/>
+            <a:r>
+              <a:rPr lang="fr-BE" dirty="0"/>
+              <a:t>Origine</a:t>
+            </a:r>
+          </a:p>
+          <a:p>
+            <a:pPr lvl="1"/>
+            <a:r>
+              <a:rPr lang="fr-BE" dirty="0"/>
+              <a:t>Exploitation</a:t>
+            </a:r>
+          </a:p>
+          <a:p>
+            <a:pPr lvl="1"/>
+            <a:r>
+              <a:rPr lang="fr-BE" dirty="0"/>
+              <a:t>Explication</a:t>
+            </a:r>
+          </a:p>
+          <a:p>
+            <a:pPr lvl="1"/>
+            <a:r>
+              <a:rPr lang="fr-BE" dirty="0"/>
+              <a:t>Comment s’en protéger</a:t>
+            </a:r>
+          </a:p>
+          <a:p>
+            <a:r>
+              <a:rPr lang="fr-BE" dirty="0"/>
+              <a:t>Concepts</a:t>
+            </a:r>
+          </a:p>
+          <a:p>
+            <a:pPr lvl="1"/>
+            <a:r>
+              <a:rPr lang="fr-BE" dirty="0"/>
+              <a:t>Ecriture hors-limite</a:t>
+            </a:r>
+          </a:p>
+          <a:p>
+            <a:pPr lvl="1"/>
+            <a:r>
+              <a:rPr lang="fr-BE" dirty="0"/>
+              <a:t>La pile d’appels</a:t>
+            </a:r>
+          </a:p>
+          <a:p>
+            <a:pPr lvl="1"/>
+            <a:r>
+              <a:rPr lang="fr-BE" dirty="0"/>
+              <a:t>Librairies </a:t>
+            </a:r>
+            <a:r>
+              <a:rPr lang="fr-BE" dirty="0" err="1"/>
+              <a:t>Polkit</a:t>
+            </a:r>
+            <a:r>
+              <a:rPr lang="fr-BE" dirty="0"/>
+              <a:t> et </a:t>
+            </a:r>
+            <a:r>
+              <a:rPr lang="fr-BE" dirty="0" err="1"/>
+              <a:t>Glib</a:t>
+            </a:r>
+            <a:endParaRPr lang="fr-BE" dirty="0"/>
+          </a:p>
+          <a:p>
+            <a:pPr lvl="1"/>
+            <a:r>
+              <a:rPr lang="fr-BE" dirty="0"/>
+              <a:t>Insertion de données dans les variables d’environnement</a:t>
+            </a:r>
+          </a:p>
+          <a:p>
+            <a:pPr lvl="1"/>
+            <a:r>
+              <a:rPr lang="fr-BE" dirty="0"/>
+              <a:t>Fonctionnement et utilisation du GRUB dans une attaque physique</a:t>
+            </a:r>
+          </a:p>
+        </p:txBody>
+      </p:sp>
+    </p:spTree>
+    <p:extLst>
+      <p:ext uri="{BB962C8B-B14F-4D97-AF65-F5344CB8AC3E}">
+        <p14:creationId xmlns:p14="http://schemas.microsoft.com/office/powerpoint/2010/main" val="386962581"/>
+      </p:ext>
+    </p:extLst>
+  </p:cSld>
+  <p:clrMapOvr>
+    <a:masterClrMapping/>
+  </p:clrMapOvr>
+</p:sld>
+</file>
+
+<file path=ppt/slides/slide30.xml><?xml version="1.0" encoding="utf-8"?>
+<p:sld xmlns:a="http://schemas.openxmlformats.org/drawingml/2006/main" xmlns:r="http://schemas.openxmlformats.org/officeDocument/2006/relationships" xmlns:p="http://schemas.openxmlformats.org/presentationml/2006/main">
+  <p:cSld>
+    <p:spTree>
+      <p:nvGrpSpPr>
+        <p:cNvPr id="1" name=""/>
+        <p:cNvGrpSpPr/>
+        <p:nvPr/>
+      </p:nvGrpSpPr>
+      <p:grpSpPr>
+        <a:xfrm>
+          <a:off x="0" y="0"/>
+          <a:ext cx="0" cy="0"/>
+          <a:chOff x="0" y="0"/>
+          <a:chExt cx="0" cy="0"/>
+        </a:xfrm>
+      </p:grpSpPr>
+      <p:sp>
+        <p:nvSpPr>
+          <p:cNvPr id="10" name="Titre 1">
+            <a:extLst>
+              <a:ext uri="{FF2B5EF4-FFF2-40B4-BE49-F238E27FC236}">
+                <a16:creationId xmlns:a16="http://schemas.microsoft.com/office/drawing/2014/main" id="{7974BEF4-058F-CAF1-A327-7BC1089CEE78}"/>
+              </a:ext>
+            </a:extLst>
+          </p:cNvPr>
+          <p:cNvSpPr>
+            <a:spLocks noGrp="1"/>
+          </p:cNvSpPr>
+          <p:nvPr>
+            <p:ph type="title"/>
+          </p:nvPr>
+        </p:nvSpPr>
+        <p:spPr>
+          <a:xfrm>
+            <a:off x="322579" y="261920"/>
+            <a:ext cx="11724278" cy="1324596"/>
+          </a:xfrm>
+        </p:spPr>
+        <p:txBody>
+          <a:bodyPr>
+            <a:normAutofit/>
+          </a:bodyPr>
+          <a:lstStyle/>
+          <a:p>
+            <a:r>
+              <a:rPr lang="fr-BE" b="1" dirty="0" err="1">
+                <a:latin typeface="Verdana" panose="020B0604030504040204" pitchFamily="34" charset="0"/>
+                <a:ea typeface="Verdana" panose="020B0604030504040204" pitchFamily="34" charset="0"/>
+              </a:rPr>
+              <a:t>PwnKit</a:t>
+            </a:r>
+            <a:r>
+              <a:rPr lang="fr-BE" b="1" dirty="0">
+                <a:latin typeface="Verdana" panose="020B0604030504040204" pitchFamily="34" charset="0"/>
+                <a:ea typeface="Verdana" panose="020B0604030504040204" pitchFamily="34" charset="0"/>
+              </a:rPr>
               <a:t> : Comment a été corrigée cette faille ?</a:t>
             </a:r>
           </a:p>
@@ -16145,426 +16769,7 @@
 </p:sld>
 </file>
 
-<file path=ppt/slides/slide3.xml><?xml version="1.0" encoding="utf-8"?>
-<p:sld xmlns:a="http://schemas.openxmlformats.org/drawingml/2006/main" xmlns:r="http://schemas.openxmlformats.org/officeDocument/2006/relationships" xmlns:p="http://schemas.openxmlformats.org/presentationml/2006/main">
-  <p:cSld>
-    <p:spTree>
-      <p:nvGrpSpPr>
-        <p:cNvPr id="1" name=""/>
-        <p:cNvGrpSpPr/>
-        <p:nvPr/>
-      </p:nvGrpSpPr>
-      <p:grpSpPr>
-        <a:xfrm>
-          <a:off x="0" y="0"/>
-          <a:ext cx="0" cy="0"/>
-          <a:chOff x="0" y="0"/>
-          <a:chExt cx="0" cy="0"/>
-        </a:xfrm>
-      </p:grpSpPr>
-      <p:pic>
-        <p:nvPicPr>
-          <p:cNvPr id="2052" name="Picture 4" descr="Faille de sécurité majeure sur les réseaux sans-fils - Mon Technicien">
-            <a:extLst>
-              <a:ext uri="{FF2B5EF4-FFF2-40B4-BE49-F238E27FC236}">
-                <a16:creationId xmlns:a16="http://schemas.microsoft.com/office/drawing/2014/main" id="{BF0B1622-B50F-3152-4AFD-63C9754AE57E}"/>
-              </a:ext>
-            </a:extLst>
-          </p:cNvPr>
-          <p:cNvPicPr>
-            <a:picLocks noChangeAspect="1" noChangeArrowheads="1"/>
-          </p:cNvPicPr>
-          <p:nvPr/>
-        </p:nvPicPr>
-        <p:blipFill>
-          <a:blip r:embed="rId3">
-            <a:extLst>
-              <a:ext uri="{28A0092B-C50C-407E-A947-70E740481C1C}">
-                <a14:useLocalDpi xmlns:a14="http://schemas.microsoft.com/office/drawing/2010/main" val="0"/>
-              </a:ext>
-            </a:extLst>
-          </a:blip>
-          <a:srcRect/>
-          <a:stretch>
-            <a:fillRect/>
-          </a:stretch>
-        </p:blipFill>
-        <p:spPr bwMode="auto">
-          <a:xfrm>
-            <a:off x="7305381" y="2530741"/>
-            <a:ext cx="4696119" cy="2348060"/>
-          </a:xfrm>
-          <a:prstGeom prst="rect">
-            <a:avLst/>
-          </a:prstGeom>
-          <a:noFill/>
-          <a:extLst>
-            <a:ext uri="{909E8E84-426E-40DD-AFC4-6F175D3DCCD1}">
-              <a14:hiddenFill xmlns:a14="http://schemas.microsoft.com/office/drawing/2010/main">
-                <a:solidFill>
-                  <a:srgbClr val="FFFFFF"/>
-                </a:solidFill>
-              </a14:hiddenFill>
-            </a:ext>
-          </a:extLst>
-        </p:spPr>
-      </p:pic>
-      <p:sp>
-        <p:nvSpPr>
-          <p:cNvPr id="4" name="Titre 1">
-            <a:extLst>
-              <a:ext uri="{FF2B5EF4-FFF2-40B4-BE49-F238E27FC236}">
-                <a16:creationId xmlns:a16="http://schemas.microsoft.com/office/drawing/2014/main" id="{15F6865E-DB83-B3FB-ABEC-41BA4FCB47AB}"/>
-              </a:ext>
-            </a:extLst>
-          </p:cNvPr>
-          <p:cNvSpPr txBox="1">
-            <a:spLocks/>
-          </p:cNvSpPr>
-          <p:nvPr/>
-        </p:nvSpPr>
-        <p:spPr>
-          <a:xfrm>
-            <a:off x="322579" y="261920"/>
-            <a:ext cx="8057491" cy="1324596"/>
-          </a:xfrm>
-          <a:prstGeom prst="rect">
-            <a:avLst/>
-          </a:prstGeom>
-        </p:spPr>
-        <p:txBody>
-          <a:bodyPr vert="horz" lIns="91440" tIns="45720" rIns="91440" bIns="45720" rtlCol="0" anchor="ctr">
-            <a:normAutofit/>
-          </a:bodyPr>
-          <a:lstStyle>
-            <a:lvl1pPr algn="l" defTabSz="914400" rtl="0" eaLnBrk="1" latinLnBrk="0" hangingPunct="1">
-              <a:lnSpc>
-                <a:spcPct val="90000"/>
-              </a:lnSpc>
-              <a:spcBef>
-                <a:spcPct val="0"/>
-              </a:spcBef>
-              <a:buNone/>
-              <a:defRPr sz="4400" kern="1200">
-                <a:solidFill>
-                  <a:schemeClr val="tx1"/>
-                </a:solidFill>
-                <a:latin typeface="+mj-lt"/>
-                <a:ea typeface="+mj-ea"/>
-                <a:cs typeface="+mj-cs"/>
-              </a:defRPr>
-            </a:lvl1pPr>
-          </a:lstStyle>
-          <a:p>
-            <a:r>
-              <a:rPr lang="fr-FR" b="1" dirty="0">
-                <a:latin typeface="Verdana" panose="020B0604030504040204" pitchFamily="34" charset="0"/>
-                <a:ea typeface="Verdana" panose="020B0604030504040204" pitchFamily="34" charset="0"/>
-              </a:rPr>
-              <a:t>Introduction</a:t>
-            </a:r>
-            <a:endParaRPr lang="fr-BE" b="1" dirty="0">
-              <a:latin typeface="Verdana" panose="020B0604030504040204" pitchFamily="34" charset="0"/>
-              <a:ea typeface="Verdana" panose="020B0604030504040204" pitchFamily="34" charset="0"/>
-            </a:endParaRPr>
-          </a:p>
-        </p:txBody>
-      </p:sp>
-      <p:sp>
-        <p:nvSpPr>
-          <p:cNvPr id="7" name="Espace réservé du contenu 2">
-            <a:extLst>
-              <a:ext uri="{FF2B5EF4-FFF2-40B4-BE49-F238E27FC236}">
-                <a16:creationId xmlns:a16="http://schemas.microsoft.com/office/drawing/2014/main" id="{457AA67C-2F96-30AF-9EE8-93AAF412AB68}"/>
-              </a:ext>
-            </a:extLst>
-          </p:cNvPr>
-          <p:cNvSpPr txBox="1">
-            <a:spLocks/>
-          </p:cNvSpPr>
-          <p:nvPr/>
-        </p:nvSpPr>
-        <p:spPr>
-          <a:xfrm>
-            <a:off x="489878" y="1965532"/>
-            <a:ext cx="6825321" cy="4351338"/>
-          </a:xfrm>
-          <a:prstGeom prst="rect">
-            <a:avLst/>
-          </a:prstGeom>
-        </p:spPr>
-        <p:txBody>
-          <a:bodyPr vert="horz" lIns="91440" tIns="45720" rIns="91440" bIns="45720" rtlCol="0">
-            <a:normAutofit fontScale="92500" lnSpcReduction="20000"/>
-          </a:bodyPr>
-          <a:lstStyle>
-            <a:lvl1pPr marL="228600" indent="-228600" algn="l" defTabSz="914400" rtl="0" eaLnBrk="1" latinLnBrk="0" hangingPunct="1">
-              <a:lnSpc>
-                <a:spcPct val="90000"/>
-              </a:lnSpc>
-              <a:spcBef>
-                <a:spcPts val="1000"/>
-              </a:spcBef>
-              <a:buFont typeface="Arial" panose="020B0604020202020204" pitchFamily="34" charset="0"/>
-              <a:buChar char="•"/>
-              <a:defRPr sz="2800" kern="1200">
-                <a:solidFill>
-                  <a:schemeClr val="tx1"/>
-                </a:solidFill>
-                <a:latin typeface="+mn-lt"/>
-                <a:ea typeface="+mn-ea"/>
-                <a:cs typeface="+mn-cs"/>
-              </a:defRPr>
-            </a:lvl1pPr>
-            <a:lvl2pPr marL="685800" indent="-228600" algn="l" defTabSz="914400" rtl="0" eaLnBrk="1" latinLnBrk="0" hangingPunct="1">
-              <a:lnSpc>
-                <a:spcPct val="90000"/>
-              </a:lnSpc>
-              <a:spcBef>
-                <a:spcPts val="500"/>
-              </a:spcBef>
-              <a:buFont typeface="Arial" panose="020B0604020202020204" pitchFamily="34" charset="0"/>
-              <a:buChar char="•"/>
-              <a:defRPr sz="2400" kern="1200">
-                <a:solidFill>
-                  <a:schemeClr val="tx1"/>
-                </a:solidFill>
-                <a:latin typeface="+mn-lt"/>
-                <a:ea typeface="+mn-ea"/>
-                <a:cs typeface="+mn-cs"/>
-              </a:defRPr>
-            </a:lvl2pPr>
-            <a:lvl3pPr marL="1143000" indent="-228600" algn="l" defTabSz="914400" rtl="0" eaLnBrk="1" latinLnBrk="0" hangingPunct="1">
-              <a:lnSpc>
-                <a:spcPct val="90000"/>
-              </a:lnSpc>
-              <a:spcBef>
-                <a:spcPts val="500"/>
-              </a:spcBef>
-              <a:buFont typeface="Arial" panose="020B0604020202020204" pitchFamily="34" charset="0"/>
-              <a:buChar char="•"/>
-              <a:defRPr sz="2000" kern="1200">
-                <a:solidFill>
-                  <a:schemeClr val="tx1"/>
-                </a:solidFill>
-                <a:latin typeface="+mn-lt"/>
-                <a:ea typeface="+mn-ea"/>
-                <a:cs typeface="+mn-cs"/>
-              </a:defRPr>
-            </a:lvl3pPr>
-            <a:lvl4pPr marL="1600200" indent="-228600" algn="l" defTabSz="914400" rtl="0" eaLnBrk="1" latinLnBrk="0" hangingPunct="1">
-              <a:lnSpc>
-                <a:spcPct val="90000"/>
-              </a:lnSpc>
-              <a:spcBef>
-                <a:spcPts val="500"/>
-              </a:spcBef>
-              <a:buFont typeface="Arial" panose="020B0604020202020204" pitchFamily="34" charset="0"/>
-              <a:buChar char="•"/>
-              <a:defRPr sz="1800" kern="1200">
-                <a:solidFill>
-                  <a:schemeClr val="tx1"/>
-                </a:solidFill>
-                <a:latin typeface="+mn-lt"/>
-                <a:ea typeface="+mn-ea"/>
-                <a:cs typeface="+mn-cs"/>
-              </a:defRPr>
-            </a:lvl4pPr>
-            <a:lvl5pPr marL="2057400" indent="-228600" algn="l" defTabSz="914400" rtl="0" eaLnBrk="1" latinLnBrk="0" hangingPunct="1">
-              <a:lnSpc>
-                <a:spcPct val="90000"/>
-              </a:lnSpc>
-              <a:spcBef>
-                <a:spcPts val="500"/>
-              </a:spcBef>
-              <a:buFont typeface="Arial" panose="020B0604020202020204" pitchFamily="34" charset="0"/>
-              <a:buChar char="•"/>
-              <a:defRPr sz="1800" kern="1200">
-                <a:solidFill>
-                  <a:schemeClr val="tx1"/>
-                </a:solidFill>
-                <a:latin typeface="+mn-lt"/>
-                <a:ea typeface="+mn-ea"/>
-                <a:cs typeface="+mn-cs"/>
-              </a:defRPr>
-            </a:lvl5pPr>
-            <a:lvl6pPr marL="2514600" indent="-228600" algn="l" defTabSz="914400" rtl="0" eaLnBrk="1" latinLnBrk="0" hangingPunct="1">
-              <a:lnSpc>
-                <a:spcPct val="90000"/>
-              </a:lnSpc>
-              <a:spcBef>
-                <a:spcPts val="500"/>
-              </a:spcBef>
-              <a:buFont typeface="Arial" panose="020B0604020202020204" pitchFamily="34" charset="0"/>
-              <a:buChar char="•"/>
-              <a:defRPr sz="1800" kern="1200">
-                <a:solidFill>
-                  <a:schemeClr val="tx1"/>
-                </a:solidFill>
-                <a:latin typeface="+mn-lt"/>
-                <a:ea typeface="+mn-ea"/>
-                <a:cs typeface="+mn-cs"/>
-              </a:defRPr>
-            </a:lvl6pPr>
-            <a:lvl7pPr marL="2971800" indent="-228600" algn="l" defTabSz="914400" rtl="0" eaLnBrk="1" latinLnBrk="0" hangingPunct="1">
-              <a:lnSpc>
-                <a:spcPct val="90000"/>
-              </a:lnSpc>
-              <a:spcBef>
-                <a:spcPts val="500"/>
-              </a:spcBef>
-              <a:buFont typeface="Arial" panose="020B0604020202020204" pitchFamily="34" charset="0"/>
-              <a:buChar char="•"/>
-              <a:defRPr sz="1800" kern="1200">
-                <a:solidFill>
-                  <a:schemeClr val="tx1"/>
-                </a:solidFill>
-                <a:latin typeface="+mn-lt"/>
-                <a:ea typeface="+mn-ea"/>
-                <a:cs typeface="+mn-cs"/>
-              </a:defRPr>
-            </a:lvl7pPr>
-            <a:lvl8pPr marL="3429000" indent="-228600" algn="l" defTabSz="914400" rtl="0" eaLnBrk="1" latinLnBrk="0" hangingPunct="1">
-              <a:lnSpc>
-                <a:spcPct val="90000"/>
-              </a:lnSpc>
-              <a:spcBef>
-                <a:spcPts val="500"/>
-              </a:spcBef>
-              <a:buFont typeface="Arial" panose="020B0604020202020204" pitchFamily="34" charset="0"/>
-              <a:buChar char="•"/>
-              <a:defRPr sz="1800" kern="1200">
-                <a:solidFill>
-                  <a:schemeClr val="tx1"/>
-                </a:solidFill>
-                <a:latin typeface="+mn-lt"/>
-                <a:ea typeface="+mn-ea"/>
-                <a:cs typeface="+mn-cs"/>
-              </a:defRPr>
-            </a:lvl8pPr>
-            <a:lvl9pPr marL="3886200" indent="-228600" algn="l" defTabSz="914400" rtl="0" eaLnBrk="1" latinLnBrk="0" hangingPunct="1">
-              <a:lnSpc>
-                <a:spcPct val="90000"/>
-              </a:lnSpc>
-              <a:spcBef>
-                <a:spcPts val="500"/>
-              </a:spcBef>
-              <a:buFont typeface="Arial" panose="020B0604020202020204" pitchFamily="34" charset="0"/>
-              <a:buChar char="•"/>
-              <a:defRPr sz="1800" kern="1200">
-                <a:solidFill>
-                  <a:schemeClr val="tx1"/>
-                </a:solidFill>
-                <a:latin typeface="+mn-lt"/>
-                <a:ea typeface="+mn-ea"/>
-                <a:cs typeface="+mn-cs"/>
-              </a:defRPr>
-            </a:lvl9pPr>
-          </a:lstStyle>
-          <a:p>
-            <a:r>
-              <a:rPr lang="fr-BE" dirty="0"/>
-              <a:t>Aborder 2 failles de sécurité</a:t>
-            </a:r>
-          </a:p>
-          <a:p>
-            <a:pPr lvl="1"/>
-            <a:r>
-              <a:rPr lang="fr-BE" dirty="0"/>
-              <a:t>Origine</a:t>
-            </a:r>
-          </a:p>
-          <a:p>
-            <a:pPr lvl="1"/>
-            <a:r>
-              <a:rPr lang="fr-BE" dirty="0"/>
-              <a:t>Exploitation</a:t>
-            </a:r>
-          </a:p>
-          <a:p>
-            <a:pPr lvl="1"/>
-            <a:r>
-              <a:rPr lang="fr-BE" dirty="0"/>
-              <a:t>Explication</a:t>
-            </a:r>
-          </a:p>
-          <a:p>
-            <a:pPr lvl="1"/>
-            <a:r>
-              <a:rPr lang="fr-BE" dirty="0"/>
-              <a:t>Comment s’en protéger</a:t>
-            </a:r>
-          </a:p>
-          <a:p>
-            <a:r>
-              <a:rPr lang="fr-BE" dirty="0"/>
-              <a:t>Concepts</a:t>
-            </a:r>
-          </a:p>
-          <a:p>
-            <a:pPr lvl="1"/>
-            <a:r>
-              <a:rPr lang="fr-BE" dirty="0"/>
-              <a:t>Ecriture hors-limite</a:t>
-            </a:r>
-          </a:p>
-          <a:p>
-            <a:pPr lvl="1"/>
-            <a:r>
-              <a:rPr lang="fr-BE" dirty="0"/>
-              <a:t>La pile d’appels</a:t>
-            </a:r>
-          </a:p>
-          <a:p>
-            <a:pPr lvl="1"/>
-            <a:r>
-              <a:rPr lang="fr-BE" dirty="0"/>
-              <a:t>Librairies </a:t>
-            </a:r>
-            <a:r>
-              <a:rPr lang="fr-BE" dirty="0" err="1"/>
-              <a:t>Polkit</a:t>
-            </a:r>
-            <a:r>
-              <a:rPr lang="fr-BE" dirty="0"/>
-              <a:t> et </a:t>
-            </a:r>
-            <a:r>
-              <a:rPr lang="fr-BE" dirty="0" err="1"/>
-              <a:t>Glib</a:t>
-            </a:r>
-            <a:endParaRPr lang="fr-BE" dirty="0"/>
-          </a:p>
-          <a:p>
-            <a:pPr lvl="1"/>
-            <a:r>
-              <a:rPr lang="fr-BE" dirty="0"/>
-              <a:t>Insertion de données dans les variables d’environnement</a:t>
-            </a:r>
-          </a:p>
-          <a:p>
-            <a:pPr lvl="1"/>
-            <a:r>
-              <a:rPr lang="fr-BE" dirty="0"/>
-              <a:t>Fonctionnement et utilisation du GRUB dans une attaque physique</a:t>
-            </a:r>
-          </a:p>
-        </p:txBody>
-      </p:sp>
-    </p:spTree>
-    <p:extLst>
-      <p:ext uri="{BB962C8B-B14F-4D97-AF65-F5344CB8AC3E}">
-        <p14:creationId xmlns:p14="http://schemas.microsoft.com/office/powerpoint/2010/main" val="386962581"/>
-      </p:ext>
-    </p:extLst>
-  </p:cSld>
-  <p:clrMapOvr>
-    <a:masterClrMapping/>
-  </p:clrMapOvr>
-</p:sld>
-</file>
-
-<file path=ppt/slides/slide30.xml><?xml version="1.0" encoding="utf-8"?>
+<file path=ppt/slides/slide31.xml><?xml version="1.0" encoding="utf-8"?>
 <p:sld xmlns:a="http://schemas.openxmlformats.org/drawingml/2006/main" xmlns:r="http://schemas.openxmlformats.org/officeDocument/2006/relationships" xmlns:p="http://schemas.openxmlformats.org/presentationml/2006/main">
   <p:cSld>
     <p:spTree>
@@ -16715,7 +16920,7 @@
 </p:sld>
 </file>
 
-<file path=ppt/slides/slide31.xml><?xml version="1.0" encoding="utf-8"?>
+<file path=ppt/slides/slide32.xml><?xml version="1.0" encoding="utf-8"?>
 <p:sld xmlns:a="http://schemas.openxmlformats.org/drawingml/2006/main" xmlns:r="http://schemas.openxmlformats.org/officeDocument/2006/relationships" xmlns:p="http://schemas.openxmlformats.org/presentationml/2006/main">
   <p:cSld>
     <p:spTree>
@@ -16940,7 +17145,7 @@
 </p:sld>
 </file>
 
-<file path=ppt/slides/slide32.xml><?xml version="1.0" encoding="utf-8"?>
+<file path=ppt/slides/slide33.xml><?xml version="1.0" encoding="utf-8"?>
 <p:sld xmlns:a="http://schemas.openxmlformats.org/drawingml/2006/main" xmlns:r="http://schemas.openxmlformats.org/officeDocument/2006/relationships" xmlns:p="http://schemas.openxmlformats.org/presentationml/2006/main">
   <p:cSld>
     <p:spTree>
@@ -16984,7 +17189,7 @@
           <a:lstStyle/>
           <a:p>
             <a:r>
-              <a:rPr lang="fr-FR" b="1" dirty="0">
+              <a:rPr lang="fr-FR" b="1">
                 <a:latin typeface="Verdana" panose="020B0604030504040204" pitchFamily="34" charset="0"/>
                 <a:ea typeface="Verdana" panose="020B0604030504040204" pitchFamily="34" charset="0"/>
               </a:rPr>
@@ -17016,7 +17221,7 @@
         <p:spPr>
           <a:xfrm>
             <a:off x="489878" y="1965532"/>
-            <a:ext cx="7114881" cy="4351338"/>
+            <a:ext cx="4856519" cy="4351338"/>
           </a:xfrm>
         </p:spPr>
         <p:txBody>
@@ -17042,6 +17247,36 @@
           </a:p>
         </p:txBody>
       </p:sp>
+      <p:pic>
+        <p:nvPicPr>
+          <p:cNvPr id="3" name="Image 2">
+            <a:extLst>
+              <a:ext uri="{FF2B5EF4-FFF2-40B4-BE49-F238E27FC236}">
+                <a16:creationId xmlns:a16="http://schemas.microsoft.com/office/drawing/2014/main" id="{211F927D-CB42-5DE2-D760-E43374FCD2AF}"/>
+              </a:ext>
+            </a:extLst>
+          </p:cNvPr>
+          <p:cNvPicPr>
+            <a:picLocks noChangeAspect="1"/>
+          </p:cNvPicPr>
+          <p:nvPr/>
+        </p:nvPicPr>
+        <p:blipFill>
+          <a:blip r:embed="rId3"/>
+          <a:stretch>
+            <a:fillRect/>
+          </a:stretch>
+        </p:blipFill>
+        <p:spPr>
+          <a:xfrm>
+            <a:off x="5346397" y="1804761"/>
+            <a:ext cx="6677957" cy="3248478"/>
+          </a:xfrm>
+          <a:prstGeom prst="rect">
+            <a:avLst/>
+          </a:prstGeom>
+        </p:spPr>
+      </p:pic>
     </p:spTree>
     <p:extLst>
       <p:ext uri="{BB962C8B-B14F-4D97-AF65-F5344CB8AC3E}">
@@ -17055,7 +17290,7 @@
 </p:sld>
 </file>
 
-<file path=ppt/slides/slide33.xml><?xml version="1.0" encoding="utf-8"?>
+<file path=ppt/slides/slide34.xml><?xml version="1.0" encoding="utf-8"?>
 <p:sld xmlns:a="http://schemas.openxmlformats.org/drawingml/2006/main" xmlns:r="http://schemas.openxmlformats.org/officeDocument/2006/relationships" xmlns:p="http://schemas.openxmlformats.org/presentationml/2006/main">
   <p:cSld>
     <p:spTree>
@@ -17278,7 +17513,7 @@
         </p:blipFill>
         <p:spPr>
           <a:xfrm>
-            <a:off x="351721" y="3622321"/>
+            <a:off x="408260" y="3715902"/>
             <a:ext cx="6457188" cy="659389"/>
           </a:xfrm>
           <a:prstGeom prst="rect">
@@ -17329,7 +17564,7 @@
 </p:sld>
 </file>
 
-<file path=ppt/slides/slide34.xml><?xml version="1.0" encoding="utf-8"?>
+<file path=ppt/slides/slide35.xml><?xml version="1.0" encoding="utf-8"?>
 <p:sld xmlns:a="http://schemas.openxmlformats.org/drawingml/2006/main" xmlns:r="http://schemas.openxmlformats.org/officeDocument/2006/relationships" xmlns:p="http://schemas.openxmlformats.org/presentationml/2006/main">
   <p:cSld>
     <p:spTree>
@@ -17514,7 +17749,7 @@
 </p:sld>
 </file>
 
-<file path=ppt/slides/slide35.xml><?xml version="1.0" encoding="utf-8"?>
+<file path=ppt/slides/slide36.xml><?xml version="1.0" encoding="utf-8"?>
 <p:sld xmlns:a="http://schemas.openxmlformats.org/drawingml/2006/main" xmlns:r="http://schemas.openxmlformats.org/officeDocument/2006/relationships" xmlns:p="http://schemas.openxmlformats.org/presentationml/2006/main">
   <p:cSld>
     <p:spTree>

</xml_diff>